<commit_message>
Revert "Merge branch 'main' into 2025-01/linfergar"
This reverts commit 2f3822c8a57451d6730aa222c2702cc715463f1f, reversing
changes made to ca43f93df1466107c3114c4666f7aeba3ebf1faa.
</commit_message>
<xml_diff>
--- a/Classes/SvcDev-06-Cloud.pptx
+++ b/Classes/SvcDev-06-Cloud.pptx
@@ -238,7 +238,7 @@
             <a:fld id="{2C5F02C1-A2C2-45D1-8D60-D454C04B5E27}" type="datetimeFigureOut">
               <a:rPr lang="es-CO" smtClean="0"/>
               <a:pPr/>
-              <a:t>7/05/2025</a:t>
+              <a:t>25/03/2022</a:t>
             </a:fld>
             <a:endParaRPr lang="es-CO" dirty="0"/>
           </a:p>
@@ -304,35 +304,35 @@
           <a:p>
             <a:pPr lvl="0"/>
             <a:r>
-              <a:rPr lang="en-US"/>
+              <a:rPr lang="en-US" smtClean="0"/>
               <a:t>Click to edit Master text styles</a:t>
             </a:r>
           </a:p>
           <a:p>
             <a:pPr lvl="1"/>
             <a:r>
-              <a:rPr lang="en-US"/>
+              <a:rPr lang="en-US" smtClean="0"/>
               <a:t>Second level</a:t>
             </a:r>
           </a:p>
           <a:p>
             <a:pPr lvl="2"/>
             <a:r>
-              <a:rPr lang="en-US"/>
+              <a:rPr lang="en-US" smtClean="0"/>
               <a:t>Third level</a:t>
             </a:r>
           </a:p>
           <a:p>
             <a:pPr lvl="3"/>
             <a:r>
-              <a:rPr lang="en-US"/>
+              <a:rPr lang="en-US" smtClean="0"/>
               <a:t>Fourth level</a:t>
             </a:r>
           </a:p>
           <a:p>
             <a:pPr lvl="4"/>
             <a:r>
-              <a:rPr lang="en-US"/>
+              <a:rPr lang="en-US" smtClean="0"/>
               <a:t>Fifth level</a:t>
             </a:r>
             <a:endParaRPr lang="es-CO"/>
@@ -555,76 +555,7 @@
           </a:bodyPr>
           <a:lstStyle/>
           <a:p>
-            <a:pPr marL="0" marR="0" lvl="0" indent="0" algn="l" defTabSz="914400" rtl="0" eaLnBrk="1" fontAlgn="auto" latinLnBrk="0" hangingPunct="1">
-              <a:lnSpc>
-                <a:spcPct val="100000"/>
-              </a:lnSpc>
-              <a:spcBef>
-                <a:spcPts val="0"/>
-              </a:spcBef>
-              <a:spcAft>
-                <a:spcPts val="0"/>
-              </a:spcAft>
-              <a:buClrTx/>
-              <a:buSzTx/>
-              <a:buFontTx/>
-              <a:buNone/>
-              <a:tabLst/>
-              <a:defRPr/>
-            </a:pPr>
-            <a:r>
-              <a:rPr lang="es-CO" dirty="0"/>
-              <a:t>Hola a todos, Hoy exploraremos el mundo del iCloud Computing, uno de los avances mas importantes de nuestra era..</a:t>
-            </a:r>
-          </a:p>
-          <a:p>
-            <a:pPr marL="0" marR="0" lvl="0" indent="0" algn="l" defTabSz="914400" rtl="0" eaLnBrk="1" fontAlgn="auto" latinLnBrk="0" hangingPunct="1">
-              <a:lnSpc>
-                <a:spcPct val="100000"/>
-              </a:lnSpc>
-              <a:spcBef>
-                <a:spcPts val="0"/>
-              </a:spcBef>
-              <a:spcAft>
-                <a:spcPts val="0"/>
-              </a:spcAft>
-              <a:buClrTx/>
-              <a:buSzTx/>
-              <a:buFontTx/>
-              <a:buNone/>
-              <a:tabLst/>
-              <a:defRPr/>
-            </a:pPr>
-            <a:r>
-              <a:rPr lang="es-CO" dirty="0"/>
-              <a:t>La nube se ha convertido en el motor que impulsa desde pequeñas startups hasta corporaciones globales, permitiendo una innovación más rápida, escalabilidad bajo demanda y modelos de negocio completamente nuevos.</a:t>
-            </a:r>
-          </a:p>
-          <a:p>
-            <a:pPr marL="0" marR="0" lvl="0" indent="0" algn="l" defTabSz="914400" rtl="0" eaLnBrk="1" fontAlgn="auto" latinLnBrk="0" hangingPunct="1">
-              <a:lnSpc>
-                <a:spcPct val="100000"/>
-              </a:lnSpc>
-              <a:spcBef>
-                <a:spcPts val="0"/>
-              </a:spcBef>
-              <a:spcAft>
-                <a:spcPts val="0"/>
-              </a:spcAft>
-              <a:buClrTx/>
-              <a:buSzTx/>
-              <a:buFontTx/>
-              <a:buNone/>
-              <a:tabLst/>
-              <a:defRPr/>
-            </a:pPr>
             <a:endParaRPr lang="es-CO" dirty="0"/>
-          </a:p>
-          <a:p>
-            <a:r>
-              <a:rPr lang="es-CO" dirty="0"/>
-              <a:t>En esta clase exploraremos, Los modelos fundamentales de servicio en la nube, así como los beneficios de utilizar Cloud Computing.</a:t>
-            </a:r>
           </a:p>
         </p:txBody>
       </p:sp>
@@ -709,188 +640,6 @@
           <a:bodyPr/>
           <a:lstStyle/>
           <a:p>
-            <a:r>
-              <a:rPr lang="es-CO" dirty="0"/>
-              <a:t>Hoy en día, casi todo lo que usamos en internet —desde redes sociales hasta videojuegos en línea, plataformas educativas o apps bancarias— funciona gracias a una tecnología llamada </a:t>
-            </a:r>
-            <a:r>
-              <a:rPr lang="es-CO" b="1" dirty="0"/>
-              <a:t>computación en la nube</a:t>
-            </a:r>
-            <a:r>
-              <a:rPr lang="es-CO" dirty="0"/>
-              <a:t>, o </a:t>
-            </a:r>
-            <a:r>
-              <a:rPr lang="es-CO" i="1" dirty="0"/>
-              <a:t>Cloud Computing</a:t>
-            </a:r>
-            <a:r>
-              <a:rPr lang="es-CO" dirty="0"/>
-              <a:t>. Pero que es, Cloud Computing</a:t>
-            </a:r>
-            <a:r>
-              <a:rPr lang="en-US" dirty="0"/>
-              <a:t>?</a:t>
-            </a:r>
-          </a:p>
-          <a:p>
-            <a:r>
-              <a:rPr lang="es-CO" dirty="0"/>
-              <a:t>Cloud Computing se refiere al </a:t>
-            </a:r>
-            <a:r>
-              <a:rPr lang="es-CO" b="1" dirty="0">
-                <a:solidFill>
-                  <a:schemeClr val="accent4"/>
-                </a:solidFill>
-              </a:rPr>
-              <a:t>almacenamiento</a:t>
-            </a:r>
-            <a:r>
-              <a:rPr lang="es-CO" dirty="0">
-                <a:solidFill>
-                  <a:schemeClr val="accent4"/>
-                </a:solidFill>
-              </a:rPr>
-              <a:t> </a:t>
-            </a:r>
-            <a:r>
-              <a:rPr lang="es-CO" dirty="0"/>
-              <a:t>y </a:t>
-            </a:r>
-            <a:r>
-              <a:rPr lang="es-CO" b="1" dirty="0">
-                <a:solidFill>
-                  <a:schemeClr val="accent3"/>
-                </a:solidFill>
-              </a:rPr>
-              <a:t>acceso</a:t>
-            </a:r>
-            <a:r>
-              <a:rPr lang="es-CO" dirty="0">
-                <a:solidFill>
-                  <a:schemeClr val="accent3"/>
-                </a:solidFill>
-              </a:rPr>
-              <a:t> </a:t>
-            </a:r>
-            <a:r>
-              <a:rPr lang="es-CO" dirty="0"/>
-              <a:t>de los </a:t>
-            </a:r>
-            <a:r>
-              <a:rPr lang="es-CO" b="1" dirty="0">
-                <a:solidFill>
-                  <a:schemeClr val="accent1"/>
-                </a:solidFill>
-              </a:rPr>
-              <a:t>datos</a:t>
-            </a:r>
-            <a:r>
-              <a:rPr lang="es-CO" dirty="0">
-                <a:solidFill>
-                  <a:schemeClr val="accent1"/>
-                </a:solidFill>
-              </a:rPr>
-              <a:t> </a:t>
-            </a:r>
-            <a:r>
-              <a:rPr lang="es-CO" dirty="0"/>
-              <a:t>a través de </a:t>
-            </a:r>
-            <a:r>
-              <a:rPr lang="es-CO" b="1" dirty="0">
-                <a:solidFill>
-                  <a:schemeClr val="accent5"/>
-                </a:solidFill>
-              </a:rPr>
-              <a:t>internet</a:t>
-            </a:r>
-            <a:r>
-              <a:rPr lang="es-CO" dirty="0"/>
-              <a:t>, en lugar de </a:t>
-            </a:r>
-            <a:r>
-              <a:rPr lang="es-CO" b="1" dirty="0">
-                <a:solidFill>
-                  <a:schemeClr val="accent2"/>
-                </a:solidFill>
-              </a:rPr>
-              <a:t>almacenarlo</a:t>
-            </a:r>
-            <a:r>
-              <a:rPr lang="es-CO" dirty="0">
-                <a:solidFill>
-                  <a:schemeClr val="accent2"/>
-                </a:solidFill>
-              </a:rPr>
-              <a:t> </a:t>
-            </a:r>
-            <a:r>
-              <a:rPr lang="es-CO" dirty="0"/>
-              <a:t>en el disco duro </a:t>
-            </a:r>
-            <a:r>
-              <a:rPr lang="es-CO" b="1" dirty="0">
-                <a:solidFill>
-                  <a:schemeClr val="accent6"/>
-                </a:solidFill>
-              </a:rPr>
-              <a:t>local</a:t>
-            </a:r>
-            <a:r>
-              <a:rPr lang="es-CO" b="0" dirty="0">
-                <a:solidFill>
-                  <a:schemeClr val="accent6"/>
-                </a:solidFill>
-              </a:rPr>
-              <a:t>.</a:t>
-            </a:r>
-          </a:p>
-          <a:p>
-            <a:r>
-              <a:rPr lang="es-CO" dirty="0"/>
-              <a:t>No es algo mágico ni abstracto: son servidores reales, conectados entre sí, que permiten acceder a software, almacenar información o ejecutar procesos... todo </a:t>
-            </a:r>
-            <a:r>
-              <a:rPr lang="es-CO" b="1" dirty="0"/>
-              <a:t>desde cualquier lugar</a:t>
-            </a:r>
-            <a:r>
-              <a:rPr lang="es-CO" dirty="0"/>
-              <a:t>, sin necesidad de tener la infraestructura física en casa o en la oficina.</a:t>
-            </a:r>
-            <a:endParaRPr lang="es-CO" b="1" dirty="0">
-              <a:solidFill>
-                <a:schemeClr val="accent6"/>
-              </a:solidFill>
-            </a:endParaRPr>
-          </a:p>
-          <a:p>
-            <a:pPr marL="0" indent="0">
-              <a:buNone/>
-            </a:pPr>
-            <a:endParaRPr lang="es-CO" dirty="0"/>
-          </a:p>
-          <a:p>
-            <a:pPr marL="0" indent="0">
-              <a:buNone/>
-            </a:pPr>
-            <a:r>
-              <a:rPr lang="es-CO" dirty="0"/>
-              <a:t>Cloud Computing no es solo una tendencia: es el </a:t>
-            </a:r>
-            <a:r>
-              <a:rPr lang="es-CO" b="1" dirty="0"/>
-              <a:t>nuevo estándar tecnológico</a:t>
-            </a:r>
-            <a:r>
-              <a:rPr lang="es-CO" dirty="0"/>
-              <a:t>. Y aprenderlo te pondrá un paso en el futuro.</a:t>
-            </a:r>
-          </a:p>
-          <a:p>
             <a:endParaRPr lang="es-CO" dirty="0"/>
           </a:p>
         </p:txBody>
@@ -976,154 +725,7 @@
           <a:bodyPr/>
           <a:lstStyle/>
           <a:p>
-            <a:r>
-              <a:rPr lang="es-CO" noProof="0" dirty="0"/>
-              <a:t>Para entrar mas en materia veamos ahora los tipos de nube o las formas en las que Podemos desplegar y utilizar el Cloud Computing, </a:t>
-            </a:r>
-          </a:p>
-          <a:p>
-            <a:r>
-              <a:rPr lang="es-CO" noProof="0" dirty="0"/>
-              <a:t>El primero es,</a:t>
-            </a:r>
-          </a:p>
-          <a:p>
-            <a:pPr marL="171450" indent="-171450" algn="just">
-              <a:buFont typeface="Arial" panose="020B0604020202020204" pitchFamily="34" charset="0"/>
-              <a:buChar char="•"/>
-            </a:pPr>
-            <a:r>
-              <a:rPr lang="es-CO" sz="1200" b="1" noProof="0" dirty="0">
-                <a:solidFill>
-                  <a:schemeClr val="accent6"/>
-                </a:solidFill>
-              </a:rPr>
-              <a:t>Privado</a:t>
-            </a:r>
-            <a:r>
-              <a:rPr lang="es-CO" sz="1200" noProof="0" dirty="0">
-                <a:solidFill>
-                  <a:schemeClr val="accent6"/>
-                </a:solidFill>
-              </a:rPr>
-              <a:t> : </a:t>
-            </a:r>
-            <a:r>
-              <a:rPr lang="es-CO" sz="1200" noProof="0" dirty="0"/>
-              <a:t>Una nube privada es aquella en la que solamente una organización, utilizando tecnologías como la virtualización, tiene acceso a los recursos que se utilizan para implementar la nube. Es decir, una empresa dispone de un entorno Cloud en exclusiva.</a:t>
-            </a:r>
-          </a:p>
-          <a:p>
-            <a:pPr marL="0" indent="0" algn="just">
-              <a:buFont typeface="Arial" panose="020B0604020202020204" pitchFamily="34" charset="0"/>
-              <a:buNone/>
-            </a:pPr>
-            <a:r>
-              <a:rPr lang="es-CO" sz="1200" noProof="0" dirty="0"/>
-              <a:t>El segundo es,</a:t>
-            </a:r>
-          </a:p>
-          <a:p>
-            <a:pPr marL="171450" indent="-171450" algn="just">
-              <a:buFont typeface="Arial" panose="020B0604020202020204" pitchFamily="34" charset="0"/>
-              <a:buChar char="•"/>
-            </a:pPr>
-            <a:r>
-              <a:rPr lang="es-CO" sz="1200" b="1" noProof="0" dirty="0">
-                <a:solidFill>
-                  <a:schemeClr val="accent6"/>
-                </a:solidFill>
-              </a:rPr>
-              <a:t>Publico :</a:t>
-            </a:r>
-            <a:r>
-              <a:rPr lang="es-CO" sz="1200" noProof="0" dirty="0">
-                <a:solidFill>
-                  <a:srgbClr val="FFFF00"/>
-                </a:solidFill>
-              </a:rPr>
-              <a:t> </a:t>
-            </a:r>
-            <a:r>
-              <a:rPr lang="es-CO" sz="1200" noProof="0" dirty="0"/>
-              <a:t>Se caracteriza por ofrecer recursos sobre infraestructuras compartidas entre múltiples clientes. A estos recursos el cliente accede a través de internet o mediante conexiones VPN.</a:t>
-            </a:r>
-          </a:p>
-          <a:p>
-            <a:pPr marL="0" indent="0" algn="just">
-              <a:buFont typeface="Arial" panose="020B0604020202020204" pitchFamily="34" charset="0"/>
-              <a:buNone/>
-            </a:pPr>
-            <a:r>
-              <a:rPr lang="es-CO" sz="1200" b="0" noProof="0" dirty="0">
-                <a:solidFill>
-                  <a:schemeClr val="tx1"/>
-                </a:solidFill>
-              </a:rPr>
-              <a:t>Y por ultimo y no menos importante el,</a:t>
-            </a:r>
-          </a:p>
-          <a:p>
-            <a:pPr marL="171450" indent="-171450" algn="just">
-              <a:buFont typeface="Arial" panose="020B0604020202020204" pitchFamily="34" charset="0"/>
-              <a:buChar char="•"/>
-            </a:pPr>
-            <a:r>
-              <a:rPr lang="es-CO" sz="1200" b="1" noProof="0" dirty="0">
-                <a:solidFill>
-                  <a:schemeClr val="accent6"/>
-                </a:solidFill>
-              </a:rPr>
-              <a:t>Hibrido :</a:t>
-            </a:r>
-            <a:r>
-              <a:rPr lang="es-CO" sz="1200" noProof="0" dirty="0">
-                <a:solidFill>
-                  <a:srgbClr val="FFFF00"/>
-                </a:solidFill>
-              </a:rPr>
-              <a:t> que </a:t>
-            </a:r>
-            <a:r>
-              <a:rPr lang="es-CO" sz="1200" noProof="0" dirty="0"/>
-              <a:t>Combina recursos del Cloud Privado con los del Cloud Público. Este tipo surge a partir de la necesidad de los clientes que aunque cuentan con infraestructura propia buscan aprovechar las ventajas de los servicios de un proveedor externo que este en la nube.</a:t>
-            </a:r>
-          </a:p>
-          <a:p>
-            <a:pPr marL="0" indent="0" algn="just">
-              <a:buFont typeface="Arial" panose="020B0604020202020204" pitchFamily="34" charset="0"/>
-              <a:buNone/>
-            </a:pPr>
-            <a:endParaRPr lang="es-CO" sz="1200" noProof="0" dirty="0"/>
-          </a:p>
-          <a:p>
-            <a:pPr marL="0" indent="0" algn="just">
-              <a:buFont typeface="Arial" panose="020B0604020202020204" pitchFamily="34" charset="0"/>
-              <a:buNone/>
-            </a:pPr>
-            <a:r>
-              <a:rPr lang="es-CO" noProof="0" dirty="0"/>
-              <a:t>Conocer los modelos de despliegue te permitirá </a:t>
-            </a:r>
-            <a:r>
-              <a:rPr lang="es-CO" b="1" noProof="0" dirty="0"/>
-              <a:t>tomar decisiones técnicas y estratégicas correctas</a:t>
-            </a:r>
-            <a:r>
-              <a:rPr lang="es-CO" b="0" noProof="0" dirty="0"/>
-              <a:t>, </a:t>
-            </a:r>
-            <a:r>
-              <a:rPr lang="es-CO" noProof="0" dirty="0"/>
-              <a:t>ya que No es lo mismo diseñar una aplicación para un cliente pequeño que para un banco o una entidad gubernamental. </a:t>
-            </a:r>
-            <a:endParaRPr lang="es-CO" sz="1200" noProof="0" dirty="0"/>
-          </a:p>
-          <a:p>
-            <a:endParaRPr lang="es-CO" noProof="0" dirty="0"/>
-          </a:p>
-          <a:p>
-            <a:endParaRPr lang="es-CO" noProof="0" dirty="0"/>
+            <a:endParaRPr lang="es-CO" dirty="0"/>
           </a:p>
         </p:txBody>
       </p:sp>
@@ -1134,7 +736,7 @@
             <a:spLocks noGrp="1"/>
           </p:cNvSpPr>
           <p:nvPr>
-            <p:ph type="sldNum" sz="quarter" idx="5"/>
+            <p:ph type="sldNum" sz="quarter" idx="10"/>
           </p:nvPr>
         </p:nvSpPr>
         <p:spPr/>
@@ -1145,7 +747,7 @@
             <a:fld id="{3461A6AF-5C91-4279-A2A9-5DA981759015}" type="slidenum">
               <a:rPr lang="es-CO" smtClean="0"/>
               <a:pPr/>
-              <a:t>3</a:t>
+              <a:t>5</a:t>
             </a:fld>
             <a:endParaRPr lang="es-CO" dirty="0"/>
           </a:p>
@@ -1154,7 +756,7 @@
     </p:spTree>
     <p:extLst>
       <p:ext uri="{BB962C8B-B14F-4D97-AF65-F5344CB8AC3E}">
-        <p14:creationId xmlns:p14="http://schemas.microsoft.com/office/powerpoint/2010/main" val="1015220591"/>
+        <p14:creationId xmlns:p14="http://schemas.microsoft.com/office/powerpoint/2010/main" val="612879495"/>
       </p:ext>
     </p:extLst>
   </p:cSld>
@@ -1206,801 +808,12 @@
         <p:spPr/>
         <p:txBody>
           <a:bodyPr>
-            <a:normAutofit fontScale="85000" lnSpcReduction="20000"/>
+            <a:normAutofit fontScale="85000" lnSpcReduction="10000"/>
           </a:bodyPr>
           <a:lstStyle/>
           <a:p>
             <a:r>
-              <a:rPr lang="es-CO" dirty="0"/>
-              <a:t>En Cloud Computing, existen </a:t>
-            </a:r>
-            <a:r>
-              <a:rPr lang="es-CO" b="1" dirty="0"/>
-              <a:t>tres modelos principales de servicio</a:t>
-            </a:r>
-            <a:r>
-              <a:rPr lang="es-CO" dirty="0"/>
-              <a:t>, que definen </a:t>
-            </a:r>
-            <a:r>
-              <a:rPr lang="es-CO" i="1" dirty="0"/>
-              <a:t>qué tanto controla el usuario</a:t>
-            </a:r>
-            <a:r>
-              <a:rPr lang="es-CO" dirty="0"/>
-              <a:t> y </a:t>
-            </a:r>
-            <a:r>
-              <a:rPr lang="es-CO" i="1" dirty="0"/>
-              <a:t>qué tanto ofrece el proveedor de nube</a:t>
-            </a:r>
-            <a:r>
-              <a:rPr lang="es-CO" dirty="0"/>
-              <a:t>:</a:t>
-            </a:r>
-          </a:p>
-          <a:p>
-            <a:pPr marL="228600" indent="-228600">
-              <a:buAutoNum type="arabicPeriod"/>
-            </a:pPr>
-            <a:r>
-              <a:rPr lang="es-CO" b="1" dirty="0"/>
-              <a:t>SaaS – Software como Servicio (Software as a </a:t>
-            </a:r>
-            <a:r>
-              <a:rPr lang="es-CO" b="1" dirty="0" err="1"/>
-              <a:t>Service</a:t>
-            </a:r>
-            <a:r>
-              <a:rPr lang="es-CO" b="1" dirty="0"/>
-              <a:t>)</a:t>
-            </a:r>
-          </a:p>
-          <a:p>
-            <a:r>
-              <a:rPr lang="es-CO" dirty="0"/>
-              <a:t>El proveedor ofrece aplicaciones listas para usarse desde el navegador, sin que el usuario tenga que instalar ni mantener nada y  </a:t>
-            </a:r>
-            <a:r>
-              <a:rPr lang="es-CO" b="1" dirty="0"/>
-              <a:t>Tú solo usas</a:t>
-            </a:r>
-            <a:r>
-              <a:rPr lang="es-CO" dirty="0"/>
-              <a:t> el software, es Ideal para: usuarios finales o empresas que quieren soluciones rápidas y funcionales.</a:t>
-            </a:r>
-            <a:br>
-              <a:rPr lang="es-CO" dirty="0"/>
-            </a:br>
-            <a:r>
-              <a:rPr lang="es-CO" dirty="0"/>
-              <a:t>Ejemplo: </a:t>
-            </a:r>
-            <a:r>
-              <a:rPr lang="es-CO" b="1" dirty="0"/>
-              <a:t>Email, Office 365, CRM, Software colaborativo, sistema de ERP, o sistemas de almacenamiento como Dropbox</a:t>
-            </a:r>
-            <a:r>
-              <a:rPr lang="es-CO" dirty="0"/>
-              <a:t>.</a:t>
-            </a:r>
-          </a:p>
-          <a:p>
-            <a:endParaRPr lang="es-CO" dirty="0"/>
-          </a:p>
-          <a:p>
-            <a:pPr marL="228600" indent="-228600">
-              <a:buFont typeface="+mj-lt"/>
-              <a:buAutoNum type="arabicPeriod" startAt="2"/>
-            </a:pPr>
-            <a:r>
-              <a:rPr lang="es-CO" b="1" dirty="0"/>
-              <a:t>PaaS – Plataforma como Servicio (</a:t>
-            </a:r>
-            <a:r>
-              <a:rPr lang="es-CO" b="1" dirty="0" err="1"/>
-              <a:t>Platform</a:t>
-            </a:r>
-            <a:r>
-              <a:rPr lang="es-CO" b="1" dirty="0"/>
-              <a:t> as a </a:t>
-            </a:r>
-            <a:r>
-              <a:rPr lang="es-CO" b="1" dirty="0" err="1"/>
-              <a:t>Service</a:t>
-            </a:r>
-            <a:r>
-              <a:rPr lang="es-CO" b="1" dirty="0"/>
-              <a:t>)</a:t>
-            </a:r>
-          </a:p>
-          <a:p>
-            <a:r>
-              <a:rPr lang="es-CO" dirty="0"/>
-              <a:t>El proveedor te da un entorno listo para que desarrolles y despliegues tus aplicaciones, sin preocuparte por la infraestructura, y </a:t>
-            </a:r>
-            <a:r>
-              <a:rPr lang="es-CO" b="1" dirty="0"/>
-              <a:t>Tú administras:</a:t>
-            </a:r>
-            <a:r>
-              <a:rPr lang="es-CO" dirty="0"/>
-              <a:t> solo tu código y tus datos, es Ideal para: desarrolladores que quieren enfocarse en programar sin gestionar servidores.</a:t>
-            </a:r>
-            <a:br>
-              <a:rPr lang="es-CO" dirty="0"/>
-            </a:br>
-            <a:r>
-              <a:rPr lang="es-CO" dirty="0"/>
-              <a:t>Ejemplo: Aplicaciones desarrolladas para nube o de despliegue en web como  </a:t>
-            </a:r>
-            <a:r>
-              <a:rPr lang="es-CO" b="1" dirty="0"/>
-              <a:t>Azure App </a:t>
-            </a:r>
-            <a:r>
-              <a:rPr lang="es-CO" b="1" dirty="0" err="1"/>
-              <a:t>Service</a:t>
-            </a:r>
-            <a:r>
-              <a:rPr lang="es-CO" dirty="0"/>
-              <a:t>, </a:t>
-            </a:r>
-            <a:r>
-              <a:rPr lang="es-CO" b="1" dirty="0" err="1"/>
-              <a:t>Heroku</a:t>
-            </a:r>
-            <a:r>
-              <a:rPr lang="es-CO" dirty="0"/>
-              <a:t>, o </a:t>
-            </a:r>
-            <a:r>
-              <a:rPr lang="es-CO" b="1" dirty="0"/>
-              <a:t>Google App </a:t>
-            </a:r>
-            <a:r>
-              <a:rPr lang="es-CO" b="1" dirty="0" err="1"/>
-              <a:t>Engine</a:t>
-            </a:r>
-            <a:r>
-              <a:rPr lang="es-CO" dirty="0"/>
-              <a:t>.</a:t>
-            </a:r>
-          </a:p>
-          <a:p>
-            <a:endParaRPr lang="es-CO" b="1" dirty="0"/>
-          </a:p>
-          <a:p>
-            <a:pPr marL="228600" indent="-228600">
-              <a:buFont typeface="+mj-lt"/>
-              <a:buAutoNum type="arabicPeriod" startAt="3"/>
-            </a:pPr>
-            <a:r>
-              <a:rPr lang="es-CO" b="1" dirty="0"/>
-              <a:t>IaaS – Infraestructura como Servicio (</a:t>
-            </a:r>
-            <a:r>
-              <a:rPr lang="es-CO" b="1" dirty="0" err="1"/>
-              <a:t>Infrastructure</a:t>
-            </a:r>
-            <a:r>
-              <a:rPr lang="es-CO" b="1" dirty="0"/>
-              <a:t> as a </a:t>
-            </a:r>
-            <a:r>
-              <a:rPr lang="es-CO" b="1" dirty="0" err="1"/>
-              <a:t>Service</a:t>
-            </a:r>
-            <a:r>
-              <a:rPr lang="es-CO" b="1" dirty="0"/>
-              <a:t>)</a:t>
-            </a:r>
-          </a:p>
-          <a:p>
-            <a:r>
-              <a:rPr lang="es-CO" dirty="0"/>
-              <a:t>El proveedor te da acceso a recursos básicos como servidores virtuales, almacenamiento, redes, etc., y </a:t>
-            </a:r>
-            <a:r>
-              <a:rPr lang="es-CO" b="1" dirty="0"/>
-              <a:t>Tú administras:</a:t>
-            </a:r>
-            <a:r>
-              <a:rPr lang="es-CO" dirty="0"/>
-              <a:t> el sistema operativo, las aplicaciones y la configuración, es Ideal para: técnicos de infraestructura, administradores de sistemas y desarrolladores que quieren controlar todo.</a:t>
-            </a:r>
-            <a:br>
-              <a:rPr lang="es-CO" dirty="0"/>
-            </a:br>
-            <a:r>
-              <a:rPr lang="es-CO" dirty="0"/>
-              <a:t>Ejemplo: crear máquinas virtuales en </a:t>
-            </a:r>
-            <a:r>
-              <a:rPr lang="es-CO" b="1" dirty="0"/>
-              <a:t>Azure</a:t>
-            </a:r>
-            <a:r>
-              <a:rPr lang="es-CO" dirty="0"/>
-              <a:t>, </a:t>
-            </a:r>
-            <a:r>
-              <a:rPr lang="es-CO" b="1" dirty="0"/>
-              <a:t>AWS EC2</a:t>
-            </a:r>
-            <a:r>
-              <a:rPr lang="es-CO" dirty="0"/>
-              <a:t>, </a:t>
-            </a:r>
-            <a:r>
-              <a:rPr lang="es-CO" b="1" dirty="0"/>
-              <a:t>Google Compute </a:t>
-            </a:r>
-            <a:r>
-              <a:rPr lang="es-CO" b="1" dirty="0" err="1"/>
-              <a:t>Engine</a:t>
-            </a:r>
-            <a:r>
-              <a:rPr lang="es-CO" dirty="0"/>
-              <a:t>.</a:t>
-            </a:r>
-          </a:p>
-          <a:p>
-            <a:endParaRPr lang="es-CO" b="1" dirty="0"/>
-          </a:p>
-          <a:p>
-            <a:r>
-              <a:rPr lang="es-CO" b="1" dirty="0"/>
-              <a:t>En resumen:</a:t>
-            </a:r>
-          </a:p>
-          <a:p>
-            <a:pPr marL="0" marR="0" lvl="0" indent="0" algn="l" defTabSz="914400" rtl="0" eaLnBrk="1" fontAlgn="auto" latinLnBrk="0" hangingPunct="1">
-              <a:lnSpc>
-                <a:spcPct val="100000"/>
-              </a:lnSpc>
-              <a:spcBef>
-                <a:spcPts val="0"/>
-              </a:spcBef>
-              <a:spcAft>
-                <a:spcPts val="0"/>
-              </a:spcAft>
-              <a:buClrTx/>
-              <a:buSzTx/>
-              <a:buFontTx/>
-              <a:buNone/>
-              <a:tabLst/>
-              <a:defRPr/>
-            </a:pPr>
-            <a:r>
-              <a:rPr lang="es-CO" dirty="0"/>
-              <a:t>En el Modelo IaaS, ¿Qué gestionas tú? El Sistema operativo, y las apps, ¿Qué gestiona el proveedor? El Hardware, la red, y el almacenamiento.</a:t>
-            </a:r>
-          </a:p>
-          <a:p>
-            <a:endParaRPr lang="es-CO" dirty="0"/>
-          </a:p>
-          <a:p>
-            <a:pPr marL="0" marR="0" lvl="0" indent="0" algn="l" defTabSz="914400" rtl="0" eaLnBrk="1" fontAlgn="auto" latinLnBrk="0" hangingPunct="1">
-              <a:lnSpc>
-                <a:spcPct val="100000"/>
-              </a:lnSpc>
-              <a:spcBef>
-                <a:spcPts val="0"/>
-              </a:spcBef>
-              <a:spcAft>
-                <a:spcPts val="0"/>
-              </a:spcAft>
-              <a:buClrTx/>
-              <a:buSzTx/>
-              <a:buFontTx/>
-              <a:buNone/>
-              <a:tabLst/>
-              <a:defRPr/>
-            </a:pPr>
-            <a:r>
-              <a:rPr lang="es-CO" dirty="0"/>
-              <a:t>En el Modelo PaaS, ¿Qué gestionas tú? El Código, y los datos, ¿Qué gestiona el proveedor? La Infraestructura, el Sistema Operativo, y la plataforma base.</a:t>
-            </a:r>
-          </a:p>
-          <a:p>
-            <a:pPr marL="0" marR="0" lvl="0" indent="0" algn="l" defTabSz="914400" rtl="0" eaLnBrk="1" fontAlgn="auto" latinLnBrk="0" hangingPunct="1">
-              <a:lnSpc>
-                <a:spcPct val="100000"/>
-              </a:lnSpc>
-              <a:spcBef>
-                <a:spcPts val="0"/>
-              </a:spcBef>
-              <a:spcAft>
-                <a:spcPts val="0"/>
-              </a:spcAft>
-              <a:buClrTx/>
-              <a:buSzTx/>
-              <a:buFontTx/>
-              <a:buNone/>
-              <a:tabLst/>
-              <a:defRPr/>
-            </a:pPr>
-            <a:endParaRPr lang="es-CO" dirty="0"/>
-          </a:p>
-          <a:p>
-            <a:pPr marL="0" marR="0" lvl="0" indent="0" algn="l" defTabSz="914400" rtl="0" eaLnBrk="1" fontAlgn="auto" latinLnBrk="0" hangingPunct="1">
-              <a:lnSpc>
-                <a:spcPct val="100000"/>
-              </a:lnSpc>
-              <a:spcBef>
-                <a:spcPts val="0"/>
-              </a:spcBef>
-              <a:spcAft>
-                <a:spcPts val="0"/>
-              </a:spcAft>
-              <a:buClrTx/>
-              <a:buSzTx/>
-              <a:buFontTx/>
-              <a:buNone/>
-              <a:tabLst/>
-              <a:defRPr/>
-            </a:pPr>
-            <a:r>
-              <a:rPr lang="es-CO" dirty="0"/>
-              <a:t>En el Modelo SaaS, ¿Qué gestionas tú? Solo el uso del software, ¿Qué gestiona el proveedor? Todo lo demás.</a:t>
-            </a:r>
-          </a:p>
-          <a:p>
-            <a:endParaRPr lang="es-CO" dirty="0"/>
-          </a:p>
-          <a:p>
-            <a:r>
-              <a:rPr lang="es-CO" dirty="0"/>
-              <a:t>Comprender estos modelos te permite elegir la </a:t>
-            </a:r>
-            <a:r>
-              <a:rPr lang="es-CO" b="1" dirty="0"/>
-              <a:t>mejor solución según el proyecto</a:t>
-            </a:r>
-            <a:r>
-              <a:rPr lang="es-CO" dirty="0"/>
-              <a:t>, el presupuesto y el nivel de control que necesitas.</a:t>
-            </a:r>
-          </a:p>
-          <a:p>
-            <a:endParaRPr lang="es-CO" dirty="0"/>
-          </a:p>
-        </p:txBody>
-      </p:sp>
-      <p:sp>
-        <p:nvSpPr>
-          <p:cNvPr id="4" name="Slide Number Placeholder 3"/>
-          <p:cNvSpPr>
-            <a:spLocks noGrp="1"/>
-          </p:cNvSpPr>
-          <p:nvPr>
-            <p:ph type="sldNum" sz="quarter" idx="5"/>
-          </p:nvPr>
-        </p:nvSpPr>
-        <p:spPr/>
-        <p:txBody>
-          <a:bodyPr/>
-          <a:lstStyle/>
-          <a:p>
-            <a:fld id="{3461A6AF-5C91-4279-A2A9-5DA981759015}" type="slidenum">
-              <a:rPr lang="es-CO" smtClean="0"/>
-              <a:pPr/>
-              <a:t>4</a:t>
-            </a:fld>
-            <a:endParaRPr lang="es-CO" dirty="0"/>
-          </a:p>
-        </p:txBody>
-      </p:sp>
-    </p:spTree>
-    <p:extLst>
-      <p:ext uri="{BB962C8B-B14F-4D97-AF65-F5344CB8AC3E}">
-        <p14:creationId xmlns:p14="http://schemas.microsoft.com/office/powerpoint/2010/main" val="3078387499"/>
-      </p:ext>
-    </p:extLst>
-  </p:cSld>
-  <p:clrMapOvr>
-    <a:masterClrMapping/>
-  </p:clrMapOvr>
-</p:notes>
-</file>
-
-<file path=ppt/notesSlides/notesSlide5.xml><?xml version="1.0" encoding="utf-8"?>
-<p:notes xmlns:a="http://schemas.openxmlformats.org/drawingml/2006/main" xmlns:r="http://schemas.openxmlformats.org/officeDocument/2006/relationships" xmlns:p="http://schemas.openxmlformats.org/presentationml/2006/main">
-  <p:cSld>
-    <p:spTree>
-      <p:nvGrpSpPr>
-        <p:cNvPr id="1" name=""/>
-        <p:cNvGrpSpPr/>
-        <p:nvPr/>
-      </p:nvGrpSpPr>
-      <p:grpSpPr>
-        <a:xfrm>
-          <a:off x="0" y="0"/>
-          <a:ext cx="0" cy="0"/>
-          <a:chOff x="0" y="0"/>
-          <a:chExt cx="0" cy="0"/>
-        </a:xfrm>
-      </p:grpSpPr>
-      <p:sp>
-        <p:nvSpPr>
-          <p:cNvPr id="2" name="Slide Image Placeholder 1"/>
-          <p:cNvSpPr>
-            <a:spLocks noGrp="1" noRot="1" noChangeAspect="1"/>
-          </p:cNvSpPr>
-          <p:nvPr>
-            <p:ph type="sldImg"/>
-          </p:nvPr>
-        </p:nvSpPr>
-        <p:spPr/>
-      </p:sp>
-      <p:sp>
-        <p:nvSpPr>
-          <p:cNvPr id="3" name="Notes Placeholder 2"/>
-          <p:cNvSpPr>
-            <a:spLocks noGrp="1"/>
-          </p:cNvSpPr>
-          <p:nvPr>
-            <p:ph type="body" idx="1"/>
-          </p:nvPr>
-        </p:nvSpPr>
-        <p:spPr/>
-        <p:txBody>
-          <a:bodyPr>
-            <a:normAutofit fontScale="92500" lnSpcReduction="20000"/>
-          </a:bodyPr>
-          <a:lstStyle/>
-          <a:p>
-            <a:r>
-              <a:rPr lang="es-CO" noProof="0" dirty="0"/>
-              <a:t>Veamos ahora un poco mas en detalle estos modelos, comparándolos con el modelo </a:t>
-            </a:r>
-            <a:r>
-              <a:rPr lang="es-CO" noProof="0" dirty="0" err="1"/>
-              <a:t>On</a:t>
-            </a:r>
-            <a:r>
-              <a:rPr lang="es-CO" noProof="0" dirty="0"/>
-              <a:t>-Premise, que es lo que la mayoría de las empresas cuentan, antes de pensar en pasarse a la nube o antes de comenzar a utilizar servicios de Cloud Computing.</a:t>
-            </a:r>
-          </a:p>
-          <a:p>
-            <a:endParaRPr lang="es-CO" noProof="0" dirty="0"/>
-          </a:p>
-          <a:p>
-            <a:r>
-              <a:rPr lang="es-CO" noProof="0" dirty="0"/>
-              <a:t>En el Modelo </a:t>
-            </a:r>
-            <a:r>
-              <a:rPr lang="es-CO" noProof="0" dirty="0" err="1"/>
-              <a:t>On</a:t>
-            </a:r>
-            <a:r>
-              <a:rPr lang="es-CO" noProof="0" dirty="0"/>
-              <a:t>-Premise, se tienen físicamente los servidores en un Data-Center al cual , el administrador del sistema, puede acceder y tener el control de todo, maquina, recursos y aplicaciones.</a:t>
-            </a:r>
-          </a:p>
-          <a:p>
-            <a:endParaRPr lang="es-CO" noProof="0" dirty="0"/>
-          </a:p>
-          <a:p>
-            <a:r>
-              <a:rPr lang="es-CO" noProof="0" dirty="0"/>
-              <a:t>En el modelo </a:t>
-            </a:r>
-            <a:r>
-              <a:rPr lang="es-CO" noProof="0" dirty="0" err="1"/>
-              <a:t>Infrastructure</a:t>
-            </a:r>
-            <a:r>
-              <a:rPr lang="es-CO" noProof="0" dirty="0"/>
-              <a:t> as a </a:t>
-            </a:r>
-            <a:r>
-              <a:rPr lang="es-CO" noProof="0" dirty="0" err="1"/>
-              <a:t>Service</a:t>
-            </a:r>
-            <a:r>
-              <a:rPr lang="es-CO" noProof="0" dirty="0"/>
-              <a:t> (IaaS), el administrador del sistema solo tiene acceso remoto a las maquinas, para instalar el sistema operativo, definir la configuración, copiar los datos e instalar las aplicaciones que requiera; en cambio el proveedor de servicios es el encargado de crear la maquina física, mediante la virtualización, definir el tipo de disco duro, la memoria y define la red a donde puede ser conectada la maquina.</a:t>
-            </a:r>
-          </a:p>
-          <a:p>
-            <a:endParaRPr lang="es-CO" noProof="0" dirty="0"/>
-          </a:p>
-          <a:p>
-            <a:r>
-              <a:rPr lang="es-CO" noProof="0" dirty="0"/>
-              <a:t>En el Modelo </a:t>
-            </a:r>
-            <a:r>
-              <a:rPr lang="es-CO" noProof="0" dirty="0" err="1"/>
-              <a:t>Platform</a:t>
-            </a:r>
-            <a:r>
-              <a:rPr lang="es-CO" noProof="0" dirty="0"/>
-              <a:t> as a </a:t>
-            </a:r>
-            <a:r>
-              <a:rPr lang="es-CO" noProof="0" dirty="0" err="1"/>
-              <a:t>Service</a:t>
-            </a:r>
-            <a:r>
-              <a:rPr lang="es-CO" noProof="0" dirty="0"/>
-              <a:t> (PaaS), el administrador del sistema , Solo puede instalar la aplicación y definir sus datos, mediante un acceso remoto en la plataforma de la nube, mientras que el proveedor servicios se encarga de administrar la maquina físicamente asignando los recursos de memoria, procesador, sistema operativo y configuración de la red, </a:t>
-            </a:r>
-          </a:p>
-          <a:p>
-            <a:endParaRPr lang="es-CO" noProof="0" dirty="0"/>
-          </a:p>
-          <a:p>
-            <a:r>
-              <a:rPr lang="es-CO" noProof="0" dirty="0"/>
-              <a:t>Y Por último, en el modelo de software as a </a:t>
-            </a:r>
-            <a:r>
-              <a:rPr lang="es-CO" noProof="0" dirty="0" err="1"/>
-              <a:t>Service</a:t>
-            </a:r>
-            <a:r>
-              <a:rPr lang="es-CO" noProof="0" dirty="0"/>
-              <a:t> (SaaS) , el administrador del sistema solo puede hacer uso de la aplicación y de los datos, pero es el proveedor de servicios de nube que se encarga de crear la maquina, definir los recursos de, memoria, almacenamiento, procesador, sistema operativo, configuración de red, además de instalar y configura la aplicación.</a:t>
-            </a:r>
-          </a:p>
-          <a:p>
-            <a:endParaRPr lang="es-CO" noProof="0" dirty="0"/>
-          </a:p>
-          <a:p>
-            <a:r>
-              <a:rPr lang="es-CO" noProof="0" dirty="0"/>
-              <a:t>Podemos ver que a medida que avanzamos, menos responsabilidad tiene el administrador del sistema, y mayor alcance tiene el proveedor de servicios de la nube, lo que cambia, es que el administrador del sistema debe estar pendiente del uso de la aplicación y de la administración de los datos de la misma.</a:t>
-            </a:r>
-          </a:p>
-          <a:p>
-            <a:endParaRPr lang="es-CO" noProof="0" dirty="0"/>
-          </a:p>
-          <a:p>
-            <a:endParaRPr lang="es-CO" noProof="0" dirty="0"/>
-          </a:p>
-        </p:txBody>
-      </p:sp>
-      <p:sp>
-        <p:nvSpPr>
-          <p:cNvPr id="4" name="Slide Number Placeholder 3"/>
-          <p:cNvSpPr>
-            <a:spLocks noGrp="1"/>
-          </p:cNvSpPr>
-          <p:nvPr>
-            <p:ph type="sldNum" sz="quarter" idx="10"/>
-          </p:nvPr>
-        </p:nvSpPr>
-        <p:spPr/>
-        <p:txBody>
-          <a:bodyPr/>
-          <a:lstStyle/>
-          <a:p>
-            <a:fld id="{3461A6AF-5C91-4279-A2A9-5DA981759015}" type="slidenum">
-              <a:rPr lang="es-CO" smtClean="0"/>
-              <a:pPr/>
-              <a:t>5</a:t>
-            </a:fld>
-            <a:endParaRPr lang="es-CO" dirty="0"/>
-          </a:p>
-        </p:txBody>
-      </p:sp>
-    </p:spTree>
-    <p:extLst>
-      <p:ext uri="{BB962C8B-B14F-4D97-AF65-F5344CB8AC3E}">
-        <p14:creationId xmlns:p14="http://schemas.microsoft.com/office/powerpoint/2010/main" val="612879495"/>
-      </p:ext>
-    </p:extLst>
-  </p:cSld>
-  <p:clrMapOvr>
-    <a:masterClrMapping/>
-  </p:clrMapOvr>
-</p:notes>
-</file>
-
-<file path=ppt/notesSlides/notesSlide6.xml><?xml version="1.0" encoding="utf-8"?>
-<p:notes xmlns:a="http://schemas.openxmlformats.org/drawingml/2006/main" xmlns:r="http://schemas.openxmlformats.org/officeDocument/2006/relationships" xmlns:p="http://schemas.openxmlformats.org/presentationml/2006/main">
-  <p:cSld>
-    <p:spTree>
-      <p:nvGrpSpPr>
-        <p:cNvPr id="1" name=""/>
-        <p:cNvGrpSpPr/>
-        <p:nvPr/>
-      </p:nvGrpSpPr>
-      <p:grpSpPr>
-        <a:xfrm>
-          <a:off x="0" y="0"/>
-          <a:ext cx="0" cy="0"/>
-          <a:chOff x="0" y="0"/>
-          <a:chExt cx="0" cy="0"/>
-        </a:xfrm>
-      </p:grpSpPr>
-      <p:sp>
-        <p:nvSpPr>
-          <p:cNvPr id="2" name="Slide Image Placeholder 1"/>
-          <p:cNvSpPr>
-            <a:spLocks noGrp="1" noRot="1" noChangeAspect="1"/>
-          </p:cNvSpPr>
-          <p:nvPr>
-            <p:ph type="sldImg"/>
-          </p:nvPr>
-        </p:nvSpPr>
-        <p:spPr/>
-      </p:sp>
-      <p:sp>
-        <p:nvSpPr>
-          <p:cNvPr id="3" name="Notes Placeholder 2"/>
-          <p:cNvSpPr>
-            <a:spLocks noGrp="1"/>
-          </p:cNvSpPr>
-          <p:nvPr>
-            <p:ph type="body" idx="1"/>
-          </p:nvPr>
-        </p:nvSpPr>
-        <p:spPr/>
-        <p:txBody>
-          <a:bodyPr>
-            <a:normAutofit lnSpcReduction="10000"/>
-          </a:bodyPr>
-          <a:lstStyle/>
-          <a:p>
-            <a:r>
-              <a:rPr lang="es-CO" dirty="0"/>
-              <a:t>Para aterrizar mejor las diferencias entre los modelos, vamos a utilizar el ejemplo de Pizza como Servicio.</a:t>
-            </a:r>
-          </a:p>
-          <a:p>
-            <a:r>
-              <a:rPr lang="es-CO" dirty="0"/>
-              <a:t>Nuestro modelo </a:t>
-            </a:r>
-            <a:r>
-              <a:rPr lang="es-CO" dirty="0" err="1"/>
-              <a:t>On</a:t>
-            </a:r>
-            <a:r>
-              <a:rPr lang="es-CO" dirty="0"/>
-              <a:t>-Premise o Tradicional, es como la pizza Casera, ya que somos nosotros los encargados de todo, de seleccionar los recursos o ingredientes, prepararlos, utilizar el Horno y utensilios, por último servirlos en el comedor y utilizar los cubiertos para comer el producto final.</a:t>
-            </a:r>
-          </a:p>
-          <a:p>
-            <a:endParaRPr lang="es-CO" dirty="0"/>
-          </a:p>
-          <a:p>
-            <a:r>
-              <a:rPr lang="es-CO" dirty="0"/>
-              <a:t>En el modelo Infraestructura como Servicio, es como la piza congelada,  ya tenemos </a:t>
-            </a:r>
-            <a:r>
-              <a:rPr lang="es-CO" dirty="0" err="1"/>
-              <a:t>pre-configurados</a:t>
-            </a:r>
-            <a:r>
-              <a:rPr lang="es-CO" dirty="0"/>
-              <a:t> los ingredientes, y lo que utilizaremos será el horno, el comedor y cubiertos para comer el producto final.</a:t>
-            </a:r>
-          </a:p>
-          <a:p>
-            <a:endParaRPr lang="es-CO" dirty="0"/>
-          </a:p>
-          <a:p>
-            <a:r>
-              <a:rPr lang="es-CO" dirty="0"/>
-              <a:t>En el modelos Plataforma como Servicio, es como pedir a domicilio, solo recibimos el producto final y solo utilizamos el comedor y los cubiertos para comer el producto final.</a:t>
-            </a:r>
-          </a:p>
-          <a:p>
-            <a:endParaRPr lang="es-CO" dirty="0"/>
-          </a:p>
-          <a:p>
-            <a:r>
-              <a:rPr lang="es-CO" dirty="0"/>
-              <a:t>Y por último en el modelo Software como Servicio, es como salir a comer por fuera en un restaurante, el proveedor selecciona los ingredientes utiliza los recursos, como el horno, la electricidad o el gas, prepara el producto final y lo sirve en el comedor y brinda los cubiertos, lo único que vamos a hacer es ir a consumir el producto final.</a:t>
-            </a:r>
-          </a:p>
-          <a:p>
-            <a:endParaRPr lang="es-CO" dirty="0"/>
-          </a:p>
-          <a:p>
-            <a:r>
-              <a:rPr lang="es-CO" dirty="0"/>
-              <a:t>Con este ejemplo podemos clarificar la diferencia entre los 3 modelos principales, aunque pueden haber variaciones, el sentido sigue siendo el mismo a medida que avanzamos, menos interacción con los recursos físicos vamos a tener y mayor consumo del producto final tenemos.</a:t>
-            </a:r>
-          </a:p>
-          <a:p>
-            <a:endParaRPr lang="es-CO" dirty="0"/>
-          </a:p>
-        </p:txBody>
-      </p:sp>
-      <p:sp>
-        <p:nvSpPr>
-          <p:cNvPr id="4" name="Slide Number Placeholder 3"/>
-          <p:cNvSpPr>
-            <a:spLocks noGrp="1"/>
-          </p:cNvSpPr>
-          <p:nvPr>
-            <p:ph type="sldNum" sz="quarter" idx="5"/>
-          </p:nvPr>
-        </p:nvSpPr>
-        <p:spPr/>
-        <p:txBody>
-          <a:bodyPr/>
-          <a:lstStyle/>
-          <a:p>
-            <a:fld id="{3461A6AF-5C91-4279-A2A9-5DA981759015}" type="slidenum">
-              <a:rPr lang="es-CO" smtClean="0"/>
-              <a:pPr/>
-              <a:t>6</a:t>
-            </a:fld>
-            <a:endParaRPr lang="es-CO" dirty="0"/>
-          </a:p>
-        </p:txBody>
-      </p:sp>
-    </p:spTree>
-    <p:extLst>
-      <p:ext uri="{BB962C8B-B14F-4D97-AF65-F5344CB8AC3E}">
-        <p14:creationId xmlns:p14="http://schemas.microsoft.com/office/powerpoint/2010/main" val="2440142681"/>
-      </p:ext>
-    </p:extLst>
-  </p:cSld>
-  <p:clrMapOvr>
-    <a:masterClrMapping/>
-  </p:clrMapOvr>
-</p:notes>
-</file>
-
-<file path=ppt/notesSlides/notesSlide7.xml><?xml version="1.0" encoding="utf-8"?>
-<p:notes xmlns:a="http://schemas.openxmlformats.org/drawingml/2006/main" xmlns:r="http://schemas.openxmlformats.org/officeDocument/2006/relationships" xmlns:p="http://schemas.openxmlformats.org/presentationml/2006/main">
-  <p:cSld>
-    <p:spTree>
-      <p:nvGrpSpPr>
-        <p:cNvPr id="1" name=""/>
-        <p:cNvGrpSpPr/>
-        <p:nvPr/>
-      </p:nvGrpSpPr>
-      <p:grpSpPr>
-        <a:xfrm>
-          <a:off x="0" y="0"/>
-          <a:ext cx="0" cy="0"/>
-          <a:chOff x="0" y="0"/>
-          <a:chExt cx="0" cy="0"/>
-        </a:xfrm>
-      </p:grpSpPr>
-      <p:sp>
-        <p:nvSpPr>
-          <p:cNvPr id="2" name="Slide Image Placeholder 1"/>
-          <p:cNvSpPr>
-            <a:spLocks noGrp="1" noRot="1" noChangeAspect="1"/>
-          </p:cNvSpPr>
-          <p:nvPr>
-            <p:ph type="sldImg"/>
-          </p:nvPr>
-        </p:nvSpPr>
-        <p:spPr/>
-      </p:sp>
-      <p:sp>
-        <p:nvSpPr>
-          <p:cNvPr id="3" name="Notes Placeholder 2"/>
-          <p:cNvSpPr>
-            <a:spLocks noGrp="1"/>
-          </p:cNvSpPr>
-          <p:nvPr>
-            <p:ph type="body" idx="1"/>
-          </p:nvPr>
-        </p:nvSpPr>
-        <p:spPr/>
-        <p:txBody>
-          <a:bodyPr>
-            <a:normAutofit fontScale="55000" lnSpcReduction="20000"/>
-          </a:bodyPr>
-          <a:lstStyle/>
-          <a:p>
-            <a:r>
-              <a:rPr lang="es-CO" sz="1200" b="0" i="0" kern="1200" dirty="0">
+              <a:rPr lang="en-US" sz="1200" b="0" i="0" kern="1200" dirty="0" smtClean="0">
                 <a:solidFill>
                   <a:schemeClr val="tx1"/>
                 </a:solidFill>
@@ -2009,25 +822,11 @@
                 <a:ea typeface="+mn-ea"/>
                 <a:cs typeface="+mn-cs"/>
               </a:rPr>
-              <a:t>Veamos ahora los principales beneficios de la computación en la nube.</a:t>
-            </a:r>
-          </a:p>
-          <a:p>
-            <a:r>
-              <a:rPr lang="es-CO" sz="1200" b="0" i="0" kern="1200" dirty="0">
-                <a:solidFill>
-                  <a:schemeClr val="tx1"/>
-                </a:solidFill>
-                <a:effectLst/>
-                <a:latin typeface="+mn-lt"/>
-                <a:ea typeface="+mn-ea"/>
-                <a:cs typeface="+mn-cs"/>
-              </a:rPr>
-              <a:t>La computación en la nube supone un gran cambio respecto a la forma tradicional en que las empresas conciben los recursos de Tecnología. </a:t>
-            </a:r>
-          </a:p>
-          <a:p>
-            <a:endParaRPr lang="es-CO" sz="1200" b="0" i="0" kern="1200" dirty="0">
+              <a:t>https://azure.microsoft.com/en-us/overview/what-is-cloud-computing/#benefits</a:t>
+            </a:r>
+          </a:p>
+          <a:p>
+            <a:endParaRPr lang="en-US" sz="1200" b="0" i="0" kern="1200" dirty="0" smtClean="0">
               <a:solidFill>
                 <a:schemeClr val="tx1"/>
               </a:solidFill>
@@ -2039,7 +838,7 @@
           </a:p>
           <a:p>
             <a:r>
-              <a:rPr lang="es-CO" sz="1200" b="0" i="0" kern="1200" dirty="0">
+              <a:rPr lang="en-US" sz="1200" b="1" i="0" kern="1200" dirty="0" err="1" smtClean="0">
                 <a:solidFill>
                   <a:schemeClr val="tx1"/>
                 </a:solidFill>
@@ -2048,11 +847,9 @@
                 <a:ea typeface="+mn-ea"/>
                 <a:cs typeface="+mn-cs"/>
               </a:rPr>
-              <a:t>A continuación, se presentan siete razones comunes por las que las organizaciones recurren a los servicios de computación en la nube:</a:t>
-            </a:r>
-          </a:p>
-          <a:p>
-            <a:endParaRPr lang="en-US" sz="1200" b="0" i="0" kern="1200" dirty="0">
+              <a:t>Costos</a:t>
+            </a:r>
+            <a:endParaRPr lang="en-US" sz="1200" b="1" i="0" kern="1200" dirty="0" smtClean="0">
               <a:solidFill>
                 <a:schemeClr val="tx1"/>
               </a:solidFill>
@@ -2064,7 +861,7 @@
           </a:p>
           <a:p>
             <a:r>
-              <a:rPr lang="en-US" sz="1200" b="1" i="0" kern="1200" dirty="0" err="1">
+              <a:rPr lang="es-CO" sz="1200" b="0" i="0" kern="1200" dirty="0" smtClean="0">
                 <a:solidFill>
                   <a:schemeClr val="tx1"/>
                 </a:solidFill>
@@ -2073,9 +870,11 @@
                 <a:ea typeface="+mn-ea"/>
                 <a:cs typeface="+mn-cs"/>
               </a:rPr>
-              <a:t>Costos</a:t>
-            </a:r>
-            <a:endParaRPr lang="en-US" sz="1200" b="1" i="0" kern="1200" dirty="0">
+              <a:t>La computación en la nube elimina el gasto de capital de comprar hardware y software y configurar y ejecutar centros de datos en el sitio: los bastidores de servidores, la electricidad las 24 horas para energía y refrigeración, y los expertos en TI para administrar la infraestructura. Se suma rápido.</a:t>
+            </a:r>
+          </a:p>
+          <a:p>
+            <a:endParaRPr lang="es-CO" sz="1200" b="0" i="0" kern="1200" dirty="0" smtClean="0">
               <a:solidFill>
                 <a:schemeClr val="tx1"/>
               </a:solidFill>
@@ -2087,7 +886,7 @@
           </a:p>
           <a:p>
             <a:r>
-              <a:rPr lang="es-CO" sz="1200" b="0" i="0" kern="1200" dirty="0">
+              <a:rPr lang="en-US" sz="1200" b="1" i="0" kern="1200" dirty="0" err="1" smtClean="0">
                 <a:solidFill>
                   <a:schemeClr val="tx1"/>
                 </a:solidFill>
@@ -2096,11 +895,9 @@
                 <a:ea typeface="+mn-ea"/>
                 <a:cs typeface="+mn-cs"/>
               </a:rPr>
-              <a:t>La computación en la nube elimina el gasto de capital de comprar hardware y software y configurar y ejecutar centros de datos en el sitio: los bastidores de servidores, la electricidad las 24 horas para energía y refrigeración, y los expertos en TI para administrar la infraestructura. Se suma rápido.</a:t>
-            </a:r>
-          </a:p>
-          <a:p>
-            <a:endParaRPr lang="es-CO" sz="1200" b="0" i="0" kern="1200" dirty="0">
+              <a:t>Velocidad</a:t>
+            </a:r>
+            <a:endParaRPr lang="en-US" sz="1200" b="1" i="0" kern="1200" dirty="0" smtClean="0">
               <a:solidFill>
                 <a:schemeClr val="tx1"/>
               </a:solidFill>
@@ -2112,7 +909,7 @@
           </a:p>
           <a:p>
             <a:r>
-              <a:rPr lang="en-US" sz="1200" b="1" i="0" kern="1200" dirty="0" err="1">
+              <a:rPr lang="es-CO" sz="1200" b="0" i="0" kern="1200" dirty="0" smtClean="0">
                 <a:solidFill>
                   <a:schemeClr val="tx1"/>
                 </a:solidFill>
@@ -2121,9 +918,11 @@
                 <a:ea typeface="+mn-ea"/>
                 <a:cs typeface="+mn-cs"/>
               </a:rPr>
-              <a:t>Velocidad</a:t>
-            </a:r>
-            <a:endParaRPr lang="en-US" sz="1200" b="1" i="0" kern="1200" dirty="0">
+              <a:t>La mayoría de los servicios de computación en la nube se brindan en autoservicio y bajo demanda, por lo que incluso grandes cantidades de recursos informáticos se pueden aprovisionar en minutos, generalmente con solo unos pocos clics del mouse, brindando a las empresas mucha flexibilidad y eliminando la presión de la planificación de la capacidad.</a:t>
+            </a:r>
+          </a:p>
+          <a:p>
+            <a:endParaRPr lang="es-CO" sz="1200" b="0" i="0" kern="1200" dirty="0" smtClean="0">
               <a:solidFill>
                 <a:schemeClr val="tx1"/>
               </a:solidFill>
@@ -2135,7 +934,7 @@
           </a:p>
           <a:p>
             <a:r>
-              <a:rPr lang="es-CO" sz="1200" b="0" i="0" kern="1200" dirty="0">
+              <a:rPr lang="en-US" sz="1200" b="1" i="0" kern="1200" dirty="0" err="1" smtClean="0">
                 <a:solidFill>
                   <a:schemeClr val="tx1"/>
                 </a:solidFill>
@@ -2144,11 +943,9 @@
                 <a:ea typeface="+mn-ea"/>
                 <a:cs typeface="+mn-cs"/>
               </a:rPr>
-              <a:t>La mayoría de los servicios de computación en la nube se brindan en autoservicio y bajo demanda, por lo que incluso grandes cantidades de recursos informáticos se pueden aprovisionar en minutos, generalmente con solo unos pocos clics del mouse, brindando a las empresas mucha flexibilidad y eliminando la presión de la planificación de la capacidad.</a:t>
-            </a:r>
-          </a:p>
-          <a:p>
-            <a:endParaRPr lang="es-CO" sz="1200" b="0" i="0" kern="1200" dirty="0">
+              <a:t>Escalamiento</a:t>
+            </a:r>
+            <a:endParaRPr lang="en-US" sz="1200" b="1" i="0" kern="1200" dirty="0" smtClean="0">
               <a:solidFill>
                 <a:schemeClr val="tx1"/>
               </a:solidFill>
@@ -2160,7 +957,7 @@
           </a:p>
           <a:p>
             <a:r>
-              <a:rPr lang="en-US" sz="1200" b="1" i="0" kern="1200" dirty="0" err="1">
+              <a:rPr lang="es-CO" sz="1200" b="0" i="0" kern="1200" dirty="0" smtClean="0">
                 <a:solidFill>
                   <a:schemeClr val="tx1"/>
                 </a:solidFill>
@@ -2169,9 +966,11 @@
                 <a:ea typeface="+mn-ea"/>
                 <a:cs typeface="+mn-cs"/>
               </a:rPr>
-              <a:t>Escalamiento</a:t>
-            </a:r>
-            <a:endParaRPr lang="en-US" sz="1200" b="1" i="0" kern="1200" dirty="0">
+              <a:t>Los beneficios de los servicios de computación en la nube incluyen la capacidad de escalar de manera elástica. En el lenguaje de la nube, eso significa entregar la cantidad correcta de recursos de TI, por ejemplo, más o menos poder de cómputo, almacenamiento, ancho de banda, justo cuando se necesitan y desde la ubicación geográfica correcta.</a:t>
+            </a:r>
+          </a:p>
+          <a:p>
+            <a:endParaRPr lang="es-CO" sz="1200" b="0" i="0" kern="1200" dirty="0" smtClean="0">
               <a:solidFill>
                 <a:schemeClr val="tx1"/>
               </a:solidFill>
@@ -2183,7 +982,7 @@
           </a:p>
           <a:p>
             <a:r>
-              <a:rPr lang="es-CO" sz="1200" b="0" i="0" kern="1200" dirty="0">
+              <a:rPr lang="en-US" sz="1200" b="1" i="0" kern="1200" dirty="0" err="1" smtClean="0">
                 <a:solidFill>
                   <a:schemeClr val="tx1"/>
                 </a:solidFill>
@@ -2192,11 +991,9 @@
                 <a:ea typeface="+mn-ea"/>
                 <a:cs typeface="+mn-cs"/>
               </a:rPr>
-              <a:t>Los beneficios de los servicios de computación en la nube incluyen la capacidad de escalar de manera elástica. En el lenguaje de la nube, eso significa entregar la cantidad correcta de recursos de TI, por ejemplo, más o menos poder de cómputo, almacenamiento, ancho de banda, justo cuando se necesitan y desde la ubicación geográfica correcta.</a:t>
-            </a:r>
-          </a:p>
-          <a:p>
-            <a:endParaRPr lang="es-CO" sz="1200" b="0" i="0" kern="1200" dirty="0">
+              <a:t>Productividad</a:t>
+            </a:r>
+            <a:endParaRPr lang="en-US" sz="1200" b="1" i="0" kern="1200" dirty="0" smtClean="0">
               <a:solidFill>
                 <a:schemeClr val="tx1"/>
               </a:solidFill>
@@ -2208,7 +1005,7 @@
           </a:p>
           <a:p>
             <a:r>
-              <a:rPr lang="en-US" sz="1200" b="1" i="0" kern="1200" dirty="0" err="1">
+              <a:rPr lang="es-CO" sz="1200" b="0" i="0" kern="1200" dirty="0" smtClean="0">
                 <a:solidFill>
                   <a:schemeClr val="tx1"/>
                 </a:solidFill>
@@ -2217,9 +1014,11 @@
                 <a:ea typeface="+mn-ea"/>
                 <a:cs typeface="+mn-cs"/>
               </a:rPr>
-              <a:t>Productividad</a:t>
-            </a:r>
-            <a:endParaRPr lang="en-US" sz="1200" b="1" i="0" kern="1200" dirty="0">
+              <a:t>Los centros de datos en el sitio generalmente requieren una gran cantidad de "estantería y apilamiento": configuración de hardware, parches de software y otras tareas de administración de TI que consumen mucho tiempo. La computación en la nube elimina la necesidad de muchas de estas tareas, por lo que los equipos de TI pueden dedicar tiempo a lograr objetivos comerciales más importantes.</a:t>
+            </a:r>
+          </a:p>
+          <a:p>
+            <a:endParaRPr lang="es-CO" sz="1200" b="0" i="0" kern="1200" dirty="0" smtClean="0">
               <a:solidFill>
                 <a:schemeClr val="tx1"/>
               </a:solidFill>
@@ -2231,7 +1030,7 @@
           </a:p>
           <a:p>
             <a:r>
-              <a:rPr lang="es-CO" sz="1200" b="0" i="0" kern="1200" dirty="0">
+              <a:rPr lang="en-US" sz="1200" b="1" i="0" kern="1200" dirty="0" err="1" smtClean="0">
                 <a:solidFill>
                   <a:schemeClr val="tx1"/>
                 </a:solidFill>
@@ -2240,11 +1039,9 @@
                 <a:ea typeface="+mn-ea"/>
                 <a:cs typeface="+mn-cs"/>
               </a:rPr>
-              <a:t>Los centros de datos en el sitio generalmente requieren una gran cantidad de "estantería y apilamiento": configuración de hardware, parches de software y otras tareas de administración de TI que consumen mucho tiempo. La computación en la nube elimina la necesidad de muchas de estas tareas, por lo que los equipos de TI pueden dedicar tiempo a lograr objetivos comerciales más importantes.</a:t>
-            </a:r>
-          </a:p>
-          <a:p>
-            <a:endParaRPr lang="es-CO" sz="1200" b="0" i="0" kern="1200" dirty="0">
+              <a:t>Rendimiento</a:t>
+            </a:r>
+            <a:endParaRPr lang="en-US" sz="1200" b="1" i="0" kern="1200" dirty="0" smtClean="0">
               <a:solidFill>
                 <a:schemeClr val="tx1"/>
               </a:solidFill>
@@ -2256,7 +1053,7 @@
           </a:p>
           <a:p>
             <a:r>
-              <a:rPr lang="en-US" sz="1200" b="1" i="0" kern="1200" dirty="0" err="1">
+              <a:rPr lang="es-CO" sz="1200" b="0" i="0" kern="1200" dirty="0" smtClean="0">
                 <a:solidFill>
                   <a:schemeClr val="tx1"/>
                 </a:solidFill>
@@ -2265,9 +1062,11 @@
                 <a:ea typeface="+mn-ea"/>
                 <a:cs typeface="+mn-cs"/>
               </a:rPr>
-              <a:t>Rendimiento</a:t>
-            </a:r>
-            <a:endParaRPr lang="en-US" sz="1200" b="1" i="0" kern="1200" dirty="0">
+              <a:t>Los mayores servicios de computación en la nube se ejecutan en una red mundial de centros de datos seguros, que se actualizan regularmente a la última generación de hardware informático rápido y eficiente. Esto ofrece varios beneficios sobre un solo centro de datos corporativo, incluida una latencia de red reducida para aplicaciones y mayores economías de escala.</a:t>
+            </a:r>
+          </a:p>
+          <a:p>
+            <a:endParaRPr lang="es-CO" sz="1200" b="0" i="0" kern="1200" dirty="0" smtClean="0">
               <a:solidFill>
                 <a:schemeClr val="tx1"/>
               </a:solidFill>
@@ -2279,7 +1078,7 @@
           </a:p>
           <a:p>
             <a:r>
-              <a:rPr lang="es-CO" sz="1200" b="0" i="0" kern="1200" dirty="0">
+              <a:rPr lang="en-US" sz="1200" b="1" i="0" kern="1200" dirty="0" err="1" smtClean="0">
                 <a:solidFill>
                   <a:schemeClr val="tx1"/>
                 </a:solidFill>
@@ -2288,11 +1087,9 @@
                 <a:ea typeface="+mn-ea"/>
                 <a:cs typeface="+mn-cs"/>
               </a:rPr>
-              <a:t>Los mayores servicios de computación en la nube se ejecutan en una red mundial de centros de datos seguros, que se actualizan regularmente a la última generación de hardware informático rápido y eficiente. Esto ofrece varios beneficios sobre un solo centro de datos corporativo, incluida una latencia de red reducida para aplicaciones y mayores economías de escala.</a:t>
-            </a:r>
-          </a:p>
-          <a:p>
-            <a:endParaRPr lang="es-CO" sz="1200" b="0" i="0" kern="1200" dirty="0">
+              <a:t>Confiabilidad</a:t>
+            </a:r>
+            <a:endParaRPr lang="en-US" sz="1200" b="1" i="0" kern="1200" dirty="0" smtClean="0">
               <a:solidFill>
                 <a:schemeClr val="tx1"/>
               </a:solidFill>
@@ -2304,7 +1101,7 @@
           </a:p>
           <a:p>
             <a:r>
-              <a:rPr lang="en-US" sz="1200" b="1" i="0" kern="1200" dirty="0" err="1">
+              <a:rPr lang="es-CO" sz="1200" b="0" i="0" kern="1200" dirty="0" smtClean="0">
                 <a:solidFill>
                   <a:schemeClr val="tx1"/>
                 </a:solidFill>
@@ -2313,9 +1110,11 @@
                 <a:ea typeface="+mn-ea"/>
                 <a:cs typeface="+mn-cs"/>
               </a:rPr>
-              <a:t>Confiabilidad</a:t>
-            </a:r>
-            <a:endParaRPr lang="en-US" sz="1200" b="1" i="0" kern="1200" dirty="0">
+              <a:t>La computación en la nube hace que la copia de seguridad de datos, la recuperación ante desastres y la continuidad del negocio sean más fáciles y menos costosas porque los datos se pueden duplicar en múltiples sitios redundantes en la red del proveedor de la nube.</a:t>
+            </a:r>
+          </a:p>
+          <a:p>
+            <a:endParaRPr lang="es-CO" sz="1200" b="0" i="0" kern="1200" dirty="0" smtClean="0">
               <a:solidFill>
                 <a:schemeClr val="tx1"/>
               </a:solidFill>
@@ -2327,7 +1126,7 @@
           </a:p>
           <a:p>
             <a:r>
-              <a:rPr lang="es-CO" sz="1200" b="0" i="0" kern="1200" dirty="0">
+              <a:rPr lang="en-US" sz="1200" b="1" i="0" kern="1200" dirty="0" err="1" smtClean="0">
                 <a:solidFill>
                   <a:schemeClr val="tx1"/>
                 </a:solidFill>
@@ -2336,11 +1135,9 @@
                 <a:ea typeface="+mn-ea"/>
                 <a:cs typeface="+mn-cs"/>
               </a:rPr>
-              <a:t>La computación en la nube hace que la copia de seguridad de datos, la recuperación ante desastres y la continuidad del negocio sean más fáciles y menos costosas porque los datos se pueden duplicar en múltiples sitios redundantes en la red del proveedor de la nube.</a:t>
-            </a:r>
-          </a:p>
-          <a:p>
-            <a:endParaRPr lang="es-CO" sz="1200" b="0" i="0" kern="1200" dirty="0">
+              <a:t>Seguridad</a:t>
+            </a:r>
+            <a:endParaRPr lang="en-US" sz="1200" b="1" i="0" kern="1200" dirty="0" smtClean="0">
               <a:solidFill>
                 <a:schemeClr val="tx1"/>
               </a:solidFill>
@@ -2352,30 +1149,7 @@
           </a:p>
           <a:p>
             <a:r>
-              <a:rPr lang="en-US" sz="1200" b="1" i="0" kern="1200" dirty="0" err="1">
-                <a:solidFill>
-                  <a:schemeClr val="tx1"/>
-                </a:solidFill>
-                <a:effectLst/>
-                <a:latin typeface="+mn-lt"/>
-                <a:ea typeface="+mn-ea"/>
-                <a:cs typeface="+mn-cs"/>
-              </a:rPr>
-              <a:t>Seguridad</a:t>
-            </a:r>
-            <a:endParaRPr lang="en-US" sz="1200" b="1" i="0" kern="1200" dirty="0">
-              <a:solidFill>
-                <a:schemeClr val="tx1"/>
-              </a:solidFill>
-              <a:effectLst/>
-              <a:latin typeface="+mn-lt"/>
-              <a:ea typeface="+mn-ea"/>
-              <a:cs typeface="+mn-cs"/>
-            </a:endParaRPr>
-          </a:p>
-          <a:p>
-            <a:r>
-              <a:rPr lang="es-CO" sz="1200" b="0" i="0" kern="1200" dirty="0">
+              <a:rPr lang="es-CO" sz="1200" b="0" i="0" kern="1200" dirty="0" smtClean="0">
                 <a:solidFill>
                   <a:schemeClr val="tx1"/>
                 </a:solidFill>
@@ -2386,61 +1160,6 @@
               </a:rPr>
               <a:t>Muchos proveedores de la nube ofrecen un amplio conjunto de políticas, tecnologías y controles que fortalecen su postura de seguridad en general, lo que ayuda a proteger sus datos, aplicaciones e infraestructura de posibles amenazas.</a:t>
             </a:r>
-          </a:p>
-          <a:p>
-            <a:endParaRPr lang="es-CO" sz="1200" b="0" i="0" kern="1200" dirty="0">
-              <a:solidFill>
-                <a:schemeClr val="tx1"/>
-              </a:solidFill>
-              <a:effectLst/>
-              <a:latin typeface="+mn-lt"/>
-              <a:ea typeface="+mn-ea"/>
-              <a:cs typeface="+mn-cs"/>
-            </a:endParaRPr>
-          </a:p>
-          <a:p>
-            <a:endParaRPr lang="es-CO" sz="1200" b="0" i="0" kern="1200" dirty="0">
-              <a:solidFill>
-                <a:schemeClr val="tx1"/>
-              </a:solidFill>
-              <a:effectLst/>
-              <a:latin typeface="+mn-lt"/>
-              <a:ea typeface="+mn-ea"/>
-              <a:cs typeface="+mn-cs"/>
-            </a:endParaRPr>
-          </a:p>
-          <a:p>
-            <a:pPr marL="0" marR="0" lvl="0" indent="0" algn="l" defTabSz="914400" rtl="0" eaLnBrk="1" fontAlgn="auto" latinLnBrk="0" hangingPunct="1">
-              <a:lnSpc>
-                <a:spcPct val="100000"/>
-              </a:lnSpc>
-              <a:spcBef>
-                <a:spcPts val="0"/>
-              </a:spcBef>
-              <a:spcAft>
-                <a:spcPts val="0"/>
-              </a:spcAft>
-              <a:buClrTx/>
-              <a:buSzTx/>
-              <a:buFontTx/>
-              <a:buNone/>
-              <a:tabLst/>
-              <a:defRPr/>
-            </a:pPr>
-            <a:r>
-              <a:rPr lang="en-US" sz="1200" b="0" i="0" kern="1200" dirty="0">
-                <a:solidFill>
-                  <a:schemeClr val="tx1"/>
-                </a:solidFill>
-                <a:effectLst/>
-                <a:latin typeface="+mn-lt"/>
-                <a:ea typeface="+mn-ea"/>
-                <a:cs typeface="+mn-cs"/>
-              </a:rPr>
-              <a:t>https://azure.microsoft.com/en-us/overview/what-is-cloud-computing/#benefits</a:t>
-            </a:r>
-          </a:p>
-          <a:p>
             <a:endParaRPr lang="es-CO" dirty="0"/>
           </a:p>
         </p:txBody>
@@ -2473,247 +1192,6 @@
     <p:extLst>
       <p:ext uri="{BB962C8B-B14F-4D97-AF65-F5344CB8AC3E}">
         <p14:creationId xmlns:p14="http://schemas.microsoft.com/office/powerpoint/2010/main" val="3871406755"/>
-      </p:ext>
-    </p:extLst>
-  </p:cSld>
-  <p:clrMapOvr>
-    <a:masterClrMapping/>
-  </p:clrMapOvr>
-</p:notes>
-</file>
-
-<file path=ppt/notesSlides/notesSlide8.xml><?xml version="1.0" encoding="utf-8"?>
-<p:notes xmlns:a="http://schemas.openxmlformats.org/drawingml/2006/main" xmlns:r="http://schemas.openxmlformats.org/officeDocument/2006/relationships" xmlns:p="http://schemas.openxmlformats.org/presentationml/2006/main">
-  <p:cSld>
-    <p:spTree>
-      <p:nvGrpSpPr>
-        <p:cNvPr id="1" name=""/>
-        <p:cNvGrpSpPr/>
-        <p:nvPr/>
-      </p:nvGrpSpPr>
-      <p:grpSpPr>
-        <a:xfrm>
-          <a:off x="0" y="0"/>
-          <a:ext cx="0" cy="0"/>
-          <a:chOff x="0" y="0"/>
-          <a:chExt cx="0" cy="0"/>
-        </a:xfrm>
-      </p:grpSpPr>
-      <p:sp>
-        <p:nvSpPr>
-          <p:cNvPr id="2" name="Slide Image Placeholder 1"/>
-          <p:cNvSpPr>
-            <a:spLocks noGrp="1" noRot="1" noChangeAspect="1"/>
-          </p:cNvSpPr>
-          <p:nvPr>
-            <p:ph type="sldImg"/>
-          </p:nvPr>
-        </p:nvSpPr>
-        <p:spPr/>
-      </p:sp>
-      <p:sp>
-        <p:nvSpPr>
-          <p:cNvPr id="3" name="Notes Placeholder 2"/>
-          <p:cNvSpPr>
-            <a:spLocks noGrp="1"/>
-          </p:cNvSpPr>
-          <p:nvPr>
-            <p:ph type="body" idx="1"/>
-          </p:nvPr>
-        </p:nvSpPr>
-        <p:spPr/>
-        <p:txBody>
-          <a:bodyPr/>
-          <a:lstStyle/>
-          <a:p>
-            <a:pPr marL="0" marR="0" lvl="0" indent="0" algn="l" defTabSz="914400" rtl="0" eaLnBrk="1" fontAlgn="auto" latinLnBrk="0" hangingPunct="1">
-              <a:lnSpc>
-                <a:spcPct val="100000"/>
-              </a:lnSpc>
-              <a:spcBef>
-                <a:spcPts val="0"/>
-              </a:spcBef>
-              <a:spcAft>
-                <a:spcPts val="0"/>
-              </a:spcAft>
-              <a:buClrTx/>
-              <a:buSzTx/>
-              <a:buFontTx/>
-              <a:buNone/>
-              <a:tabLst/>
-              <a:defRPr/>
-            </a:pPr>
-            <a:r>
-              <a:rPr lang="es-CO" dirty="0"/>
-              <a:t>Espero que esta presentación les haya aclarado los tipos de nubes, </a:t>
-            </a:r>
-            <a:r>
-              <a:rPr lang="es-CO" dirty="0" err="1"/>
-              <a:t>asi</a:t>
-            </a:r>
-            <a:r>
-              <a:rPr lang="es-CO" dirty="0"/>
-              <a:t> como los modelos de servicio mas utilizados.</a:t>
-            </a:r>
-          </a:p>
-          <a:p>
-            <a:pPr marL="0" marR="0" lvl="0" indent="0" algn="l" defTabSz="914400" rtl="0" eaLnBrk="1" fontAlgn="auto" latinLnBrk="0" hangingPunct="1">
-              <a:lnSpc>
-                <a:spcPct val="100000"/>
-              </a:lnSpc>
-              <a:spcBef>
-                <a:spcPts val="0"/>
-              </a:spcBef>
-              <a:spcAft>
-                <a:spcPts val="0"/>
-              </a:spcAft>
-              <a:buClrTx/>
-              <a:buSzTx/>
-              <a:buFontTx/>
-              <a:buNone/>
-              <a:tabLst/>
-              <a:defRPr/>
-            </a:pPr>
-            <a:r>
-              <a:rPr lang="es-CO" dirty="0"/>
-              <a:t>Pero si aún tienen preguntas, por favor, dejen un comentario y se les responderá lo antes posible. </a:t>
-            </a:r>
-          </a:p>
-        </p:txBody>
-      </p:sp>
-      <p:sp>
-        <p:nvSpPr>
-          <p:cNvPr id="4" name="Slide Number Placeholder 3"/>
-          <p:cNvSpPr>
-            <a:spLocks noGrp="1"/>
-          </p:cNvSpPr>
-          <p:nvPr>
-            <p:ph type="sldNum" sz="quarter" idx="5"/>
-          </p:nvPr>
-        </p:nvSpPr>
-        <p:spPr/>
-        <p:txBody>
-          <a:bodyPr/>
-          <a:lstStyle/>
-          <a:p>
-            <a:fld id="{3461A6AF-5C91-4279-A2A9-5DA981759015}" type="slidenum">
-              <a:rPr lang="es-CO" smtClean="0"/>
-              <a:pPr/>
-              <a:t>8</a:t>
-            </a:fld>
-            <a:endParaRPr lang="es-CO" dirty="0"/>
-          </a:p>
-        </p:txBody>
-      </p:sp>
-    </p:spTree>
-    <p:extLst>
-      <p:ext uri="{BB962C8B-B14F-4D97-AF65-F5344CB8AC3E}">
-        <p14:creationId xmlns:p14="http://schemas.microsoft.com/office/powerpoint/2010/main" val="2906276440"/>
-      </p:ext>
-    </p:extLst>
-  </p:cSld>
-  <p:clrMapOvr>
-    <a:masterClrMapping/>
-  </p:clrMapOvr>
-</p:notes>
-</file>
-
-<file path=ppt/notesSlides/notesSlide9.xml><?xml version="1.0" encoding="utf-8"?>
-<p:notes xmlns:a="http://schemas.openxmlformats.org/drawingml/2006/main" xmlns:r="http://schemas.openxmlformats.org/officeDocument/2006/relationships" xmlns:p="http://schemas.openxmlformats.org/presentationml/2006/main">
-  <p:cSld>
-    <p:spTree>
-      <p:nvGrpSpPr>
-        <p:cNvPr id="1" name=""/>
-        <p:cNvGrpSpPr/>
-        <p:nvPr/>
-      </p:nvGrpSpPr>
-      <p:grpSpPr>
-        <a:xfrm>
-          <a:off x="0" y="0"/>
-          <a:ext cx="0" cy="0"/>
-          <a:chOff x="0" y="0"/>
-          <a:chExt cx="0" cy="0"/>
-        </a:xfrm>
-      </p:grpSpPr>
-      <p:sp>
-        <p:nvSpPr>
-          <p:cNvPr id="2" name="Slide Image Placeholder 1"/>
-          <p:cNvSpPr>
-            <a:spLocks noGrp="1" noRot="1" noChangeAspect="1"/>
-          </p:cNvSpPr>
-          <p:nvPr>
-            <p:ph type="sldImg"/>
-          </p:nvPr>
-        </p:nvSpPr>
-        <p:spPr/>
-      </p:sp>
-      <p:sp>
-        <p:nvSpPr>
-          <p:cNvPr id="3" name="Notes Placeholder 2"/>
-          <p:cNvSpPr>
-            <a:spLocks noGrp="1"/>
-          </p:cNvSpPr>
-          <p:nvPr>
-            <p:ph type="body" idx="1"/>
-          </p:nvPr>
-        </p:nvSpPr>
-        <p:spPr/>
-        <p:txBody>
-          <a:bodyPr/>
-          <a:lstStyle/>
-          <a:p>
-            <a:pPr marL="0" marR="0" lvl="0" indent="0" algn="l" defTabSz="914400" rtl="0" eaLnBrk="1" fontAlgn="auto" latinLnBrk="0" hangingPunct="1">
-              <a:lnSpc>
-                <a:spcPct val="100000"/>
-              </a:lnSpc>
-              <a:spcBef>
-                <a:spcPts val="0"/>
-              </a:spcBef>
-              <a:spcAft>
-                <a:spcPts val="0"/>
-              </a:spcAft>
-              <a:buClrTx/>
-              <a:buSzTx/>
-              <a:buFontTx/>
-              <a:buNone/>
-              <a:tabLst/>
-              <a:defRPr/>
-            </a:pPr>
-            <a:r>
-              <a:rPr lang="es-CO" dirty="0"/>
-              <a:t>Muchas gracias a todos.</a:t>
-            </a:r>
-          </a:p>
-        </p:txBody>
-      </p:sp>
-      <p:sp>
-        <p:nvSpPr>
-          <p:cNvPr id="4" name="Slide Number Placeholder 3"/>
-          <p:cNvSpPr>
-            <a:spLocks noGrp="1"/>
-          </p:cNvSpPr>
-          <p:nvPr>
-            <p:ph type="sldNum" sz="quarter" idx="5"/>
-          </p:nvPr>
-        </p:nvSpPr>
-        <p:spPr/>
-        <p:txBody>
-          <a:bodyPr/>
-          <a:lstStyle/>
-          <a:p>
-            <a:fld id="{3461A6AF-5C91-4279-A2A9-5DA981759015}" type="slidenum">
-              <a:rPr lang="es-CO" smtClean="0"/>
-              <a:pPr/>
-              <a:t>9</a:t>
-            </a:fld>
-            <a:endParaRPr lang="es-CO" dirty="0"/>
-          </a:p>
-        </p:txBody>
-      </p:sp>
-    </p:spTree>
-    <p:extLst>
-      <p:ext uri="{BB962C8B-B14F-4D97-AF65-F5344CB8AC3E}">
-        <p14:creationId xmlns:p14="http://schemas.microsoft.com/office/powerpoint/2010/main" val="46413597"/>
       </p:ext>
     </p:extLst>
   </p:cSld>
@@ -2840,7 +1318,7 @@
           </a:lstStyle>
           <a:p>
             <a:r>
-              <a:rPr lang="en-US"/>
+              <a:rPr lang="en-US" smtClean="0"/>
               <a:t>Click to edit Master title style</a:t>
             </a:r>
             <a:endParaRPr lang="es-CO"/>
@@ -2959,7 +1437,7 @@
           </a:lstStyle>
           <a:p>
             <a:r>
-              <a:rPr lang="en-US"/>
+              <a:rPr lang="en-US" smtClean="0"/>
               <a:t>Click to edit Master subtitle style</a:t>
             </a:r>
             <a:endParaRPr lang="es-CO"/>
@@ -2984,7 +1462,7 @@
             <a:fld id="{42C1F1CB-57C8-46CD-A207-903DDF210919}" type="datetimeFigureOut">
               <a:rPr lang="es-CO" smtClean="0"/>
               <a:pPr/>
-              <a:t>7/05/2025</a:t>
+              <a:t>25/03/2022</a:t>
             </a:fld>
             <a:endParaRPr lang="es-CO" dirty="0"/>
           </a:p>
@@ -3158,7 +1636,7 @@
           </a:lstStyle>
           <a:p>
             <a:r>
-              <a:rPr lang="en-US"/>
+              <a:rPr lang="en-US" smtClean="0"/>
               <a:t>Click to edit Master title style</a:t>
             </a:r>
             <a:endParaRPr lang="es-CO"/>
@@ -3277,7 +1755,7 @@
           </a:lstStyle>
           <a:p>
             <a:r>
-              <a:rPr lang="en-US"/>
+              <a:rPr lang="en-US" smtClean="0"/>
               <a:t>Click to edit Master subtitle style</a:t>
             </a:r>
             <a:endParaRPr lang="es-CO"/>
@@ -3302,7 +1780,7 @@
             <a:fld id="{42C1F1CB-57C8-46CD-A207-903DDF210919}" type="datetimeFigureOut">
               <a:rPr lang="es-CO" smtClean="0"/>
               <a:pPr/>
-              <a:t>7/05/2025</a:t>
+              <a:t>25/03/2022</a:t>
             </a:fld>
             <a:endParaRPr lang="es-CO" dirty="0"/>
           </a:p>
@@ -3461,7 +1939,7 @@
           <a:lstStyle/>
           <a:p>
             <a:r>
-              <a:rPr lang="en-US"/>
+              <a:rPr lang="en-US" smtClean="0"/>
               <a:t>Click to edit Master title style</a:t>
             </a:r>
             <a:endParaRPr lang="es-CO"/>
@@ -3496,35 +1974,35 @@
           <a:p>
             <a:pPr lvl="0"/>
             <a:r>
-              <a:rPr lang="en-US"/>
+              <a:rPr lang="en-US" smtClean="0"/>
               <a:t>Click to edit Master text styles</a:t>
             </a:r>
           </a:p>
           <a:p>
             <a:pPr lvl="1"/>
             <a:r>
-              <a:rPr lang="en-US"/>
+              <a:rPr lang="en-US" smtClean="0"/>
               <a:t>Second level</a:t>
             </a:r>
           </a:p>
           <a:p>
             <a:pPr lvl="2"/>
             <a:r>
-              <a:rPr lang="en-US"/>
+              <a:rPr lang="en-US" smtClean="0"/>
               <a:t>Third level</a:t>
             </a:r>
           </a:p>
           <a:p>
             <a:pPr lvl="3"/>
             <a:r>
-              <a:rPr lang="en-US"/>
+              <a:rPr lang="en-US" smtClean="0"/>
               <a:t>Fourth level</a:t>
             </a:r>
           </a:p>
           <a:p>
             <a:pPr lvl="4"/>
             <a:r>
-              <a:rPr lang="en-US"/>
+              <a:rPr lang="en-US" smtClean="0"/>
               <a:t>Fifth level</a:t>
             </a:r>
             <a:endParaRPr lang="es-CO" dirty="0"/>
@@ -3549,7 +2027,7 @@
             <a:fld id="{42C1F1CB-57C8-46CD-A207-903DDF210919}" type="datetimeFigureOut">
               <a:rPr lang="es-CO" smtClean="0"/>
               <a:pPr/>
-              <a:t>7/05/2025</a:t>
+              <a:t>25/03/2022</a:t>
             </a:fld>
             <a:endParaRPr lang="es-CO" dirty="0"/>
           </a:p>
@@ -3708,7 +2186,7 @@
           <a:lstStyle/>
           <a:p>
             <a:r>
-              <a:rPr lang="en-US"/>
+              <a:rPr lang="en-US" smtClean="0"/>
               <a:t>Click to edit Master title style</a:t>
             </a:r>
             <a:endParaRPr lang="es-CO"/>
@@ -3737,35 +2215,35 @@
           <a:p>
             <a:pPr lvl="0"/>
             <a:r>
-              <a:rPr lang="en-US"/>
+              <a:rPr lang="en-US" smtClean="0"/>
               <a:t>Click to edit Master text styles</a:t>
             </a:r>
           </a:p>
           <a:p>
             <a:pPr lvl="1"/>
             <a:r>
-              <a:rPr lang="en-US"/>
+              <a:rPr lang="en-US" smtClean="0"/>
               <a:t>Second level</a:t>
             </a:r>
           </a:p>
           <a:p>
             <a:pPr lvl="2"/>
             <a:r>
-              <a:rPr lang="en-US"/>
+              <a:rPr lang="en-US" smtClean="0"/>
               <a:t>Third level</a:t>
             </a:r>
           </a:p>
           <a:p>
             <a:pPr lvl="3"/>
             <a:r>
-              <a:rPr lang="en-US"/>
+              <a:rPr lang="en-US" smtClean="0"/>
               <a:t>Fourth level</a:t>
             </a:r>
           </a:p>
           <a:p>
             <a:pPr lvl="4"/>
             <a:r>
-              <a:rPr lang="en-US"/>
+              <a:rPr lang="en-US" smtClean="0"/>
               <a:t>Fifth level</a:t>
             </a:r>
             <a:endParaRPr lang="es-CO"/>
@@ -3790,7 +2268,7 @@
             <a:fld id="{42C1F1CB-57C8-46CD-A207-903DDF210919}" type="datetimeFigureOut">
               <a:rPr lang="es-CO" smtClean="0"/>
               <a:pPr/>
-              <a:t>7/05/2025</a:t>
+              <a:t>25/03/2022</a:t>
             </a:fld>
             <a:endParaRPr lang="es-CO" dirty="0"/>
           </a:p>
@@ -3949,7 +2427,7 @@
           <a:lstStyle/>
           <a:p>
             <a:r>
-              <a:rPr lang="en-US"/>
+              <a:rPr lang="en-US" smtClean="0"/>
               <a:t>Click to edit Master title style</a:t>
             </a:r>
             <a:endParaRPr lang="es-CO"/>
@@ -3978,35 +2456,35 @@
           <a:p>
             <a:pPr lvl="0"/>
             <a:r>
-              <a:rPr lang="en-US"/>
+              <a:rPr lang="en-US" smtClean="0"/>
               <a:t>Click to edit Master text styles</a:t>
             </a:r>
           </a:p>
           <a:p>
             <a:pPr lvl="1"/>
             <a:r>
-              <a:rPr lang="en-US"/>
+              <a:rPr lang="en-US" smtClean="0"/>
               <a:t>Second level</a:t>
             </a:r>
           </a:p>
           <a:p>
             <a:pPr lvl="2"/>
             <a:r>
-              <a:rPr lang="en-US"/>
+              <a:rPr lang="en-US" smtClean="0"/>
               <a:t>Third level</a:t>
             </a:r>
           </a:p>
           <a:p>
             <a:pPr lvl="3"/>
             <a:r>
-              <a:rPr lang="en-US"/>
+              <a:rPr lang="en-US" smtClean="0"/>
               <a:t>Fourth level</a:t>
             </a:r>
           </a:p>
           <a:p>
             <a:pPr lvl="4"/>
             <a:r>
-              <a:rPr lang="en-US"/>
+              <a:rPr lang="en-US" smtClean="0"/>
               <a:t>Fifth level</a:t>
             </a:r>
             <a:endParaRPr lang="es-CO"/>
@@ -4031,7 +2509,7 @@
             <a:fld id="{42C1F1CB-57C8-46CD-A207-903DDF210919}" type="datetimeFigureOut">
               <a:rPr lang="es-CO" smtClean="0"/>
               <a:pPr/>
-              <a:t>7/05/2025</a:t>
+              <a:t>25/03/2022</a:t>
             </a:fld>
             <a:endParaRPr lang="es-CO" dirty="0"/>
           </a:p>
@@ -4200,7 +2678,7 @@
           <a:lstStyle/>
           <a:p>
             <a:r>
-              <a:rPr lang="en-US"/>
+              <a:rPr lang="en-US" smtClean="0"/>
               <a:t>Click to edit Master title style</a:t>
             </a:r>
             <a:endParaRPr lang="es-CO"/>
@@ -4234,35 +2712,35 @@
           <a:p>
             <a:pPr lvl="0"/>
             <a:r>
-              <a:rPr lang="en-US"/>
+              <a:rPr lang="en-US" smtClean="0"/>
               <a:t>Click to edit Master text styles</a:t>
             </a:r>
           </a:p>
           <a:p>
             <a:pPr lvl="1"/>
             <a:r>
-              <a:rPr lang="en-US"/>
+              <a:rPr lang="en-US" smtClean="0"/>
               <a:t>Second level</a:t>
             </a:r>
           </a:p>
           <a:p>
             <a:pPr lvl="2"/>
             <a:r>
-              <a:rPr lang="en-US"/>
+              <a:rPr lang="en-US" smtClean="0"/>
               <a:t>Third level</a:t>
             </a:r>
           </a:p>
           <a:p>
             <a:pPr lvl="3"/>
             <a:r>
-              <a:rPr lang="en-US"/>
+              <a:rPr lang="en-US" smtClean="0"/>
               <a:t>Fourth level</a:t>
             </a:r>
           </a:p>
           <a:p>
             <a:pPr lvl="4"/>
             <a:r>
-              <a:rPr lang="en-US"/>
+              <a:rPr lang="en-US" smtClean="0"/>
               <a:t>Fifth level</a:t>
             </a:r>
             <a:endParaRPr lang="es-CO" dirty="0"/>
@@ -4305,7 +2783,7 @@
             <a:fld id="{42C1F1CB-57C8-46CD-A207-903DDF210919}" type="datetimeFigureOut">
               <a:rPr lang="es-CO" smtClean="0"/>
               <a:pPr/>
-              <a:t>7/05/2025</a:t>
+              <a:t>25/03/2022</a:t>
             </a:fld>
             <a:endParaRPr lang="es-CO" dirty="0"/>
           </a:p>
@@ -4708,9 +3186,10 @@
           <a:lstStyle/>
           <a:p>
             <a:r>
-              <a:rPr lang="es-CO" dirty="0"/>
+              <a:rPr lang="es-CO" dirty="0" smtClean="0"/>
               <a:t>Cloud Computing</a:t>
             </a:r>
+            <a:endParaRPr lang="es-CO" dirty="0"/>
           </a:p>
         </p:txBody>
       </p:sp>
@@ -4735,9 +3214,10 @@
           <a:lstStyle/>
           <a:p>
             <a:r>
-              <a:rPr lang="es-CO" sz="8000" dirty="0"/>
+              <a:rPr lang="es-CO" sz="8000" dirty="0" smtClean="0"/>
               <a:t>Cloud</a:t>
             </a:r>
+            <a:endParaRPr lang="es-CO" sz="8000" dirty="0"/>
           </a:p>
         </p:txBody>
       </p:sp>
@@ -4764,9 +3244,10 @@
           <a:lstStyle/>
           <a:p>
             <a:r>
-              <a:rPr lang="es-CO" dirty="0"/>
+              <a:rPr lang="es-CO" dirty="0" smtClean="0"/>
               <a:t>Julio Cesar Robles Uribe</a:t>
             </a:r>
+            <a:endParaRPr lang="es-CO" dirty="0"/>
           </a:p>
         </p:txBody>
       </p:sp>
@@ -4793,13 +3274,18 @@
           <a:lstStyle/>
           <a:p>
             <a:r>
-              <a:rPr lang="es-CO" sz="1400" dirty="0">
+              <a:rPr lang="es-CO" sz="1400" dirty="0" smtClean="0">
                 <a:solidFill>
                   <a:srgbClr val="0070C0"/>
                 </a:solidFill>
               </a:rPr>
               <a:t>Arquitecto de Soluciones</a:t>
             </a:r>
+            <a:endParaRPr lang="es-CO" sz="1400" dirty="0">
+              <a:solidFill>
+                <a:srgbClr val="0070C0"/>
+              </a:solidFill>
+            </a:endParaRPr>
           </a:p>
         </p:txBody>
       </p:sp>
@@ -4859,6 +3345,13 @@
   <p:clrMapOvr>
     <a:masterClrMapping/>
   </p:clrMapOvr>
+  <p:timing>
+    <p:tnLst>
+      <p:par>
+        <p:cTn id="1" dur="indefinite" restart="never" nodeType="tmRoot"/>
+      </p:par>
+    </p:tnLst>
+  </p:timing>
 </p:sld>
 </file>
 
@@ -4895,9 +3388,10 @@
           <a:lstStyle/>
           <a:p>
             <a:r>
-              <a:rPr lang="es-CO" dirty="0"/>
+              <a:rPr lang="es-CO" dirty="0" smtClean="0"/>
               <a:t>Cloud Computing</a:t>
             </a:r>
+            <a:endParaRPr lang="es-CO" dirty="0"/>
           </a:p>
         </p:txBody>
       </p:sp>
@@ -5126,9 +3620,10 @@
           <a:lstStyle/>
           <a:p>
             <a:r>
-              <a:rPr lang="es-CO" dirty="0"/>
+              <a:rPr lang="es-CO" dirty="0" smtClean="0"/>
               <a:t>Tipos de Cloud</a:t>
             </a:r>
+            <a:endParaRPr lang="es-CO" dirty="0"/>
           </a:p>
         </p:txBody>
       </p:sp>
@@ -5194,7 +3689,7 @@
                   <a:schemeClr val="accent6"/>
                 </a:solidFill>
               </a:rPr>
-              <a:t>Publico :</a:t>
+              <a:t>Publico</a:t>
             </a:r>
             <a:r>
               <a:rPr lang="es-CO" sz="2000" dirty="0">
@@ -5202,7 +3697,7 @@
                   <a:srgbClr val="FFFF00"/>
                 </a:solidFill>
               </a:rPr>
-              <a:t> </a:t>
+              <a:t> : </a:t>
             </a:r>
             <a:r>
               <a:rPr lang="es-ES" sz="2000" dirty="0"/>
@@ -5221,7 +3716,7 @@
                   <a:schemeClr val="accent6"/>
                 </a:solidFill>
               </a:rPr>
-              <a:t>Hibrido :</a:t>
+              <a:t>Hibrido</a:t>
             </a:r>
             <a:r>
               <a:rPr lang="es-CO" sz="2000" dirty="0">
@@ -5229,7 +3724,7 @@
                   <a:srgbClr val="FFFF00"/>
                 </a:solidFill>
               </a:rPr>
-              <a:t> </a:t>
+              <a:t> : </a:t>
             </a:r>
             <a:r>
               <a:rPr lang="es-ES" sz="2000" dirty="0"/>
@@ -5247,7 +3742,7 @@
           <p:nvPr/>
         </p:nvPicPr>
         <p:blipFill>
-          <a:blip r:embed="rId3">
+          <a:blip r:embed="rId2">
             <a:extLst>
               <a:ext uri="{28A0092B-C50C-407E-A947-70E740481C1C}">
                 <a14:useLocalDpi xmlns:a14="http://schemas.microsoft.com/office/drawing/2010/main" val="0"/>
@@ -5359,7 +3854,7 @@
               <a:buChar char="•"/>
             </a:pPr>
             <a:r>
-              <a:rPr lang="es-CO" b="1" dirty="0" err="1">
+              <a:rPr lang="es-CO" b="1" dirty="0" err="1" smtClean="0">
                 <a:solidFill>
                   <a:schemeClr val="accent6"/>
                 </a:solidFill>
@@ -5367,7 +3862,7 @@
               <a:t>SaaS</a:t>
             </a:r>
             <a:r>
-              <a:rPr lang="es-CO" b="1" dirty="0">
+              <a:rPr lang="es-CO" b="1" dirty="0" smtClean="0">
                 <a:solidFill>
                   <a:schemeClr val="accent6"/>
                 </a:solidFill>
@@ -5375,12 +3870,16 @@
               <a:t>: </a:t>
             </a:r>
             <a:r>
-              <a:rPr lang="es-ES" dirty="0" err="1"/>
+              <a:rPr lang="es-ES" dirty="0" err="1" smtClean="0"/>
               <a:t>Sosftware</a:t>
             </a:r>
             <a:r>
+              <a:rPr lang="es-ES" dirty="0" smtClean="0"/>
+              <a:t> </a:t>
+            </a:r>
+            <a:r>
               <a:rPr lang="es-ES" dirty="0"/>
-              <a:t> as a </a:t>
+              <a:t>as a </a:t>
             </a:r>
             <a:r>
               <a:rPr lang="es-ES" dirty="0" err="1"/>
@@ -5398,7 +3897,7 @@
               <a:buChar char="•"/>
             </a:pPr>
             <a:r>
-              <a:rPr lang="es-CO" b="1" dirty="0" err="1">
+              <a:rPr lang="es-CO" b="1" dirty="0" err="1" smtClean="0">
                 <a:solidFill>
                   <a:schemeClr val="accent3"/>
                 </a:solidFill>
@@ -5406,7 +3905,7 @@
               <a:t>PaaS</a:t>
             </a:r>
             <a:r>
-              <a:rPr lang="es-CO" b="1" dirty="0">
+              <a:rPr lang="es-CO" b="1" dirty="0" smtClean="0">
                 <a:solidFill>
                   <a:schemeClr val="accent3"/>
                 </a:solidFill>
@@ -5414,12 +3913,16 @@
               <a:t>: </a:t>
             </a:r>
             <a:r>
-              <a:rPr lang="es-ES" dirty="0" err="1"/>
+              <a:rPr lang="es-ES" dirty="0" err="1" smtClean="0"/>
               <a:t>Platform</a:t>
             </a:r>
             <a:r>
+              <a:rPr lang="es-ES" dirty="0" smtClean="0"/>
+              <a:t> </a:t>
+            </a:r>
+            <a:r>
               <a:rPr lang="es-ES" dirty="0"/>
-              <a:t> as a </a:t>
+              <a:t>as a </a:t>
             </a:r>
             <a:r>
               <a:rPr lang="es-ES" dirty="0" err="1"/>
@@ -5433,7 +3936,7 @@
               <a:buChar char="•"/>
             </a:pPr>
             <a:r>
-              <a:rPr lang="es-CO" b="1" dirty="0" err="1">
+              <a:rPr lang="es-CO" b="1" dirty="0" err="1" smtClean="0">
                 <a:solidFill>
                   <a:schemeClr val="accent4"/>
                 </a:solidFill>
@@ -5441,7 +3944,7 @@
               <a:t>IaaS</a:t>
             </a:r>
             <a:r>
-              <a:rPr lang="es-CO" b="1" dirty="0">
+              <a:rPr lang="es-CO" b="1" dirty="0" smtClean="0">
                 <a:solidFill>
                   <a:schemeClr val="accent4"/>
                 </a:solidFill>
@@ -5449,12 +3952,16 @@
               <a:t>: </a:t>
             </a:r>
             <a:r>
-              <a:rPr lang="es-ES" dirty="0" err="1"/>
+              <a:rPr lang="es-ES" dirty="0" err="1" smtClean="0"/>
               <a:t>Infrastructure</a:t>
             </a:r>
             <a:r>
+              <a:rPr lang="es-ES" dirty="0" smtClean="0"/>
+              <a:t> </a:t>
+            </a:r>
+            <a:r>
               <a:rPr lang="es-ES" dirty="0"/>
-              <a:t> as a </a:t>
+              <a:t>as a </a:t>
             </a:r>
             <a:r>
               <a:rPr lang="es-ES" dirty="0" err="1"/>
@@ -5479,7 +3986,7 @@
           <p:nvPr/>
         </p:nvPicPr>
         <p:blipFill>
-          <a:blip r:embed="rId3">
+          <a:blip r:embed="rId2">
             <a:clrChange>
               <a:clrFrom>
                 <a:srgbClr val="FFFFFF"/>
@@ -5531,6 +4038,13 @@
   <p:clrMapOvr>
     <a:masterClrMapping/>
   </p:clrMapOvr>
+  <p:timing>
+    <p:tnLst>
+      <p:par>
+        <p:cTn id="1" dur="indefinite" restart="never" nodeType="tmRoot"/>
+      </p:par>
+    </p:tnLst>
+  </p:timing>
 </p:sld>
 </file>
 
@@ -5568,7 +4082,11 @@
           <a:p>
             <a:r>
               <a:rPr lang="fi-FI" dirty="0"/>
-              <a:t>On Prem - IaaS – PaaS - SaaS</a:t>
+              <a:t>On Prem - IaaS – PaaS - </a:t>
+            </a:r>
+            <a:r>
+              <a:rPr lang="fi-FI" dirty="0" smtClean="0"/>
+              <a:t>SaaS</a:t>
             </a:r>
             <a:endParaRPr lang="es-CO" dirty="0"/>
           </a:p>
@@ -5818,7 +4336,7 @@
               <a:defRPr/>
             </a:pPr>
             <a:r>
-              <a:rPr kumimoji="0" lang="en-US" sz="1600" b="1" i="0" u="none" strike="noStrike" kern="1200" cap="none" spc="0" normalizeH="0" baseline="0" noProof="0" dirty="0">
+              <a:rPr kumimoji="0" lang="en-US" sz="1600" b="1" i="0" u="none" strike="noStrike" kern="1200" cap="none" spc="0" normalizeH="0" baseline="0" noProof="0" dirty="0" smtClean="0">
                 <a:ln>
                   <a:noFill/>
                 </a:ln>
@@ -5834,7 +4352,7 @@
               <a:t>(</a:t>
             </a:r>
             <a:r>
-              <a:rPr lang="es-CO" sz="1600" b="1" dirty="0" err="1">
+              <a:rPr lang="es-CO" sz="1600" b="1" dirty="0" err="1" smtClean="0">
                 <a:solidFill>
                   <a:schemeClr val="bg1"/>
                 </a:solidFill>
@@ -5844,7 +4362,7 @@
               <a:t>Datacenter</a:t>
             </a:r>
             <a:r>
-              <a:rPr lang="es-CO" sz="1600" b="1" dirty="0">
+              <a:rPr lang="es-CO" sz="1600" b="1" dirty="0" smtClean="0">
                 <a:solidFill>
                   <a:schemeClr val="bg1"/>
                 </a:solidFill>
@@ -6003,7 +4521,7 @@
               <a:defRPr/>
             </a:pPr>
             <a:r>
-              <a:rPr kumimoji="0" lang="es-CO" sz="1200" b="0" i="0" u="none" strike="noStrike" kern="1200" cap="none" spc="0" normalizeH="0" baseline="0" dirty="0">
+              <a:rPr kumimoji="0" lang="es-CO" sz="1200" b="0" i="0" u="none" strike="noStrike" kern="1200" cap="none" spc="0" normalizeH="0" baseline="0" dirty="0" smtClean="0">
                 <a:ln>
                   <a:noFill/>
                 </a:ln>
@@ -6019,6 +4537,20 @@
               </a:rPr>
               <a:t>Ustedes administran</a:t>
             </a:r>
+            <a:endParaRPr kumimoji="0" lang="es-CO" sz="1200" b="0" i="0" u="none" strike="noStrike" kern="1200" cap="none" spc="0" normalizeH="0" baseline="0" dirty="0">
+              <a:ln>
+                <a:noFill/>
+              </a:ln>
+              <a:solidFill>
+                <a:schemeClr val="bg1"/>
+              </a:solidFill>
+              <a:effectLst/>
+              <a:uLnTx/>
+              <a:uFillTx/>
+              <a:latin typeface="Segoe UI"/>
+              <a:ea typeface="+mn-ea"/>
+              <a:cs typeface="Segoe UI" panose="020B0502040204020203" pitchFamily="34" charset="0"/>
+            </a:endParaRPr>
           </a:p>
         </p:txBody>
       </p:sp>
@@ -6991,7 +5523,7 @@
               <a:defRPr/>
             </a:pPr>
             <a:r>
-              <a:rPr kumimoji="0" lang="es-CO" sz="1200" b="0" i="0" u="none" strike="noStrike" kern="1200" cap="none" spc="0" normalizeH="0" baseline="0" dirty="0">
+              <a:rPr kumimoji="0" lang="es-CO" sz="1200" b="0" i="0" u="none" strike="noStrike" kern="1200" cap="none" spc="0" normalizeH="0" baseline="0" dirty="0" smtClean="0">
                 <a:ln>
                   <a:noFill/>
                 </a:ln>
@@ -7005,8 +5537,39 @@
                 <a:ea typeface="+mn-ea"/>
                 <a:cs typeface="Segoe UI" panose="020B0502040204020203" pitchFamily="34" charset="0"/>
               </a:rPr>
-              <a:t>Cloud administra</a:t>
-            </a:r>
+              <a:t>Cloud </a:t>
+            </a:r>
+            <a:r>
+              <a:rPr kumimoji="0" lang="es-CO" sz="1200" b="0" i="0" u="none" strike="noStrike" kern="1200" cap="none" spc="0" normalizeH="0" baseline="0" dirty="0" smtClean="0">
+                <a:ln>
+                  <a:noFill/>
+                </a:ln>
+                <a:solidFill>
+                  <a:schemeClr val="bg1"/>
+                </a:solidFill>
+                <a:effectLst/>
+                <a:uLnTx/>
+                <a:uFillTx/>
+                <a:latin typeface="Segoe UI"/>
+                <a:ea typeface="+mn-ea"/>
+                <a:cs typeface="Segoe UI" panose="020B0502040204020203" pitchFamily="34" charset="0"/>
+              </a:rPr>
+              <a:t>administra</a:t>
+            </a:r>
+            <a:endParaRPr kumimoji="0" lang="es-CO" sz="1200" b="0" i="0" u="none" strike="noStrike" kern="1200" cap="none" spc="0" normalizeH="0" baseline="0" dirty="0">
+              <a:ln>
+                <a:noFill/>
+              </a:ln>
+              <a:solidFill>
+                <a:schemeClr val="bg1"/>
+              </a:solidFill>
+              <a:effectLst/>
+              <a:uLnTx/>
+              <a:uFillTx/>
+              <a:latin typeface="Segoe UI"/>
+              <a:ea typeface="+mn-ea"/>
+              <a:cs typeface="Segoe UI" panose="020B0502040204020203" pitchFamily="34" charset="0"/>
+            </a:endParaRPr>
           </a:p>
         </p:txBody>
       </p:sp>
@@ -7593,13 +6156,22 @@
               <a:defRPr/>
             </a:pPr>
             <a:r>
-              <a:rPr lang="es-CO" sz="1200" dirty="0">
+              <a:rPr lang="es-CO" sz="1200" dirty="0" smtClean="0">
                 <a:solidFill>
                   <a:schemeClr val="bg1"/>
                 </a:solidFill>
                 <a:cs typeface="Segoe UI" panose="020B0502040204020203" pitchFamily="34" charset="0"/>
               </a:rPr>
-              <a:t>Cloud administra</a:t>
+              <a:t>Cloud </a:t>
+            </a:r>
+            <a:r>
+              <a:rPr lang="es-CO" sz="1200" dirty="0">
+                <a:solidFill>
+                  <a:schemeClr val="bg1"/>
+                </a:solidFill>
+                <a:cs typeface="Segoe UI" panose="020B0502040204020203" pitchFamily="34" charset="0"/>
+              </a:rPr>
+              <a:t>administra</a:t>
             </a:r>
           </a:p>
         </p:txBody>
@@ -10151,13 +8723,22 @@
               <a:defRPr/>
             </a:pPr>
             <a:r>
-              <a:rPr lang="es-CO" sz="1200" dirty="0">
+              <a:rPr lang="es-CO" sz="1200" dirty="0" smtClean="0">
                 <a:solidFill>
                   <a:schemeClr val="bg1"/>
                 </a:solidFill>
                 <a:cs typeface="Segoe UI" panose="020B0502040204020203" pitchFamily="34" charset="0"/>
               </a:rPr>
-              <a:t>Cloud administra</a:t>
+              <a:t>Cloud </a:t>
+            </a:r>
+            <a:r>
+              <a:rPr lang="es-CO" sz="1200" dirty="0">
+                <a:solidFill>
+                  <a:schemeClr val="bg1"/>
+                </a:solidFill>
+                <a:cs typeface="Segoe UI" panose="020B0502040204020203" pitchFamily="34" charset="0"/>
+              </a:rPr>
+              <a:t>administra</a:t>
             </a:r>
           </a:p>
         </p:txBody>
@@ -10239,18 +8820,25 @@
   <p:clrMapOvr>
     <a:masterClrMapping/>
   </p:clrMapOvr>
-  <mc:AlternateContent xmlns:mc="http://schemas.openxmlformats.org/markup-compatibility/2006" xmlns:p14="http://schemas.microsoft.com/office/powerpoint/2010/main">
-    <mc:Choice Requires="p14">
+  <mc:AlternateContent xmlns:mc="http://schemas.openxmlformats.org/markup-compatibility/2006">
+    <mc:Choice xmlns:p14="http://schemas.microsoft.com/office/powerpoint/2010/main" Requires="p14">
       <p:transition spd="med" p14:dur="700">
         <p:fade/>
       </p:transition>
     </mc:Choice>
-    <mc:Fallback xmlns="">
+    <mc:Fallback>
       <p:transition spd="med">
         <p:fade/>
       </p:transition>
     </mc:Fallback>
   </mc:AlternateContent>
+  <p:timing>
+    <p:tnLst>
+      <p:par>
+        <p:cTn id="1" dur="indefinite" restart="never" nodeType="tmRoot"/>
+      </p:par>
+    </p:tnLst>
+  </p:timing>
 </p:sld>
 </file>
 
@@ -10280,7 +8868,7 @@
           <p:nvPr/>
         </p:nvPicPr>
         <p:blipFill>
-          <a:blip r:embed="rId3">
+          <a:blip r:embed="rId2">
             <a:clrChange>
               <a:clrFrom>
                 <a:srgbClr val="FFFFFF"/>
@@ -10332,6 +8920,13 @@
   <p:clrMapOvr>
     <a:masterClrMapping/>
   </p:clrMapOvr>
+  <p:timing>
+    <p:tnLst>
+      <p:par>
+        <p:cTn id="1" dur="indefinite" restart="never" nodeType="tmRoot"/>
+      </p:par>
+    </p:tnLst>
+  </p:timing>
 </p:sld>
 </file>
 
@@ -10368,9 +8963,10 @@
           <a:lstStyle/>
           <a:p>
             <a:r>
-              <a:rPr lang="es-CO" dirty="0"/>
+              <a:rPr lang="es-CO" dirty="0" smtClean="0"/>
               <a:t>Beneficios</a:t>
             </a:r>
+            <a:endParaRPr lang="es-CO" dirty="0"/>
           </a:p>
         </p:txBody>
       </p:sp>
@@ -10435,9 +9031,10 @@
             <a:lstStyle/>
             <a:p>
               <a:r>
-                <a:rPr lang="es-CO" dirty="0"/>
+                <a:rPr lang="es-CO" dirty="0" smtClean="0"/>
                 <a:t>Costos</a:t>
               </a:r>
+              <a:endParaRPr lang="es-CO" dirty="0"/>
             </a:p>
           </p:txBody>
         </p:sp>
@@ -10503,9 +9100,10 @@
             <a:lstStyle/>
             <a:p>
               <a:r>
-                <a:rPr lang="es-CO" dirty="0"/>
+                <a:rPr lang="es-CO" dirty="0" smtClean="0"/>
                 <a:t>Velocidad</a:t>
               </a:r>
+              <a:endParaRPr lang="es-CO" dirty="0"/>
             </a:p>
           </p:txBody>
         </p:sp>
@@ -10571,9 +9169,10 @@
             <a:lstStyle/>
             <a:p>
               <a:r>
-                <a:rPr lang="es-CO" dirty="0"/>
+                <a:rPr lang="es-CO" dirty="0" smtClean="0"/>
                 <a:t>Escalamiento</a:t>
               </a:r>
+              <a:endParaRPr lang="es-CO" dirty="0"/>
             </a:p>
           </p:txBody>
         </p:sp>
@@ -10639,9 +9238,10 @@
             <a:lstStyle/>
             <a:p>
               <a:r>
-                <a:rPr lang="es-CO" dirty="0"/>
+                <a:rPr lang="es-CO" dirty="0" smtClean="0"/>
                 <a:t>Productividad</a:t>
               </a:r>
+              <a:endParaRPr lang="es-CO" dirty="0"/>
             </a:p>
           </p:txBody>
         </p:sp>
@@ -10707,9 +9307,10 @@
             <a:lstStyle/>
             <a:p>
               <a:r>
-                <a:rPr lang="es-CO" dirty="0"/>
+                <a:rPr lang="es-CO" dirty="0" smtClean="0"/>
                 <a:t>Rendimiento</a:t>
               </a:r>
+              <a:endParaRPr lang="es-CO" dirty="0"/>
             </a:p>
           </p:txBody>
         </p:sp>
@@ -10775,9 +9376,10 @@
             <a:lstStyle/>
             <a:p>
               <a:r>
-                <a:rPr lang="es-CO" dirty="0"/>
+                <a:rPr lang="es-CO" dirty="0" smtClean="0"/>
                 <a:t>Confiabilidad</a:t>
               </a:r>
+              <a:endParaRPr lang="es-CO" dirty="0"/>
             </a:p>
           </p:txBody>
         </p:sp>
@@ -10843,9 +9445,10 @@
             <a:lstStyle/>
             <a:p>
               <a:r>
-                <a:rPr lang="es-CO" dirty="0"/>
+                <a:rPr lang="es-CO" dirty="0" smtClean="0"/>
                 <a:t>Seguridad</a:t>
               </a:r>
+              <a:endParaRPr lang="es-CO" dirty="0"/>
             </a:p>
           </p:txBody>
         </p:sp>
@@ -11242,9 +9845,10 @@
           <a:p>
             <a:pPr algn="ctr"/>
             <a:r>
-              <a:rPr lang="es-CO" dirty="0"/>
+              <a:rPr lang="es-CO" dirty="0" smtClean="0"/>
               <a:t>Preguntas?</a:t>
             </a:r>
+            <a:endParaRPr lang="es-CO" dirty="0"/>
           </a:p>
         </p:txBody>
       </p:sp>
@@ -11257,7 +9861,7 @@
           <p:nvPr/>
         </p:nvPicPr>
         <p:blipFill>
-          <a:blip r:embed="rId3" cstate="print"/>
+          <a:blip r:embed="rId2" cstate="print"/>
           <a:srcRect/>
           <a:stretch>
             <a:fillRect/>
@@ -11279,6 +9883,13 @@
   <p:clrMapOvr>
     <a:masterClrMapping/>
   </p:clrMapOvr>
+  <p:timing>
+    <p:tnLst>
+      <p:par>
+        <p:cTn id="1" dur="indefinite" restart="never" nodeType="tmRoot"/>
+      </p:par>
+    </p:tnLst>
+  </p:timing>
 </p:sld>
 </file>
 
@@ -11337,7 +9948,7 @@
           <a:p>
             <a:pPr algn="ctr"/>
             <a:r>
-              <a:rPr lang="en-US" sz="6600" b="1" cap="all" dirty="0">
+              <a:rPr lang="en-US" sz="6600" b="1" cap="all" dirty="0" smtClean="0">
                 <a:ln w="0"/>
                 <a:solidFill>
                   <a:srgbClr val="0066CC">
@@ -11351,6 +9962,18 @@
               </a:rPr>
               <a:t>Gracias!!!</a:t>
             </a:r>
+            <a:endParaRPr lang="en-US" sz="6600" b="1" cap="all" dirty="0">
+              <a:ln w="0"/>
+              <a:solidFill>
+                <a:srgbClr val="0066CC">
+                  <a:alpha val="74000"/>
+                </a:srgbClr>
+              </a:solidFill>
+              <a:effectLst>
+                <a:reflection blurRad="12700" stA="50000" endPos="50000" dist="5000" dir="5400000" sy="-100000" rotWithShape="0"/>
+              </a:effectLst>
+              <a:latin typeface="Berlin Sans FB Demi" pitchFamily="34" charset="0"/>
+            </a:endParaRPr>
           </a:p>
         </p:txBody>
       </p:sp>
@@ -11359,6 +9982,13 @@
   <p:clrMapOvr>
     <a:masterClrMapping/>
   </p:clrMapOvr>
+  <p:timing>
+    <p:tnLst>
+      <p:par>
+        <p:cTn id="1" dur="indefinite" restart="never" nodeType="tmRoot"/>
+      </p:par>
+    </p:tnLst>
+  </p:timing>
 </p:sld>
 </file>
 

</xml_diff>

<commit_message>
Revert "Merge branch 'main' into 2025-01/andlasper"
This reverts commit b1aa7e6df1d9df170c1cd750f6c5075c2a7cf8b9, reversing
changes made to 9a5904f51b2ef29cff051ace97d215eecb6cf8d3.
</commit_message>
<xml_diff>
--- a/Classes/SvcDev-06-Cloud.pptx
+++ b/Classes/SvcDev-06-Cloud.pptx
@@ -238,7 +238,7 @@
             <a:fld id="{2C5F02C1-A2C2-45D1-8D60-D454C04B5E27}" type="datetimeFigureOut">
               <a:rPr lang="es-CO" smtClean="0"/>
               <a:pPr/>
-              <a:t>7/05/2025</a:t>
+              <a:t>25/03/2022</a:t>
             </a:fld>
             <a:endParaRPr lang="es-CO" dirty="0"/>
           </a:p>
@@ -304,35 +304,35 @@
           <a:p>
             <a:pPr lvl="0"/>
             <a:r>
-              <a:rPr lang="en-US"/>
+              <a:rPr lang="en-US" smtClean="0"/>
               <a:t>Click to edit Master text styles</a:t>
             </a:r>
           </a:p>
           <a:p>
             <a:pPr lvl="1"/>
             <a:r>
-              <a:rPr lang="en-US"/>
+              <a:rPr lang="en-US" smtClean="0"/>
               <a:t>Second level</a:t>
             </a:r>
           </a:p>
           <a:p>
             <a:pPr lvl="2"/>
             <a:r>
-              <a:rPr lang="en-US"/>
+              <a:rPr lang="en-US" smtClean="0"/>
               <a:t>Third level</a:t>
             </a:r>
           </a:p>
           <a:p>
             <a:pPr lvl="3"/>
             <a:r>
-              <a:rPr lang="en-US"/>
+              <a:rPr lang="en-US" smtClean="0"/>
               <a:t>Fourth level</a:t>
             </a:r>
           </a:p>
           <a:p>
             <a:pPr lvl="4"/>
             <a:r>
-              <a:rPr lang="en-US"/>
+              <a:rPr lang="en-US" smtClean="0"/>
               <a:t>Fifth level</a:t>
             </a:r>
             <a:endParaRPr lang="es-CO"/>
@@ -555,76 +555,7 @@
           </a:bodyPr>
           <a:lstStyle/>
           <a:p>
-            <a:pPr marL="0" marR="0" lvl="0" indent="0" algn="l" defTabSz="914400" rtl="0" eaLnBrk="1" fontAlgn="auto" latinLnBrk="0" hangingPunct="1">
-              <a:lnSpc>
-                <a:spcPct val="100000"/>
-              </a:lnSpc>
-              <a:spcBef>
-                <a:spcPts val="0"/>
-              </a:spcBef>
-              <a:spcAft>
-                <a:spcPts val="0"/>
-              </a:spcAft>
-              <a:buClrTx/>
-              <a:buSzTx/>
-              <a:buFontTx/>
-              <a:buNone/>
-              <a:tabLst/>
-              <a:defRPr/>
-            </a:pPr>
-            <a:r>
-              <a:rPr lang="es-CO" dirty="0"/>
-              <a:t>Hola a todos, Hoy exploraremos el mundo del iCloud Computing, uno de los avances mas importantes de nuestra era..</a:t>
-            </a:r>
-          </a:p>
-          <a:p>
-            <a:pPr marL="0" marR="0" lvl="0" indent="0" algn="l" defTabSz="914400" rtl="0" eaLnBrk="1" fontAlgn="auto" latinLnBrk="0" hangingPunct="1">
-              <a:lnSpc>
-                <a:spcPct val="100000"/>
-              </a:lnSpc>
-              <a:spcBef>
-                <a:spcPts val="0"/>
-              </a:spcBef>
-              <a:spcAft>
-                <a:spcPts val="0"/>
-              </a:spcAft>
-              <a:buClrTx/>
-              <a:buSzTx/>
-              <a:buFontTx/>
-              <a:buNone/>
-              <a:tabLst/>
-              <a:defRPr/>
-            </a:pPr>
-            <a:r>
-              <a:rPr lang="es-CO" dirty="0"/>
-              <a:t>La nube se ha convertido en el motor que impulsa desde pequeñas startups hasta corporaciones globales, permitiendo una innovación más rápida, escalabilidad bajo demanda y modelos de negocio completamente nuevos.</a:t>
-            </a:r>
-          </a:p>
-          <a:p>
-            <a:pPr marL="0" marR="0" lvl="0" indent="0" algn="l" defTabSz="914400" rtl="0" eaLnBrk="1" fontAlgn="auto" latinLnBrk="0" hangingPunct="1">
-              <a:lnSpc>
-                <a:spcPct val="100000"/>
-              </a:lnSpc>
-              <a:spcBef>
-                <a:spcPts val="0"/>
-              </a:spcBef>
-              <a:spcAft>
-                <a:spcPts val="0"/>
-              </a:spcAft>
-              <a:buClrTx/>
-              <a:buSzTx/>
-              <a:buFontTx/>
-              <a:buNone/>
-              <a:tabLst/>
-              <a:defRPr/>
-            </a:pPr>
             <a:endParaRPr lang="es-CO" dirty="0"/>
-          </a:p>
-          <a:p>
-            <a:r>
-              <a:rPr lang="es-CO" dirty="0"/>
-              <a:t>En esta clase exploraremos, Los modelos fundamentales de servicio en la nube, así como los beneficios de utilizar Cloud Computing.</a:t>
-            </a:r>
           </a:p>
         </p:txBody>
       </p:sp>
@@ -709,188 +640,6 @@
           <a:bodyPr/>
           <a:lstStyle/>
           <a:p>
-            <a:r>
-              <a:rPr lang="es-CO" dirty="0"/>
-              <a:t>Hoy en día, casi todo lo que usamos en internet —desde redes sociales hasta videojuegos en línea, plataformas educativas o apps bancarias— funciona gracias a una tecnología llamada </a:t>
-            </a:r>
-            <a:r>
-              <a:rPr lang="es-CO" b="1" dirty="0"/>
-              <a:t>computación en la nube</a:t>
-            </a:r>
-            <a:r>
-              <a:rPr lang="es-CO" dirty="0"/>
-              <a:t>, o </a:t>
-            </a:r>
-            <a:r>
-              <a:rPr lang="es-CO" i="1" dirty="0"/>
-              <a:t>Cloud Computing</a:t>
-            </a:r>
-            <a:r>
-              <a:rPr lang="es-CO" dirty="0"/>
-              <a:t>. Pero que es, Cloud Computing</a:t>
-            </a:r>
-            <a:r>
-              <a:rPr lang="en-US" dirty="0"/>
-              <a:t>?</a:t>
-            </a:r>
-          </a:p>
-          <a:p>
-            <a:r>
-              <a:rPr lang="es-CO" dirty="0"/>
-              <a:t>Cloud Computing se refiere al </a:t>
-            </a:r>
-            <a:r>
-              <a:rPr lang="es-CO" b="1" dirty="0">
-                <a:solidFill>
-                  <a:schemeClr val="accent4"/>
-                </a:solidFill>
-              </a:rPr>
-              <a:t>almacenamiento</a:t>
-            </a:r>
-            <a:r>
-              <a:rPr lang="es-CO" dirty="0">
-                <a:solidFill>
-                  <a:schemeClr val="accent4"/>
-                </a:solidFill>
-              </a:rPr>
-              <a:t> </a:t>
-            </a:r>
-            <a:r>
-              <a:rPr lang="es-CO" dirty="0"/>
-              <a:t>y </a:t>
-            </a:r>
-            <a:r>
-              <a:rPr lang="es-CO" b="1" dirty="0">
-                <a:solidFill>
-                  <a:schemeClr val="accent3"/>
-                </a:solidFill>
-              </a:rPr>
-              <a:t>acceso</a:t>
-            </a:r>
-            <a:r>
-              <a:rPr lang="es-CO" dirty="0">
-                <a:solidFill>
-                  <a:schemeClr val="accent3"/>
-                </a:solidFill>
-              </a:rPr>
-              <a:t> </a:t>
-            </a:r>
-            <a:r>
-              <a:rPr lang="es-CO" dirty="0"/>
-              <a:t>de los </a:t>
-            </a:r>
-            <a:r>
-              <a:rPr lang="es-CO" b="1" dirty="0">
-                <a:solidFill>
-                  <a:schemeClr val="accent1"/>
-                </a:solidFill>
-              </a:rPr>
-              <a:t>datos</a:t>
-            </a:r>
-            <a:r>
-              <a:rPr lang="es-CO" dirty="0">
-                <a:solidFill>
-                  <a:schemeClr val="accent1"/>
-                </a:solidFill>
-              </a:rPr>
-              <a:t> </a:t>
-            </a:r>
-            <a:r>
-              <a:rPr lang="es-CO" dirty="0"/>
-              <a:t>a través de </a:t>
-            </a:r>
-            <a:r>
-              <a:rPr lang="es-CO" b="1" dirty="0">
-                <a:solidFill>
-                  <a:schemeClr val="accent5"/>
-                </a:solidFill>
-              </a:rPr>
-              <a:t>internet</a:t>
-            </a:r>
-            <a:r>
-              <a:rPr lang="es-CO" dirty="0"/>
-              <a:t>, en lugar de </a:t>
-            </a:r>
-            <a:r>
-              <a:rPr lang="es-CO" b="1" dirty="0">
-                <a:solidFill>
-                  <a:schemeClr val="accent2"/>
-                </a:solidFill>
-              </a:rPr>
-              <a:t>almacenarlo</a:t>
-            </a:r>
-            <a:r>
-              <a:rPr lang="es-CO" dirty="0">
-                <a:solidFill>
-                  <a:schemeClr val="accent2"/>
-                </a:solidFill>
-              </a:rPr>
-              <a:t> </a:t>
-            </a:r>
-            <a:r>
-              <a:rPr lang="es-CO" dirty="0"/>
-              <a:t>en el disco duro </a:t>
-            </a:r>
-            <a:r>
-              <a:rPr lang="es-CO" b="1" dirty="0">
-                <a:solidFill>
-                  <a:schemeClr val="accent6"/>
-                </a:solidFill>
-              </a:rPr>
-              <a:t>local</a:t>
-            </a:r>
-            <a:r>
-              <a:rPr lang="es-CO" b="0" dirty="0">
-                <a:solidFill>
-                  <a:schemeClr val="accent6"/>
-                </a:solidFill>
-              </a:rPr>
-              <a:t>.</a:t>
-            </a:r>
-          </a:p>
-          <a:p>
-            <a:r>
-              <a:rPr lang="es-CO" dirty="0"/>
-              <a:t>No es algo mágico ni abstracto: son servidores reales, conectados entre sí, que permiten acceder a software, almacenar información o ejecutar procesos... todo </a:t>
-            </a:r>
-            <a:r>
-              <a:rPr lang="es-CO" b="1" dirty="0"/>
-              <a:t>desde cualquier lugar</a:t>
-            </a:r>
-            <a:r>
-              <a:rPr lang="es-CO" dirty="0"/>
-              <a:t>, sin necesidad de tener la infraestructura física en casa o en la oficina.</a:t>
-            </a:r>
-            <a:endParaRPr lang="es-CO" b="1" dirty="0">
-              <a:solidFill>
-                <a:schemeClr val="accent6"/>
-              </a:solidFill>
-            </a:endParaRPr>
-          </a:p>
-          <a:p>
-            <a:pPr marL="0" indent="0">
-              <a:buNone/>
-            </a:pPr>
-            <a:endParaRPr lang="es-CO" dirty="0"/>
-          </a:p>
-          <a:p>
-            <a:pPr marL="0" indent="0">
-              <a:buNone/>
-            </a:pPr>
-            <a:r>
-              <a:rPr lang="es-CO" dirty="0"/>
-              <a:t>Cloud Computing no es solo una tendencia: es el </a:t>
-            </a:r>
-            <a:r>
-              <a:rPr lang="es-CO" b="1" dirty="0"/>
-              <a:t>nuevo estándar tecnológico</a:t>
-            </a:r>
-            <a:r>
-              <a:rPr lang="es-CO" dirty="0"/>
-              <a:t>. Y aprenderlo te pondrá un paso en el futuro.</a:t>
-            </a:r>
-          </a:p>
-          <a:p>
             <a:endParaRPr lang="es-CO" dirty="0"/>
           </a:p>
         </p:txBody>
@@ -976,154 +725,7 @@
           <a:bodyPr/>
           <a:lstStyle/>
           <a:p>
-            <a:r>
-              <a:rPr lang="es-CO" noProof="0" dirty="0"/>
-              <a:t>Para entrar mas en materia veamos ahora los tipos de nube o las formas en las que Podemos desplegar y utilizar el Cloud Computing, </a:t>
-            </a:r>
-          </a:p>
-          <a:p>
-            <a:r>
-              <a:rPr lang="es-CO" noProof="0" dirty="0"/>
-              <a:t>El primero es,</a:t>
-            </a:r>
-          </a:p>
-          <a:p>
-            <a:pPr marL="171450" indent="-171450" algn="just">
-              <a:buFont typeface="Arial" panose="020B0604020202020204" pitchFamily="34" charset="0"/>
-              <a:buChar char="•"/>
-            </a:pPr>
-            <a:r>
-              <a:rPr lang="es-CO" sz="1200" b="1" noProof="0" dirty="0">
-                <a:solidFill>
-                  <a:schemeClr val="accent6"/>
-                </a:solidFill>
-              </a:rPr>
-              <a:t>Privado</a:t>
-            </a:r>
-            <a:r>
-              <a:rPr lang="es-CO" sz="1200" noProof="0" dirty="0">
-                <a:solidFill>
-                  <a:schemeClr val="accent6"/>
-                </a:solidFill>
-              </a:rPr>
-              <a:t> : </a:t>
-            </a:r>
-            <a:r>
-              <a:rPr lang="es-CO" sz="1200" noProof="0" dirty="0"/>
-              <a:t>Una nube privada es aquella en la que solamente una organización, utilizando tecnologías como la virtualización, tiene acceso a los recursos que se utilizan para implementar la nube. Es decir, una empresa dispone de un entorno Cloud en exclusiva.</a:t>
-            </a:r>
-          </a:p>
-          <a:p>
-            <a:pPr marL="0" indent="0" algn="just">
-              <a:buFont typeface="Arial" panose="020B0604020202020204" pitchFamily="34" charset="0"/>
-              <a:buNone/>
-            </a:pPr>
-            <a:r>
-              <a:rPr lang="es-CO" sz="1200" noProof="0" dirty="0"/>
-              <a:t>El segundo es,</a:t>
-            </a:r>
-          </a:p>
-          <a:p>
-            <a:pPr marL="171450" indent="-171450" algn="just">
-              <a:buFont typeface="Arial" panose="020B0604020202020204" pitchFamily="34" charset="0"/>
-              <a:buChar char="•"/>
-            </a:pPr>
-            <a:r>
-              <a:rPr lang="es-CO" sz="1200" b="1" noProof="0" dirty="0">
-                <a:solidFill>
-                  <a:schemeClr val="accent6"/>
-                </a:solidFill>
-              </a:rPr>
-              <a:t>Publico :</a:t>
-            </a:r>
-            <a:r>
-              <a:rPr lang="es-CO" sz="1200" noProof="0" dirty="0">
-                <a:solidFill>
-                  <a:srgbClr val="FFFF00"/>
-                </a:solidFill>
-              </a:rPr>
-              <a:t> </a:t>
-            </a:r>
-            <a:r>
-              <a:rPr lang="es-CO" sz="1200" noProof="0" dirty="0"/>
-              <a:t>Se caracteriza por ofrecer recursos sobre infraestructuras compartidas entre múltiples clientes. A estos recursos el cliente accede a través de internet o mediante conexiones VPN.</a:t>
-            </a:r>
-          </a:p>
-          <a:p>
-            <a:pPr marL="0" indent="0" algn="just">
-              <a:buFont typeface="Arial" panose="020B0604020202020204" pitchFamily="34" charset="0"/>
-              <a:buNone/>
-            </a:pPr>
-            <a:r>
-              <a:rPr lang="es-CO" sz="1200" b="0" noProof="0" dirty="0">
-                <a:solidFill>
-                  <a:schemeClr val="tx1"/>
-                </a:solidFill>
-              </a:rPr>
-              <a:t>Y por ultimo y no menos importante el,</a:t>
-            </a:r>
-          </a:p>
-          <a:p>
-            <a:pPr marL="171450" indent="-171450" algn="just">
-              <a:buFont typeface="Arial" panose="020B0604020202020204" pitchFamily="34" charset="0"/>
-              <a:buChar char="•"/>
-            </a:pPr>
-            <a:r>
-              <a:rPr lang="es-CO" sz="1200" b="1" noProof="0" dirty="0">
-                <a:solidFill>
-                  <a:schemeClr val="accent6"/>
-                </a:solidFill>
-              </a:rPr>
-              <a:t>Hibrido :</a:t>
-            </a:r>
-            <a:r>
-              <a:rPr lang="es-CO" sz="1200" noProof="0" dirty="0">
-                <a:solidFill>
-                  <a:srgbClr val="FFFF00"/>
-                </a:solidFill>
-              </a:rPr>
-              <a:t> que </a:t>
-            </a:r>
-            <a:r>
-              <a:rPr lang="es-CO" sz="1200" noProof="0" dirty="0"/>
-              <a:t>Combina recursos del Cloud Privado con los del Cloud Público. Este tipo surge a partir de la necesidad de los clientes que aunque cuentan con infraestructura propia buscan aprovechar las ventajas de los servicios de un proveedor externo que este en la nube.</a:t>
-            </a:r>
-          </a:p>
-          <a:p>
-            <a:pPr marL="0" indent="0" algn="just">
-              <a:buFont typeface="Arial" panose="020B0604020202020204" pitchFamily="34" charset="0"/>
-              <a:buNone/>
-            </a:pPr>
-            <a:endParaRPr lang="es-CO" sz="1200" noProof="0" dirty="0"/>
-          </a:p>
-          <a:p>
-            <a:pPr marL="0" indent="0" algn="just">
-              <a:buFont typeface="Arial" panose="020B0604020202020204" pitchFamily="34" charset="0"/>
-              <a:buNone/>
-            </a:pPr>
-            <a:r>
-              <a:rPr lang="es-CO" noProof="0" dirty="0"/>
-              <a:t>Conocer los modelos de despliegue te permitirá </a:t>
-            </a:r>
-            <a:r>
-              <a:rPr lang="es-CO" b="1" noProof="0" dirty="0"/>
-              <a:t>tomar decisiones técnicas y estratégicas correctas</a:t>
-            </a:r>
-            <a:r>
-              <a:rPr lang="es-CO" b="0" noProof="0" dirty="0"/>
-              <a:t>, </a:t>
-            </a:r>
-            <a:r>
-              <a:rPr lang="es-CO" noProof="0" dirty="0"/>
-              <a:t>ya que No es lo mismo diseñar una aplicación para un cliente pequeño que para un banco o una entidad gubernamental. </a:t>
-            </a:r>
-            <a:endParaRPr lang="es-CO" sz="1200" noProof="0" dirty="0"/>
-          </a:p>
-          <a:p>
-            <a:endParaRPr lang="es-CO" noProof="0" dirty="0"/>
-          </a:p>
-          <a:p>
-            <a:endParaRPr lang="es-CO" noProof="0" dirty="0"/>
+            <a:endParaRPr lang="es-CO" dirty="0"/>
           </a:p>
         </p:txBody>
       </p:sp>
@@ -1134,7 +736,7 @@
             <a:spLocks noGrp="1"/>
           </p:cNvSpPr>
           <p:nvPr>
-            <p:ph type="sldNum" sz="quarter" idx="5"/>
+            <p:ph type="sldNum" sz="quarter" idx="10"/>
           </p:nvPr>
         </p:nvSpPr>
         <p:spPr/>
@@ -1145,7 +747,7 @@
             <a:fld id="{3461A6AF-5C91-4279-A2A9-5DA981759015}" type="slidenum">
               <a:rPr lang="es-CO" smtClean="0"/>
               <a:pPr/>
-              <a:t>3</a:t>
+              <a:t>5</a:t>
             </a:fld>
             <a:endParaRPr lang="es-CO" dirty="0"/>
           </a:p>
@@ -1154,7 +756,7 @@
     </p:spTree>
     <p:extLst>
       <p:ext uri="{BB962C8B-B14F-4D97-AF65-F5344CB8AC3E}">
-        <p14:creationId xmlns:p14="http://schemas.microsoft.com/office/powerpoint/2010/main" val="1015220591"/>
+        <p14:creationId xmlns:p14="http://schemas.microsoft.com/office/powerpoint/2010/main" val="612879495"/>
       </p:ext>
     </p:extLst>
   </p:cSld>
@@ -1206,801 +808,12 @@
         <p:spPr/>
         <p:txBody>
           <a:bodyPr>
-            <a:normAutofit fontScale="85000" lnSpcReduction="20000"/>
+            <a:normAutofit fontScale="85000" lnSpcReduction="10000"/>
           </a:bodyPr>
           <a:lstStyle/>
           <a:p>
             <a:r>
-              <a:rPr lang="es-CO" dirty="0"/>
-              <a:t>En Cloud Computing, existen </a:t>
-            </a:r>
-            <a:r>
-              <a:rPr lang="es-CO" b="1" dirty="0"/>
-              <a:t>tres modelos principales de servicio</a:t>
-            </a:r>
-            <a:r>
-              <a:rPr lang="es-CO" dirty="0"/>
-              <a:t>, que definen </a:t>
-            </a:r>
-            <a:r>
-              <a:rPr lang="es-CO" i="1" dirty="0"/>
-              <a:t>qué tanto controla el usuario</a:t>
-            </a:r>
-            <a:r>
-              <a:rPr lang="es-CO" dirty="0"/>
-              <a:t> y </a:t>
-            </a:r>
-            <a:r>
-              <a:rPr lang="es-CO" i="1" dirty="0"/>
-              <a:t>qué tanto ofrece el proveedor de nube</a:t>
-            </a:r>
-            <a:r>
-              <a:rPr lang="es-CO" dirty="0"/>
-              <a:t>:</a:t>
-            </a:r>
-          </a:p>
-          <a:p>
-            <a:pPr marL="228600" indent="-228600">
-              <a:buAutoNum type="arabicPeriod"/>
-            </a:pPr>
-            <a:r>
-              <a:rPr lang="es-CO" b="1" dirty="0"/>
-              <a:t>SaaS – Software como Servicio (Software as a </a:t>
-            </a:r>
-            <a:r>
-              <a:rPr lang="es-CO" b="1" dirty="0" err="1"/>
-              <a:t>Service</a:t>
-            </a:r>
-            <a:r>
-              <a:rPr lang="es-CO" b="1" dirty="0"/>
-              <a:t>)</a:t>
-            </a:r>
-          </a:p>
-          <a:p>
-            <a:r>
-              <a:rPr lang="es-CO" dirty="0"/>
-              <a:t>El proveedor ofrece aplicaciones listas para usarse desde el navegador, sin que el usuario tenga que instalar ni mantener nada y  </a:t>
-            </a:r>
-            <a:r>
-              <a:rPr lang="es-CO" b="1" dirty="0"/>
-              <a:t>Tú solo usas</a:t>
-            </a:r>
-            <a:r>
-              <a:rPr lang="es-CO" dirty="0"/>
-              <a:t> el software, es Ideal para: usuarios finales o empresas que quieren soluciones rápidas y funcionales.</a:t>
-            </a:r>
-            <a:br>
-              <a:rPr lang="es-CO" dirty="0"/>
-            </a:br>
-            <a:r>
-              <a:rPr lang="es-CO" dirty="0"/>
-              <a:t>Ejemplo: </a:t>
-            </a:r>
-            <a:r>
-              <a:rPr lang="es-CO" b="1" dirty="0"/>
-              <a:t>Email, Office 365, CRM, Software colaborativo, sistema de ERP, o sistemas de almacenamiento como Dropbox</a:t>
-            </a:r>
-            <a:r>
-              <a:rPr lang="es-CO" dirty="0"/>
-              <a:t>.</a:t>
-            </a:r>
-          </a:p>
-          <a:p>
-            <a:endParaRPr lang="es-CO" dirty="0"/>
-          </a:p>
-          <a:p>
-            <a:pPr marL="228600" indent="-228600">
-              <a:buFont typeface="+mj-lt"/>
-              <a:buAutoNum type="arabicPeriod" startAt="2"/>
-            </a:pPr>
-            <a:r>
-              <a:rPr lang="es-CO" b="1" dirty="0"/>
-              <a:t>PaaS – Plataforma como Servicio (</a:t>
-            </a:r>
-            <a:r>
-              <a:rPr lang="es-CO" b="1" dirty="0" err="1"/>
-              <a:t>Platform</a:t>
-            </a:r>
-            <a:r>
-              <a:rPr lang="es-CO" b="1" dirty="0"/>
-              <a:t> as a </a:t>
-            </a:r>
-            <a:r>
-              <a:rPr lang="es-CO" b="1" dirty="0" err="1"/>
-              <a:t>Service</a:t>
-            </a:r>
-            <a:r>
-              <a:rPr lang="es-CO" b="1" dirty="0"/>
-              <a:t>)</a:t>
-            </a:r>
-          </a:p>
-          <a:p>
-            <a:r>
-              <a:rPr lang="es-CO" dirty="0"/>
-              <a:t>El proveedor te da un entorno listo para que desarrolles y despliegues tus aplicaciones, sin preocuparte por la infraestructura, y </a:t>
-            </a:r>
-            <a:r>
-              <a:rPr lang="es-CO" b="1" dirty="0"/>
-              <a:t>Tú administras:</a:t>
-            </a:r>
-            <a:r>
-              <a:rPr lang="es-CO" dirty="0"/>
-              <a:t> solo tu código y tus datos, es Ideal para: desarrolladores que quieren enfocarse en programar sin gestionar servidores.</a:t>
-            </a:r>
-            <a:br>
-              <a:rPr lang="es-CO" dirty="0"/>
-            </a:br>
-            <a:r>
-              <a:rPr lang="es-CO" dirty="0"/>
-              <a:t>Ejemplo: Aplicaciones desarrolladas para nube o de despliegue en web como  </a:t>
-            </a:r>
-            <a:r>
-              <a:rPr lang="es-CO" b="1" dirty="0"/>
-              <a:t>Azure App </a:t>
-            </a:r>
-            <a:r>
-              <a:rPr lang="es-CO" b="1" dirty="0" err="1"/>
-              <a:t>Service</a:t>
-            </a:r>
-            <a:r>
-              <a:rPr lang="es-CO" dirty="0"/>
-              <a:t>, </a:t>
-            </a:r>
-            <a:r>
-              <a:rPr lang="es-CO" b="1" dirty="0" err="1"/>
-              <a:t>Heroku</a:t>
-            </a:r>
-            <a:r>
-              <a:rPr lang="es-CO" dirty="0"/>
-              <a:t>, o </a:t>
-            </a:r>
-            <a:r>
-              <a:rPr lang="es-CO" b="1" dirty="0"/>
-              <a:t>Google App </a:t>
-            </a:r>
-            <a:r>
-              <a:rPr lang="es-CO" b="1" dirty="0" err="1"/>
-              <a:t>Engine</a:t>
-            </a:r>
-            <a:r>
-              <a:rPr lang="es-CO" dirty="0"/>
-              <a:t>.</a:t>
-            </a:r>
-          </a:p>
-          <a:p>
-            <a:endParaRPr lang="es-CO" b="1" dirty="0"/>
-          </a:p>
-          <a:p>
-            <a:pPr marL="228600" indent="-228600">
-              <a:buFont typeface="+mj-lt"/>
-              <a:buAutoNum type="arabicPeriod" startAt="3"/>
-            </a:pPr>
-            <a:r>
-              <a:rPr lang="es-CO" b="1" dirty="0"/>
-              <a:t>IaaS – Infraestructura como Servicio (</a:t>
-            </a:r>
-            <a:r>
-              <a:rPr lang="es-CO" b="1" dirty="0" err="1"/>
-              <a:t>Infrastructure</a:t>
-            </a:r>
-            <a:r>
-              <a:rPr lang="es-CO" b="1" dirty="0"/>
-              <a:t> as a </a:t>
-            </a:r>
-            <a:r>
-              <a:rPr lang="es-CO" b="1" dirty="0" err="1"/>
-              <a:t>Service</a:t>
-            </a:r>
-            <a:r>
-              <a:rPr lang="es-CO" b="1" dirty="0"/>
-              <a:t>)</a:t>
-            </a:r>
-          </a:p>
-          <a:p>
-            <a:r>
-              <a:rPr lang="es-CO" dirty="0"/>
-              <a:t>El proveedor te da acceso a recursos básicos como servidores virtuales, almacenamiento, redes, etc., y </a:t>
-            </a:r>
-            <a:r>
-              <a:rPr lang="es-CO" b="1" dirty="0"/>
-              <a:t>Tú administras:</a:t>
-            </a:r>
-            <a:r>
-              <a:rPr lang="es-CO" dirty="0"/>
-              <a:t> el sistema operativo, las aplicaciones y la configuración, es Ideal para: técnicos de infraestructura, administradores de sistemas y desarrolladores que quieren controlar todo.</a:t>
-            </a:r>
-            <a:br>
-              <a:rPr lang="es-CO" dirty="0"/>
-            </a:br>
-            <a:r>
-              <a:rPr lang="es-CO" dirty="0"/>
-              <a:t>Ejemplo: crear máquinas virtuales en </a:t>
-            </a:r>
-            <a:r>
-              <a:rPr lang="es-CO" b="1" dirty="0"/>
-              <a:t>Azure</a:t>
-            </a:r>
-            <a:r>
-              <a:rPr lang="es-CO" dirty="0"/>
-              <a:t>, </a:t>
-            </a:r>
-            <a:r>
-              <a:rPr lang="es-CO" b="1" dirty="0"/>
-              <a:t>AWS EC2</a:t>
-            </a:r>
-            <a:r>
-              <a:rPr lang="es-CO" dirty="0"/>
-              <a:t>, </a:t>
-            </a:r>
-            <a:r>
-              <a:rPr lang="es-CO" b="1" dirty="0"/>
-              <a:t>Google Compute </a:t>
-            </a:r>
-            <a:r>
-              <a:rPr lang="es-CO" b="1" dirty="0" err="1"/>
-              <a:t>Engine</a:t>
-            </a:r>
-            <a:r>
-              <a:rPr lang="es-CO" dirty="0"/>
-              <a:t>.</a:t>
-            </a:r>
-          </a:p>
-          <a:p>
-            <a:endParaRPr lang="es-CO" b="1" dirty="0"/>
-          </a:p>
-          <a:p>
-            <a:r>
-              <a:rPr lang="es-CO" b="1" dirty="0"/>
-              <a:t>En resumen:</a:t>
-            </a:r>
-          </a:p>
-          <a:p>
-            <a:pPr marL="0" marR="0" lvl="0" indent="0" algn="l" defTabSz="914400" rtl="0" eaLnBrk="1" fontAlgn="auto" latinLnBrk="0" hangingPunct="1">
-              <a:lnSpc>
-                <a:spcPct val="100000"/>
-              </a:lnSpc>
-              <a:spcBef>
-                <a:spcPts val="0"/>
-              </a:spcBef>
-              <a:spcAft>
-                <a:spcPts val="0"/>
-              </a:spcAft>
-              <a:buClrTx/>
-              <a:buSzTx/>
-              <a:buFontTx/>
-              <a:buNone/>
-              <a:tabLst/>
-              <a:defRPr/>
-            </a:pPr>
-            <a:r>
-              <a:rPr lang="es-CO" dirty="0"/>
-              <a:t>En el Modelo IaaS, ¿Qué gestionas tú? El Sistema operativo, y las apps, ¿Qué gestiona el proveedor? El Hardware, la red, y el almacenamiento.</a:t>
-            </a:r>
-          </a:p>
-          <a:p>
-            <a:endParaRPr lang="es-CO" dirty="0"/>
-          </a:p>
-          <a:p>
-            <a:pPr marL="0" marR="0" lvl="0" indent="0" algn="l" defTabSz="914400" rtl="0" eaLnBrk="1" fontAlgn="auto" latinLnBrk="0" hangingPunct="1">
-              <a:lnSpc>
-                <a:spcPct val="100000"/>
-              </a:lnSpc>
-              <a:spcBef>
-                <a:spcPts val="0"/>
-              </a:spcBef>
-              <a:spcAft>
-                <a:spcPts val="0"/>
-              </a:spcAft>
-              <a:buClrTx/>
-              <a:buSzTx/>
-              <a:buFontTx/>
-              <a:buNone/>
-              <a:tabLst/>
-              <a:defRPr/>
-            </a:pPr>
-            <a:r>
-              <a:rPr lang="es-CO" dirty="0"/>
-              <a:t>En el Modelo PaaS, ¿Qué gestionas tú? El Código, y los datos, ¿Qué gestiona el proveedor? La Infraestructura, el Sistema Operativo, y la plataforma base.</a:t>
-            </a:r>
-          </a:p>
-          <a:p>
-            <a:pPr marL="0" marR="0" lvl="0" indent="0" algn="l" defTabSz="914400" rtl="0" eaLnBrk="1" fontAlgn="auto" latinLnBrk="0" hangingPunct="1">
-              <a:lnSpc>
-                <a:spcPct val="100000"/>
-              </a:lnSpc>
-              <a:spcBef>
-                <a:spcPts val="0"/>
-              </a:spcBef>
-              <a:spcAft>
-                <a:spcPts val="0"/>
-              </a:spcAft>
-              <a:buClrTx/>
-              <a:buSzTx/>
-              <a:buFontTx/>
-              <a:buNone/>
-              <a:tabLst/>
-              <a:defRPr/>
-            </a:pPr>
-            <a:endParaRPr lang="es-CO" dirty="0"/>
-          </a:p>
-          <a:p>
-            <a:pPr marL="0" marR="0" lvl="0" indent="0" algn="l" defTabSz="914400" rtl="0" eaLnBrk="1" fontAlgn="auto" latinLnBrk="0" hangingPunct="1">
-              <a:lnSpc>
-                <a:spcPct val="100000"/>
-              </a:lnSpc>
-              <a:spcBef>
-                <a:spcPts val="0"/>
-              </a:spcBef>
-              <a:spcAft>
-                <a:spcPts val="0"/>
-              </a:spcAft>
-              <a:buClrTx/>
-              <a:buSzTx/>
-              <a:buFontTx/>
-              <a:buNone/>
-              <a:tabLst/>
-              <a:defRPr/>
-            </a:pPr>
-            <a:r>
-              <a:rPr lang="es-CO" dirty="0"/>
-              <a:t>En el Modelo SaaS, ¿Qué gestionas tú? Solo el uso del software, ¿Qué gestiona el proveedor? Todo lo demás.</a:t>
-            </a:r>
-          </a:p>
-          <a:p>
-            <a:endParaRPr lang="es-CO" dirty="0"/>
-          </a:p>
-          <a:p>
-            <a:r>
-              <a:rPr lang="es-CO" dirty="0"/>
-              <a:t>Comprender estos modelos te permite elegir la </a:t>
-            </a:r>
-            <a:r>
-              <a:rPr lang="es-CO" b="1" dirty="0"/>
-              <a:t>mejor solución según el proyecto</a:t>
-            </a:r>
-            <a:r>
-              <a:rPr lang="es-CO" dirty="0"/>
-              <a:t>, el presupuesto y el nivel de control que necesitas.</a:t>
-            </a:r>
-          </a:p>
-          <a:p>
-            <a:endParaRPr lang="es-CO" dirty="0"/>
-          </a:p>
-        </p:txBody>
-      </p:sp>
-      <p:sp>
-        <p:nvSpPr>
-          <p:cNvPr id="4" name="Slide Number Placeholder 3"/>
-          <p:cNvSpPr>
-            <a:spLocks noGrp="1"/>
-          </p:cNvSpPr>
-          <p:nvPr>
-            <p:ph type="sldNum" sz="quarter" idx="5"/>
-          </p:nvPr>
-        </p:nvSpPr>
-        <p:spPr/>
-        <p:txBody>
-          <a:bodyPr/>
-          <a:lstStyle/>
-          <a:p>
-            <a:fld id="{3461A6AF-5C91-4279-A2A9-5DA981759015}" type="slidenum">
-              <a:rPr lang="es-CO" smtClean="0"/>
-              <a:pPr/>
-              <a:t>4</a:t>
-            </a:fld>
-            <a:endParaRPr lang="es-CO" dirty="0"/>
-          </a:p>
-        </p:txBody>
-      </p:sp>
-    </p:spTree>
-    <p:extLst>
-      <p:ext uri="{BB962C8B-B14F-4D97-AF65-F5344CB8AC3E}">
-        <p14:creationId xmlns:p14="http://schemas.microsoft.com/office/powerpoint/2010/main" val="3078387499"/>
-      </p:ext>
-    </p:extLst>
-  </p:cSld>
-  <p:clrMapOvr>
-    <a:masterClrMapping/>
-  </p:clrMapOvr>
-</p:notes>
-</file>
-
-<file path=ppt/notesSlides/notesSlide5.xml><?xml version="1.0" encoding="utf-8"?>
-<p:notes xmlns:a="http://schemas.openxmlformats.org/drawingml/2006/main" xmlns:r="http://schemas.openxmlformats.org/officeDocument/2006/relationships" xmlns:p="http://schemas.openxmlformats.org/presentationml/2006/main">
-  <p:cSld>
-    <p:spTree>
-      <p:nvGrpSpPr>
-        <p:cNvPr id="1" name=""/>
-        <p:cNvGrpSpPr/>
-        <p:nvPr/>
-      </p:nvGrpSpPr>
-      <p:grpSpPr>
-        <a:xfrm>
-          <a:off x="0" y="0"/>
-          <a:ext cx="0" cy="0"/>
-          <a:chOff x="0" y="0"/>
-          <a:chExt cx="0" cy="0"/>
-        </a:xfrm>
-      </p:grpSpPr>
-      <p:sp>
-        <p:nvSpPr>
-          <p:cNvPr id="2" name="Slide Image Placeholder 1"/>
-          <p:cNvSpPr>
-            <a:spLocks noGrp="1" noRot="1" noChangeAspect="1"/>
-          </p:cNvSpPr>
-          <p:nvPr>
-            <p:ph type="sldImg"/>
-          </p:nvPr>
-        </p:nvSpPr>
-        <p:spPr/>
-      </p:sp>
-      <p:sp>
-        <p:nvSpPr>
-          <p:cNvPr id="3" name="Notes Placeholder 2"/>
-          <p:cNvSpPr>
-            <a:spLocks noGrp="1"/>
-          </p:cNvSpPr>
-          <p:nvPr>
-            <p:ph type="body" idx="1"/>
-          </p:nvPr>
-        </p:nvSpPr>
-        <p:spPr/>
-        <p:txBody>
-          <a:bodyPr>
-            <a:normAutofit fontScale="92500" lnSpcReduction="20000"/>
-          </a:bodyPr>
-          <a:lstStyle/>
-          <a:p>
-            <a:r>
-              <a:rPr lang="es-CO" noProof="0" dirty="0"/>
-              <a:t>Veamos ahora un poco mas en detalle estos modelos, comparándolos con el modelo </a:t>
-            </a:r>
-            <a:r>
-              <a:rPr lang="es-CO" noProof="0" dirty="0" err="1"/>
-              <a:t>On</a:t>
-            </a:r>
-            <a:r>
-              <a:rPr lang="es-CO" noProof="0" dirty="0"/>
-              <a:t>-Premise, que es lo que la mayoría de las empresas cuentan, antes de pensar en pasarse a la nube o antes de comenzar a utilizar servicios de Cloud Computing.</a:t>
-            </a:r>
-          </a:p>
-          <a:p>
-            <a:endParaRPr lang="es-CO" noProof="0" dirty="0"/>
-          </a:p>
-          <a:p>
-            <a:r>
-              <a:rPr lang="es-CO" noProof="0" dirty="0"/>
-              <a:t>En el Modelo </a:t>
-            </a:r>
-            <a:r>
-              <a:rPr lang="es-CO" noProof="0" dirty="0" err="1"/>
-              <a:t>On</a:t>
-            </a:r>
-            <a:r>
-              <a:rPr lang="es-CO" noProof="0" dirty="0"/>
-              <a:t>-Premise, se tienen físicamente los servidores en un Data-Center al cual , el administrador del sistema, puede acceder y tener el control de todo, maquina, recursos y aplicaciones.</a:t>
-            </a:r>
-          </a:p>
-          <a:p>
-            <a:endParaRPr lang="es-CO" noProof="0" dirty="0"/>
-          </a:p>
-          <a:p>
-            <a:r>
-              <a:rPr lang="es-CO" noProof="0" dirty="0"/>
-              <a:t>En el modelo </a:t>
-            </a:r>
-            <a:r>
-              <a:rPr lang="es-CO" noProof="0" dirty="0" err="1"/>
-              <a:t>Infrastructure</a:t>
-            </a:r>
-            <a:r>
-              <a:rPr lang="es-CO" noProof="0" dirty="0"/>
-              <a:t> as a </a:t>
-            </a:r>
-            <a:r>
-              <a:rPr lang="es-CO" noProof="0" dirty="0" err="1"/>
-              <a:t>Service</a:t>
-            </a:r>
-            <a:r>
-              <a:rPr lang="es-CO" noProof="0" dirty="0"/>
-              <a:t> (IaaS), el administrador del sistema solo tiene acceso remoto a las maquinas, para instalar el sistema operativo, definir la configuración, copiar los datos e instalar las aplicaciones que requiera; en cambio el proveedor de servicios es el encargado de crear la maquina física, mediante la virtualización, definir el tipo de disco duro, la memoria y define la red a donde puede ser conectada la maquina.</a:t>
-            </a:r>
-          </a:p>
-          <a:p>
-            <a:endParaRPr lang="es-CO" noProof="0" dirty="0"/>
-          </a:p>
-          <a:p>
-            <a:r>
-              <a:rPr lang="es-CO" noProof="0" dirty="0"/>
-              <a:t>En el Modelo </a:t>
-            </a:r>
-            <a:r>
-              <a:rPr lang="es-CO" noProof="0" dirty="0" err="1"/>
-              <a:t>Platform</a:t>
-            </a:r>
-            <a:r>
-              <a:rPr lang="es-CO" noProof="0" dirty="0"/>
-              <a:t> as a </a:t>
-            </a:r>
-            <a:r>
-              <a:rPr lang="es-CO" noProof="0" dirty="0" err="1"/>
-              <a:t>Service</a:t>
-            </a:r>
-            <a:r>
-              <a:rPr lang="es-CO" noProof="0" dirty="0"/>
-              <a:t> (PaaS), el administrador del sistema , Solo puede instalar la aplicación y definir sus datos, mediante un acceso remoto en la plataforma de la nube, mientras que el proveedor servicios se encarga de administrar la maquina físicamente asignando los recursos de memoria, procesador, sistema operativo y configuración de la red, </a:t>
-            </a:r>
-          </a:p>
-          <a:p>
-            <a:endParaRPr lang="es-CO" noProof="0" dirty="0"/>
-          </a:p>
-          <a:p>
-            <a:r>
-              <a:rPr lang="es-CO" noProof="0" dirty="0"/>
-              <a:t>Y Por último, en el modelo de software as a </a:t>
-            </a:r>
-            <a:r>
-              <a:rPr lang="es-CO" noProof="0" dirty="0" err="1"/>
-              <a:t>Service</a:t>
-            </a:r>
-            <a:r>
-              <a:rPr lang="es-CO" noProof="0" dirty="0"/>
-              <a:t> (SaaS) , el administrador del sistema solo puede hacer uso de la aplicación y de los datos, pero es el proveedor de servicios de nube que se encarga de crear la maquina, definir los recursos de, memoria, almacenamiento, procesador, sistema operativo, configuración de red, además de instalar y configura la aplicación.</a:t>
-            </a:r>
-          </a:p>
-          <a:p>
-            <a:endParaRPr lang="es-CO" noProof="0" dirty="0"/>
-          </a:p>
-          <a:p>
-            <a:r>
-              <a:rPr lang="es-CO" noProof="0" dirty="0"/>
-              <a:t>Podemos ver que a medida que avanzamos, menos responsabilidad tiene el administrador del sistema, y mayor alcance tiene el proveedor de servicios de la nube, lo que cambia, es que el administrador del sistema debe estar pendiente del uso de la aplicación y de la administración de los datos de la misma.</a:t>
-            </a:r>
-          </a:p>
-          <a:p>
-            <a:endParaRPr lang="es-CO" noProof="0" dirty="0"/>
-          </a:p>
-          <a:p>
-            <a:endParaRPr lang="es-CO" noProof="0" dirty="0"/>
-          </a:p>
-        </p:txBody>
-      </p:sp>
-      <p:sp>
-        <p:nvSpPr>
-          <p:cNvPr id="4" name="Slide Number Placeholder 3"/>
-          <p:cNvSpPr>
-            <a:spLocks noGrp="1"/>
-          </p:cNvSpPr>
-          <p:nvPr>
-            <p:ph type="sldNum" sz="quarter" idx="10"/>
-          </p:nvPr>
-        </p:nvSpPr>
-        <p:spPr/>
-        <p:txBody>
-          <a:bodyPr/>
-          <a:lstStyle/>
-          <a:p>
-            <a:fld id="{3461A6AF-5C91-4279-A2A9-5DA981759015}" type="slidenum">
-              <a:rPr lang="es-CO" smtClean="0"/>
-              <a:pPr/>
-              <a:t>5</a:t>
-            </a:fld>
-            <a:endParaRPr lang="es-CO" dirty="0"/>
-          </a:p>
-        </p:txBody>
-      </p:sp>
-    </p:spTree>
-    <p:extLst>
-      <p:ext uri="{BB962C8B-B14F-4D97-AF65-F5344CB8AC3E}">
-        <p14:creationId xmlns:p14="http://schemas.microsoft.com/office/powerpoint/2010/main" val="612879495"/>
-      </p:ext>
-    </p:extLst>
-  </p:cSld>
-  <p:clrMapOvr>
-    <a:masterClrMapping/>
-  </p:clrMapOvr>
-</p:notes>
-</file>
-
-<file path=ppt/notesSlides/notesSlide6.xml><?xml version="1.0" encoding="utf-8"?>
-<p:notes xmlns:a="http://schemas.openxmlformats.org/drawingml/2006/main" xmlns:r="http://schemas.openxmlformats.org/officeDocument/2006/relationships" xmlns:p="http://schemas.openxmlformats.org/presentationml/2006/main">
-  <p:cSld>
-    <p:spTree>
-      <p:nvGrpSpPr>
-        <p:cNvPr id="1" name=""/>
-        <p:cNvGrpSpPr/>
-        <p:nvPr/>
-      </p:nvGrpSpPr>
-      <p:grpSpPr>
-        <a:xfrm>
-          <a:off x="0" y="0"/>
-          <a:ext cx="0" cy="0"/>
-          <a:chOff x="0" y="0"/>
-          <a:chExt cx="0" cy="0"/>
-        </a:xfrm>
-      </p:grpSpPr>
-      <p:sp>
-        <p:nvSpPr>
-          <p:cNvPr id="2" name="Slide Image Placeholder 1"/>
-          <p:cNvSpPr>
-            <a:spLocks noGrp="1" noRot="1" noChangeAspect="1"/>
-          </p:cNvSpPr>
-          <p:nvPr>
-            <p:ph type="sldImg"/>
-          </p:nvPr>
-        </p:nvSpPr>
-        <p:spPr/>
-      </p:sp>
-      <p:sp>
-        <p:nvSpPr>
-          <p:cNvPr id="3" name="Notes Placeholder 2"/>
-          <p:cNvSpPr>
-            <a:spLocks noGrp="1"/>
-          </p:cNvSpPr>
-          <p:nvPr>
-            <p:ph type="body" idx="1"/>
-          </p:nvPr>
-        </p:nvSpPr>
-        <p:spPr/>
-        <p:txBody>
-          <a:bodyPr>
-            <a:normAutofit lnSpcReduction="10000"/>
-          </a:bodyPr>
-          <a:lstStyle/>
-          <a:p>
-            <a:r>
-              <a:rPr lang="es-CO" dirty="0"/>
-              <a:t>Para aterrizar mejor las diferencias entre los modelos, vamos a utilizar el ejemplo de Pizza como Servicio.</a:t>
-            </a:r>
-          </a:p>
-          <a:p>
-            <a:r>
-              <a:rPr lang="es-CO" dirty="0"/>
-              <a:t>Nuestro modelo </a:t>
-            </a:r>
-            <a:r>
-              <a:rPr lang="es-CO" dirty="0" err="1"/>
-              <a:t>On</a:t>
-            </a:r>
-            <a:r>
-              <a:rPr lang="es-CO" dirty="0"/>
-              <a:t>-Premise o Tradicional, es como la pizza Casera, ya que somos nosotros los encargados de todo, de seleccionar los recursos o ingredientes, prepararlos, utilizar el Horno y utensilios, por último servirlos en el comedor y utilizar los cubiertos para comer el producto final.</a:t>
-            </a:r>
-          </a:p>
-          <a:p>
-            <a:endParaRPr lang="es-CO" dirty="0"/>
-          </a:p>
-          <a:p>
-            <a:r>
-              <a:rPr lang="es-CO" dirty="0"/>
-              <a:t>En el modelo Infraestructura como Servicio, es como la piza congelada,  ya tenemos </a:t>
-            </a:r>
-            <a:r>
-              <a:rPr lang="es-CO" dirty="0" err="1"/>
-              <a:t>pre-configurados</a:t>
-            </a:r>
-            <a:r>
-              <a:rPr lang="es-CO" dirty="0"/>
-              <a:t> los ingredientes, y lo que utilizaremos será el horno, el comedor y cubiertos para comer el producto final.</a:t>
-            </a:r>
-          </a:p>
-          <a:p>
-            <a:endParaRPr lang="es-CO" dirty="0"/>
-          </a:p>
-          <a:p>
-            <a:r>
-              <a:rPr lang="es-CO" dirty="0"/>
-              <a:t>En el modelos Plataforma como Servicio, es como pedir a domicilio, solo recibimos el producto final y solo utilizamos el comedor y los cubiertos para comer el producto final.</a:t>
-            </a:r>
-          </a:p>
-          <a:p>
-            <a:endParaRPr lang="es-CO" dirty="0"/>
-          </a:p>
-          <a:p>
-            <a:r>
-              <a:rPr lang="es-CO" dirty="0"/>
-              <a:t>Y por último en el modelo Software como Servicio, es como salir a comer por fuera en un restaurante, el proveedor selecciona los ingredientes utiliza los recursos, como el horno, la electricidad o el gas, prepara el producto final y lo sirve en el comedor y brinda los cubiertos, lo único que vamos a hacer es ir a consumir el producto final.</a:t>
-            </a:r>
-          </a:p>
-          <a:p>
-            <a:endParaRPr lang="es-CO" dirty="0"/>
-          </a:p>
-          <a:p>
-            <a:r>
-              <a:rPr lang="es-CO" dirty="0"/>
-              <a:t>Con este ejemplo podemos clarificar la diferencia entre los 3 modelos principales, aunque pueden haber variaciones, el sentido sigue siendo el mismo a medida que avanzamos, menos interacción con los recursos físicos vamos a tener y mayor consumo del producto final tenemos.</a:t>
-            </a:r>
-          </a:p>
-          <a:p>
-            <a:endParaRPr lang="es-CO" dirty="0"/>
-          </a:p>
-        </p:txBody>
-      </p:sp>
-      <p:sp>
-        <p:nvSpPr>
-          <p:cNvPr id="4" name="Slide Number Placeholder 3"/>
-          <p:cNvSpPr>
-            <a:spLocks noGrp="1"/>
-          </p:cNvSpPr>
-          <p:nvPr>
-            <p:ph type="sldNum" sz="quarter" idx="5"/>
-          </p:nvPr>
-        </p:nvSpPr>
-        <p:spPr/>
-        <p:txBody>
-          <a:bodyPr/>
-          <a:lstStyle/>
-          <a:p>
-            <a:fld id="{3461A6AF-5C91-4279-A2A9-5DA981759015}" type="slidenum">
-              <a:rPr lang="es-CO" smtClean="0"/>
-              <a:pPr/>
-              <a:t>6</a:t>
-            </a:fld>
-            <a:endParaRPr lang="es-CO" dirty="0"/>
-          </a:p>
-        </p:txBody>
-      </p:sp>
-    </p:spTree>
-    <p:extLst>
-      <p:ext uri="{BB962C8B-B14F-4D97-AF65-F5344CB8AC3E}">
-        <p14:creationId xmlns:p14="http://schemas.microsoft.com/office/powerpoint/2010/main" val="2440142681"/>
-      </p:ext>
-    </p:extLst>
-  </p:cSld>
-  <p:clrMapOvr>
-    <a:masterClrMapping/>
-  </p:clrMapOvr>
-</p:notes>
-</file>
-
-<file path=ppt/notesSlides/notesSlide7.xml><?xml version="1.0" encoding="utf-8"?>
-<p:notes xmlns:a="http://schemas.openxmlformats.org/drawingml/2006/main" xmlns:r="http://schemas.openxmlformats.org/officeDocument/2006/relationships" xmlns:p="http://schemas.openxmlformats.org/presentationml/2006/main">
-  <p:cSld>
-    <p:spTree>
-      <p:nvGrpSpPr>
-        <p:cNvPr id="1" name=""/>
-        <p:cNvGrpSpPr/>
-        <p:nvPr/>
-      </p:nvGrpSpPr>
-      <p:grpSpPr>
-        <a:xfrm>
-          <a:off x="0" y="0"/>
-          <a:ext cx="0" cy="0"/>
-          <a:chOff x="0" y="0"/>
-          <a:chExt cx="0" cy="0"/>
-        </a:xfrm>
-      </p:grpSpPr>
-      <p:sp>
-        <p:nvSpPr>
-          <p:cNvPr id="2" name="Slide Image Placeholder 1"/>
-          <p:cNvSpPr>
-            <a:spLocks noGrp="1" noRot="1" noChangeAspect="1"/>
-          </p:cNvSpPr>
-          <p:nvPr>
-            <p:ph type="sldImg"/>
-          </p:nvPr>
-        </p:nvSpPr>
-        <p:spPr/>
-      </p:sp>
-      <p:sp>
-        <p:nvSpPr>
-          <p:cNvPr id="3" name="Notes Placeholder 2"/>
-          <p:cNvSpPr>
-            <a:spLocks noGrp="1"/>
-          </p:cNvSpPr>
-          <p:nvPr>
-            <p:ph type="body" idx="1"/>
-          </p:nvPr>
-        </p:nvSpPr>
-        <p:spPr/>
-        <p:txBody>
-          <a:bodyPr>
-            <a:normAutofit fontScale="55000" lnSpcReduction="20000"/>
-          </a:bodyPr>
-          <a:lstStyle/>
-          <a:p>
-            <a:r>
-              <a:rPr lang="es-CO" sz="1200" b="0" i="0" kern="1200" dirty="0">
+              <a:rPr lang="en-US" sz="1200" b="0" i="0" kern="1200" dirty="0" smtClean="0">
                 <a:solidFill>
                   <a:schemeClr val="tx1"/>
                 </a:solidFill>
@@ -2009,25 +822,11 @@
                 <a:ea typeface="+mn-ea"/>
                 <a:cs typeface="+mn-cs"/>
               </a:rPr>
-              <a:t>Veamos ahora los principales beneficios de la computación en la nube.</a:t>
-            </a:r>
-          </a:p>
-          <a:p>
-            <a:r>
-              <a:rPr lang="es-CO" sz="1200" b="0" i="0" kern="1200" dirty="0">
-                <a:solidFill>
-                  <a:schemeClr val="tx1"/>
-                </a:solidFill>
-                <a:effectLst/>
-                <a:latin typeface="+mn-lt"/>
-                <a:ea typeface="+mn-ea"/>
-                <a:cs typeface="+mn-cs"/>
-              </a:rPr>
-              <a:t>La computación en la nube supone un gran cambio respecto a la forma tradicional en que las empresas conciben los recursos de Tecnología. </a:t>
-            </a:r>
-          </a:p>
-          <a:p>
-            <a:endParaRPr lang="es-CO" sz="1200" b="0" i="0" kern="1200" dirty="0">
+              <a:t>https://azure.microsoft.com/en-us/overview/what-is-cloud-computing/#benefits</a:t>
+            </a:r>
+          </a:p>
+          <a:p>
+            <a:endParaRPr lang="en-US" sz="1200" b="0" i="0" kern="1200" dirty="0" smtClean="0">
               <a:solidFill>
                 <a:schemeClr val="tx1"/>
               </a:solidFill>
@@ -2039,7 +838,7 @@
           </a:p>
           <a:p>
             <a:r>
-              <a:rPr lang="es-CO" sz="1200" b="0" i="0" kern="1200" dirty="0">
+              <a:rPr lang="en-US" sz="1200" b="1" i="0" kern="1200" dirty="0" err="1" smtClean="0">
                 <a:solidFill>
                   <a:schemeClr val="tx1"/>
                 </a:solidFill>
@@ -2048,11 +847,9 @@
                 <a:ea typeface="+mn-ea"/>
                 <a:cs typeface="+mn-cs"/>
               </a:rPr>
-              <a:t>A continuación, se presentan siete razones comunes por las que las organizaciones recurren a los servicios de computación en la nube:</a:t>
-            </a:r>
-          </a:p>
-          <a:p>
-            <a:endParaRPr lang="en-US" sz="1200" b="0" i="0" kern="1200" dirty="0">
+              <a:t>Costos</a:t>
+            </a:r>
+            <a:endParaRPr lang="en-US" sz="1200" b="1" i="0" kern="1200" dirty="0" smtClean="0">
               <a:solidFill>
                 <a:schemeClr val="tx1"/>
               </a:solidFill>
@@ -2064,7 +861,7 @@
           </a:p>
           <a:p>
             <a:r>
-              <a:rPr lang="en-US" sz="1200" b="1" i="0" kern="1200" dirty="0" err="1">
+              <a:rPr lang="es-CO" sz="1200" b="0" i="0" kern="1200" dirty="0" smtClean="0">
                 <a:solidFill>
                   <a:schemeClr val="tx1"/>
                 </a:solidFill>
@@ -2073,9 +870,11 @@
                 <a:ea typeface="+mn-ea"/>
                 <a:cs typeface="+mn-cs"/>
               </a:rPr>
-              <a:t>Costos</a:t>
-            </a:r>
-            <a:endParaRPr lang="en-US" sz="1200" b="1" i="0" kern="1200" dirty="0">
+              <a:t>La computación en la nube elimina el gasto de capital de comprar hardware y software y configurar y ejecutar centros de datos en el sitio: los bastidores de servidores, la electricidad las 24 horas para energía y refrigeración, y los expertos en TI para administrar la infraestructura. Se suma rápido.</a:t>
+            </a:r>
+          </a:p>
+          <a:p>
+            <a:endParaRPr lang="es-CO" sz="1200" b="0" i="0" kern="1200" dirty="0" smtClean="0">
               <a:solidFill>
                 <a:schemeClr val="tx1"/>
               </a:solidFill>
@@ -2087,7 +886,7 @@
           </a:p>
           <a:p>
             <a:r>
-              <a:rPr lang="es-CO" sz="1200" b="0" i="0" kern="1200" dirty="0">
+              <a:rPr lang="en-US" sz="1200" b="1" i="0" kern="1200" dirty="0" err="1" smtClean="0">
                 <a:solidFill>
                   <a:schemeClr val="tx1"/>
                 </a:solidFill>
@@ -2096,11 +895,9 @@
                 <a:ea typeface="+mn-ea"/>
                 <a:cs typeface="+mn-cs"/>
               </a:rPr>
-              <a:t>La computación en la nube elimina el gasto de capital de comprar hardware y software y configurar y ejecutar centros de datos en el sitio: los bastidores de servidores, la electricidad las 24 horas para energía y refrigeración, y los expertos en TI para administrar la infraestructura. Se suma rápido.</a:t>
-            </a:r>
-          </a:p>
-          <a:p>
-            <a:endParaRPr lang="es-CO" sz="1200" b="0" i="0" kern="1200" dirty="0">
+              <a:t>Velocidad</a:t>
+            </a:r>
+            <a:endParaRPr lang="en-US" sz="1200" b="1" i="0" kern="1200" dirty="0" smtClean="0">
               <a:solidFill>
                 <a:schemeClr val="tx1"/>
               </a:solidFill>
@@ -2112,7 +909,7 @@
           </a:p>
           <a:p>
             <a:r>
-              <a:rPr lang="en-US" sz="1200" b="1" i="0" kern="1200" dirty="0" err="1">
+              <a:rPr lang="es-CO" sz="1200" b="0" i="0" kern="1200" dirty="0" smtClean="0">
                 <a:solidFill>
                   <a:schemeClr val="tx1"/>
                 </a:solidFill>
@@ -2121,9 +918,11 @@
                 <a:ea typeface="+mn-ea"/>
                 <a:cs typeface="+mn-cs"/>
               </a:rPr>
-              <a:t>Velocidad</a:t>
-            </a:r>
-            <a:endParaRPr lang="en-US" sz="1200" b="1" i="0" kern="1200" dirty="0">
+              <a:t>La mayoría de los servicios de computación en la nube se brindan en autoservicio y bajo demanda, por lo que incluso grandes cantidades de recursos informáticos se pueden aprovisionar en minutos, generalmente con solo unos pocos clics del mouse, brindando a las empresas mucha flexibilidad y eliminando la presión de la planificación de la capacidad.</a:t>
+            </a:r>
+          </a:p>
+          <a:p>
+            <a:endParaRPr lang="es-CO" sz="1200" b="0" i="0" kern="1200" dirty="0" smtClean="0">
               <a:solidFill>
                 <a:schemeClr val="tx1"/>
               </a:solidFill>
@@ -2135,7 +934,7 @@
           </a:p>
           <a:p>
             <a:r>
-              <a:rPr lang="es-CO" sz="1200" b="0" i="0" kern="1200" dirty="0">
+              <a:rPr lang="en-US" sz="1200" b="1" i="0" kern="1200" dirty="0" err="1" smtClean="0">
                 <a:solidFill>
                   <a:schemeClr val="tx1"/>
                 </a:solidFill>
@@ -2144,11 +943,9 @@
                 <a:ea typeface="+mn-ea"/>
                 <a:cs typeface="+mn-cs"/>
               </a:rPr>
-              <a:t>La mayoría de los servicios de computación en la nube se brindan en autoservicio y bajo demanda, por lo que incluso grandes cantidades de recursos informáticos se pueden aprovisionar en minutos, generalmente con solo unos pocos clics del mouse, brindando a las empresas mucha flexibilidad y eliminando la presión de la planificación de la capacidad.</a:t>
-            </a:r>
-          </a:p>
-          <a:p>
-            <a:endParaRPr lang="es-CO" sz="1200" b="0" i="0" kern="1200" dirty="0">
+              <a:t>Escalamiento</a:t>
+            </a:r>
+            <a:endParaRPr lang="en-US" sz="1200" b="1" i="0" kern="1200" dirty="0" smtClean="0">
               <a:solidFill>
                 <a:schemeClr val="tx1"/>
               </a:solidFill>
@@ -2160,7 +957,7 @@
           </a:p>
           <a:p>
             <a:r>
-              <a:rPr lang="en-US" sz="1200" b="1" i="0" kern="1200" dirty="0" err="1">
+              <a:rPr lang="es-CO" sz="1200" b="0" i="0" kern="1200" dirty="0" smtClean="0">
                 <a:solidFill>
                   <a:schemeClr val="tx1"/>
                 </a:solidFill>
@@ -2169,9 +966,11 @@
                 <a:ea typeface="+mn-ea"/>
                 <a:cs typeface="+mn-cs"/>
               </a:rPr>
-              <a:t>Escalamiento</a:t>
-            </a:r>
-            <a:endParaRPr lang="en-US" sz="1200" b="1" i="0" kern="1200" dirty="0">
+              <a:t>Los beneficios de los servicios de computación en la nube incluyen la capacidad de escalar de manera elástica. En el lenguaje de la nube, eso significa entregar la cantidad correcta de recursos de TI, por ejemplo, más o menos poder de cómputo, almacenamiento, ancho de banda, justo cuando se necesitan y desde la ubicación geográfica correcta.</a:t>
+            </a:r>
+          </a:p>
+          <a:p>
+            <a:endParaRPr lang="es-CO" sz="1200" b="0" i="0" kern="1200" dirty="0" smtClean="0">
               <a:solidFill>
                 <a:schemeClr val="tx1"/>
               </a:solidFill>
@@ -2183,7 +982,7 @@
           </a:p>
           <a:p>
             <a:r>
-              <a:rPr lang="es-CO" sz="1200" b="0" i="0" kern="1200" dirty="0">
+              <a:rPr lang="en-US" sz="1200" b="1" i="0" kern="1200" dirty="0" err="1" smtClean="0">
                 <a:solidFill>
                   <a:schemeClr val="tx1"/>
                 </a:solidFill>
@@ -2192,11 +991,9 @@
                 <a:ea typeface="+mn-ea"/>
                 <a:cs typeface="+mn-cs"/>
               </a:rPr>
-              <a:t>Los beneficios de los servicios de computación en la nube incluyen la capacidad de escalar de manera elástica. En el lenguaje de la nube, eso significa entregar la cantidad correcta de recursos de TI, por ejemplo, más o menos poder de cómputo, almacenamiento, ancho de banda, justo cuando se necesitan y desde la ubicación geográfica correcta.</a:t>
-            </a:r>
-          </a:p>
-          <a:p>
-            <a:endParaRPr lang="es-CO" sz="1200" b="0" i="0" kern="1200" dirty="0">
+              <a:t>Productividad</a:t>
+            </a:r>
+            <a:endParaRPr lang="en-US" sz="1200" b="1" i="0" kern="1200" dirty="0" smtClean="0">
               <a:solidFill>
                 <a:schemeClr val="tx1"/>
               </a:solidFill>
@@ -2208,7 +1005,7 @@
           </a:p>
           <a:p>
             <a:r>
-              <a:rPr lang="en-US" sz="1200" b="1" i="0" kern="1200" dirty="0" err="1">
+              <a:rPr lang="es-CO" sz="1200" b="0" i="0" kern="1200" dirty="0" smtClean="0">
                 <a:solidFill>
                   <a:schemeClr val="tx1"/>
                 </a:solidFill>
@@ -2217,9 +1014,11 @@
                 <a:ea typeface="+mn-ea"/>
                 <a:cs typeface="+mn-cs"/>
               </a:rPr>
-              <a:t>Productividad</a:t>
-            </a:r>
-            <a:endParaRPr lang="en-US" sz="1200" b="1" i="0" kern="1200" dirty="0">
+              <a:t>Los centros de datos en el sitio generalmente requieren una gran cantidad de "estantería y apilamiento": configuración de hardware, parches de software y otras tareas de administración de TI que consumen mucho tiempo. La computación en la nube elimina la necesidad de muchas de estas tareas, por lo que los equipos de TI pueden dedicar tiempo a lograr objetivos comerciales más importantes.</a:t>
+            </a:r>
+          </a:p>
+          <a:p>
+            <a:endParaRPr lang="es-CO" sz="1200" b="0" i="0" kern="1200" dirty="0" smtClean="0">
               <a:solidFill>
                 <a:schemeClr val="tx1"/>
               </a:solidFill>
@@ -2231,7 +1030,7 @@
           </a:p>
           <a:p>
             <a:r>
-              <a:rPr lang="es-CO" sz="1200" b="0" i="0" kern="1200" dirty="0">
+              <a:rPr lang="en-US" sz="1200" b="1" i="0" kern="1200" dirty="0" err="1" smtClean="0">
                 <a:solidFill>
                   <a:schemeClr val="tx1"/>
                 </a:solidFill>
@@ -2240,11 +1039,9 @@
                 <a:ea typeface="+mn-ea"/>
                 <a:cs typeface="+mn-cs"/>
               </a:rPr>
-              <a:t>Los centros de datos en el sitio generalmente requieren una gran cantidad de "estantería y apilamiento": configuración de hardware, parches de software y otras tareas de administración de TI que consumen mucho tiempo. La computación en la nube elimina la necesidad de muchas de estas tareas, por lo que los equipos de TI pueden dedicar tiempo a lograr objetivos comerciales más importantes.</a:t>
-            </a:r>
-          </a:p>
-          <a:p>
-            <a:endParaRPr lang="es-CO" sz="1200" b="0" i="0" kern="1200" dirty="0">
+              <a:t>Rendimiento</a:t>
+            </a:r>
+            <a:endParaRPr lang="en-US" sz="1200" b="1" i="0" kern="1200" dirty="0" smtClean="0">
               <a:solidFill>
                 <a:schemeClr val="tx1"/>
               </a:solidFill>
@@ -2256,7 +1053,7 @@
           </a:p>
           <a:p>
             <a:r>
-              <a:rPr lang="en-US" sz="1200" b="1" i="0" kern="1200" dirty="0" err="1">
+              <a:rPr lang="es-CO" sz="1200" b="0" i="0" kern="1200" dirty="0" smtClean="0">
                 <a:solidFill>
                   <a:schemeClr val="tx1"/>
                 </a:solidFill>
@@ -2265,9 +1062,11 @@
                 <a:ea typeface="+mn-ea"/>
                 <a:cs typeface="+mn-cs"/>
               </a:rPr>
-              <a:t>Rendimiento</a:t>
-            </a:r>
-            <a:endParaRPr lang="en-US" sz="1200" b="1" i="0" kern="1200" dirty="0">
+              <a:t>Los mayores servicios de computación en la nube se ejecutan en una red mundial de centros de datos seguros, que se actualizan regularmente a la última generación de hardware informático rápido y eficiente. Esto ofrece varios beneficios sobre un solo centro de datos corporativo, incluida una latencia de red reducida para aplicaciones y mayores economías de escala.</a:t>
+            </a:r>
+          </a:p>
+          <a:p>
+            <a:endParaRPr lang="es-CO" sz="1200" b="0" i="0" kern="1200" dirty="0" smtClean="0">
               <a:solidFill>
                 <a:schemeClr val="tx1"/>
               </a:solidFill>
@@ -2279,7 +1078,7 @@
           </a:p>
           <a:p>
             <a:r>
-              <a:rPr lang="es-CO" sz="1200" b="0" i="0" kern="1200" dirty="0">
+              <a:rPr lang="en-US" sz="1200" b="1" i="0" kern="1200" dirty="0" err="1" smtClean="0">
                 <a:solidFill>
                   <a:schemeClr val="tx1"/>
                 </a:solidFill>
@@ -2288,11 +1087,9 @@
                 <a:ea typeface="+mn-ea"/>
                 <a:cs typeface="+mn-cs"/>
               </a:rPr>
-              <a:t>Los mayores servicios de computación en la nube se ejecutan en una red mundial de centros de datos seguros, que se actualizan regularmente a la última generación de hardware informático rápido y eficiente. Esto ofrece varios beneficios sobre un solo centro de datos corporativo, incluida una latencia de red reducida para aplicaciones y mayores economías de escala.</a:t>
-            </a:r>
-          </a:p>
-          <a:p>
-            <a:endParaRPr lang="es-CO" sz="1200" b="0" i="0" kern="1200" dirty="0">
+              <a:t>Confiabilidad</a:t>
+            </a:r>
+            <a:endParaRPr lang="en-US" sz="1200" b="1" i="0" kern="1200" dirty="0" smtClean="0">
               <a:solidFill>
                 <a:schemeClr val="tx1"/>
               </a:solidFill>
@@ -2304,7 +1101,7 @@
           </a:p>
           <a:p>
             <a:r>
-              <a:rPr lang="en-US" sz="1200" b="1" i="0" kern="1200" dirty="0" err="1">
+              <a:rPr lang="es-CO" sz="1200" b="0" i="0" kern="1200" dirty="0" smtClean="0">
                 <a:solidFill>
                   <a:schemeClr val="tx1"/>
                 </a:solidFill>
@@ -2313,9 +1110,11 @@
                 <a:ea typeface="+mn-ea"/>
                 <a:cs typeface="+mn-cs"/>
               </a:rPr>
-              <a:t>Confiabilidad</a:t>
-            </a:r>
-            <a:endParaRPr lang="en-US" sz="1200" b="1" i="0" kern="1200" dirty="0">
+              <a:t>La computación en la nube hace que la copia de seguridad de datos, la recuperación ante desastres y la continuidad del negocio sean más fáciles y menos costosas porque los datos se pueden duplicar en múltiples sitios redundantes en la red del proveedor de la nube.</a:t>
+            </a:r>
+          </a:p>
+          <a:p>
+            <a:endParaRPr lang="es-CO" sz="1200" b="0" i="0" kern="1200" dirty="0" smtClean="0">
               <a:solidFill>
                 <a:schemeClr val="tx1"/>
               </a:solidFill>
@@ -2327,7 +1126,7 @@
           </a:p>
           <a:p>
             <a:r>
-              <a:rPr lang="es-CO" sz="1200" b="0" i="0" kern="1200" dirty="0">
+              <a:rPr lang="en-US" sz="1200" b="1" i="0" kern="1200" dirty="0" err="1" smtClean="0">
                 <a:solidFill>
                   <a:schemeClr val="tx1"/>
                 </a:solidFill>
@@ -2336,11 +1135,9 @@
                 <a:ea typeface="+mn-ea"/>
                 <a:cs typeface="+mn-cs"/>
               </a:rPr>
-              <a:t>La computación en la nube hace que la copia de seguridad de datos, la recuperación ante desastres y la continuidad del negocio sean más fáciles y menos costosas porque los datos se pueden duplicar en múltiples sitios redundantes en la red del proveedor de la nube.</a:t>
-            </a:r>
-          </a:p>
-          <a:p>
-            <a:endParaRPr lang="es-CO" sz="1200" b="0" i="0" kern="1200" dirty="0">
+              <a:t>Seguridad</a:t>
+            </a:r>
+            <a:endParaRPr lang="en-US" sz="1200" b="1" i="0" kern="1200" dirty="0" smtClean="0">
               <a:solidFill>
                 <a:schemeClr val="tx1"/>
               </a:solidFill>
@@ -2352,30 +1149,7 @@
           </a:p>
           <a:p>
             <a:r>
-              <a:rPr lang="en-US" sz="1200" b="1" i="0" kern="1200" dirty="0" err="1">
-                <a:solidFill>
-                  <a:schemeClr val="tx1"/>
-                </a:solidFill>
-                <a:effectLst/>
-                <a:latin typeface="+mn-lt"/>
-                <a:ea typeface="+mn-ea"/>
-                <a:cs typeface="+mn-cs"/>
-              </a:rPr>
-              <a:t>Seguridad</a:t>
-            </a:r>
-            <a:endParaRPr lang="en-US" sz="1200" b="1" i="0" kern="1200" dirty="0">
-              <a:solidFill>
-                <a:schemeClr val="tx1"/>
-              </a:solidFill>
-              <a:effectLst/>
-              <a:latin typeface="+mn-lt"/>
-              <a:ea typeface="+mn-ea"/>
-              <a:cs typeface="+mn-cs"/>
-            </a:endParaRPr>
-          </a:p>
-          <a:p>
-            <a:r>
-              <a:rPr lang="es-CO" sz="1200" b="0" i="0" kern="1200" dirty="0">
+              <a:rPr lang="es-CO" sz="1200" b="0" i="0" kern="1200" dirty="0" smtClean="0">
                 <a:solidFill>
                   <a:schemeClr val="tx1"/>
                 </a:solidFill>
@@ -2386,61 +1160,6 @@
               </a:rPr>
               <a:t>Muchos proveedores de la nube ofrecen un amplio conjunto de políticas, tecnologías y controles que fortalecen su postura de seguridad en general, lo que ayuda a proteger sus datos, aplicaciones e infraestructura de posibles amenazas.</a:t>
             </a:r>
-          </a:p>
-          <a:p>
-            <a:endParaRPr lang="es-CO" sz="1200" b="0" i="0" kern="1200" dirty="0">
-              <a:solidFill>
-                <a:schemeClr val="tx1"/>
-              </a:solidFill>
-              <a:effectLst/>
-              <a:latin typeface="+mn-lt"/>
-              <a:ea typeface="+mn-ea"/>
-              <a:cs typeface="+mn-cs"/>
-            </a:endParaRPr>
-          </a:p>
-          <a:p>
-            <a:endParaRPr lang="es-CO" sz="1200" b="0" i="0" kern="1200" dirty="0">
-              <a:solidFill>
-                <a:schemeClr val="tx1"/>
-              </a:solidFill>
-              <a:effectLst/>
-              <a:latin typeface="+mn-lt"/>
-              <a:ea typeface="+mn-ea"/>
-              <a:cs typeface="+mn-cs"/>
-            </a:endParaRPr>
-          </a:p>
-          <a:p>
-            <a:pPr marL="0" marR="0" lvl="0" indent="0" algn="l" defTabSz="914400" rtl="0" eaLnBrk="1" fontAlgn="auto" latinLnBrk="0" hangingPunct="1">
-              <a:lnSpc>
-                <a:spcPct val="100000"/>
-              </a:lnSpc>
-              <a:spcBef>
-                <a:spcPts val="0"/>
-              </a:spcBef>
-              <a:spcAft>
-                <a:spcPts val="0"/>
-              </a:spcAft>
-              <a:buClrTx/>
-              <a:buSzTx/>
-              <a:buFontTx/>
-              <a:buNone/>
-              <a:tabLst/>
-              <a:defRPr/>
-            </a:pPr>
-            <a:r>
-              <a:rPr lang="en-US" sz="1200" b="0" i="0" kern="1200" dirty="0">
-                <a:solidFill>
-                  <a:schemeClr val="tx1"/>
-                </a:solidFill>
-                <a:effectLst/>
-                <a:latin typeface="+mn-lt"/>
-                <a:ea typeface="+mn-ea"/>
-                <a:cs typeface="+mn-cs"/>
-              </a:rPr>
-              <a:t>https://azure.microsoft.com/en-us/overview/what-is-cloud-computing/#benefits</a:t>
-            </a:r>
-          </a:p>
-          <a:p>
             <a:endParaRPr lang="es-CO" dirty="0"/>
           </a:p>
         </p:txBody>
@@ -2473,247 +1192,6 @@
     <p:extLst>
       <p:ext uri="{BB962C8B-B14F-4D97-AF65-F5344CB8AC3E}">
         <p14:creationId xmlns:p14="http://schemas.microsoft.com/office/powerpoint/2010/main" val="3871406755"/>
-      </p:ext>
-    </p:extLst>
-  </p:cSld>
-  <p:clrMapOvr>
-    <a:masterClrMapping/>
-  </p:clrMapOvr>
-</p:notes>
-</file>
-
-<file path=ppt/notesSlides/notesSlide8.xml><?xml version="1.0" encoding="utf-8"?>
-<p:notes xmlns:a="http://schemas.openxmlformats.org/drawingml/2006/main" xmlns:r="http://schemas.openxmlformats.org/officeDocument/2006/relationships" xmlns:p="http://schemas.openxmlformats.org/presentationml/2006/main">
-  <p:cSld>
-    <p:spTree>
-      <p:nvGrpSpPr>
-        <p:cNvPr id="1" name=""/>
-        <p:cNvGrpSpPr/>
-        <p:nvPr/>
-      </p:nvGrpSpPr>
-      <p:grpSpPr>
-        <a:xfrm>
-          <a:off x="0" y="0"/>
-          <a:ext cx="0" cy="0"/>
-          <a:chOff x="0" y="0"/>
-          <a:chExt cx="0" cy="0"/>
-        </a:xfrm>
-      </p:grpSpPr>
-      <p:sp>
-        <p:nvSpPr>
-          <p:cNvPr id="2" name="Slide Image Placeholder 1"/>
-          <p:cNvSpPr>
-            <a:spLocks noGrp="1" noRot="1" noChangeAspect="1"/>
-          </p:cNvSpPr>
-          <p:nvPr>
-            <p:ph type="sldImg"/>
-          </p:nvPr>
-        </p:nvSpPr>
-        <p:spPr/>
-      </p:sp>
-      <p:sp>
-        <p:nvSpPr>
-          <p:cNvPr id="3" name="Notes Placeholder 2"/>
-          <p:cNvSpPr>
-            <a:spLocks noGrp="1"/>
-          </p:cNvSpPr>
-          <p:nvPr>
-            <p:ph type="body" idx="1"/>
-          </p:nvPr>
-        </p:nvSpPr>
-        <p:spPr/>
-        <p:txBody>
-          <a:bodyPr/>
-          <a:lstStyle/>
-          <a:p>
-            <a:pPr marL="0" marR="0" lvl="0" indent="0" algn="l" defTabSz="914400" rtl="0" eaLnBrk="1" fontAlgn="auto" latinLnBrk="0" hangingPunct="1">
-              <a:lnSpc>
-                <a:spcPct val="100000"/>
-              </a:lnSpc>
-              <a:spcBef>
-                <a:spcPts val="0"/>
-              </a:spcBef>
-              <a:spcAft>
-                <a:spcPts val="0"/>
-              </a:spcAft>
-              <a:buClrTx/>
-              <a:buSzTx/>
-              <a:buFontTx/>
-              <a:buNone/>
-              <a:tabLst/>
-              <a:defRPr/>
-            </a:pPr>
-            <a:r>
-              <a:rPr lang="es-CO" dirty="0"/>
-              <a:t>Espero que esta presentación les haya aclarado los tipos de nubes, </a:t>
-            </a:r>
-            <a:r>
-              <a:rPr lang="es-CO" dirty="0" err="1"/>
-              <a:t>asi</a:t>
-            </a:r>
-            <a:r>
-              <a:rPr lang="es-CO" dirty="0"/>
-              <a:t> como los modelos de servicio mas utilizados.</a:t>
-            </a:r>
-          </a:p>
-          <a:p>
-            <a:pPr marL="0" marR="0" lvl="0" indent="0" algn="l" defTabSz="914400" rtl="0" eaLnBrk="1" fontAlgn="auto" latinLnBrk="0" hangingPunct="1">
-              <a:lnSpc>
-                <a:spcPct val="100000"/>
-              </a:lnSpc>
-              <a:spcBef>
-                <a:spcPts val="0"/>
-              </a:spcBef>
-              <a:spcAft>
-                <a:spcPts val="0"/>
-              </a:spcAft>
-              <a:buClrTx/>
-              <a:buSzTx/>
-              <a:buFontTx/>
-              <a:buNone/>
-              <a:tabLst/>
-              <a:defRPr/>
-            </a:pPr>
-            <a:r>
-              <a:rPr lang="es-CO" dirty="0"/>
-              <a:t>Pero si aún tienen preguntas, por favor, dejen un comentario y se les responderá lo antes posible. </a:t>
-            </a:r>
-          </a:p>
-        </p:txBody>
-      </p:sp>
-      <p:sp>
-        <p:nvSpPr>
-          <p:cNvPr id="4" name="Slide Number Placeholder 3"/>
-          <p:cNvSpPr>
-            <a:spLocks noGrp="1"/>
-          </p:cNvSpPr>
-          <p:nvPr>
-            <p:ph type="sldNum" sz="quarter" idx="5"/>
-          </p:nvPr>
-        </p:nvSpPr>
-        <p:spPr/>
-        <p:txBody>
-          <a:bodyPr/>
-          <a:lstStyle/>
-          <a:p>
-            <a:fld id="{3461A6AF-5C91-4279-A2A9-5DA981759015}" type="slidenum">
-              <a:rPr lang="es-CO" smtClean="0"/>
-              <a:pPr/>
-              <a:t>8</a:t>
-            </a:fld>
-            <a:endParaRPr lang="es-CO" dirty="0"/>
-          </a:p>
-        </p:txBody>
-      </p:sp>
-    </p:spTree>
-    <p:extLst>
-      <p:ext uri="{BB962C8B-B14F-4D97-AF65-F5344CB8AC3E}">
-        <p14:creationId xmlns:p14="http://schemas.microsoft.com/office/powerpoint/2010/main" val="2906276440"/>
-      </p:ext>
-    </p:extLst>
-  </p:cSld>
-  <p:clrMapOvr>
-    <a:masterClrMapping/>
-  </p:clrMapOvr>
-</p:notes>
-</file>
-
-<file path=ppt/notesSlides/notesSlide9.xml><?xml version="1.0" encoding="utf-8"?>
-<p:notes xmlns:a="http://schemas.openxmlformats.org/drawingml/2006/main" xmlns:r="http://schemas.openxmlformats.org/officeDocument/2006/relationships" xmlns:p="http://schemas.openxmlformats.org/presentationml/2006/main">
-  <p:cSld>
-    <p:spTree>
-      <p:nvGrpSpPr>
-        <p:cNvPr id="1" name=""/>
-        <p:cNvGrpSpPr/>
-        <p:nvPr/>
-      </p:nvGrpSpPr>
-      <p:grpSpPr>
-        <a:xfrm>
-          <a:off x="0" y="0"/>
-          <a:ext cx="0" cy="0"/>
-          <a:chOff x="0" y="0"/>
-          <a:chExt cx="0" cy="0"/>
-        </a:xfrm>
-      </p:grpSpPr>
-      <p:sp>
-        <p:nvSpPr>
-          <p:cNvPr id="2" name="Slide Image Placeholder 1"/>
-          <p:cNvSpPr>
-            <a:spLocks noGrp="1" noRot="1" noChangeAspect="1"/>
-          </p:cNvSpPr>
-          <p:nvPr>
-            <p:ph type="sldImg"/>
-          </p:nvPr>
-        </p:nvSpPr>
-        <p:spPr/>
-      </p:sp>
-      <p:sp>
-        <p:nvSpPr>
-          <p:cNvPr id="3" name="Notes Placeholder 2"/>
-          <p:cNvSpPr>
-            <a:spLocks noGrp="1"/>
-          </p:cNvSpPr>
-          <p:nvPr>
-            <p:ph type="body" idx="1"/>
-          </p:nvPr>
-        </p:nvSpPr>
-        <p:spPr/>
-        <p:txBody>
-          <a:bodyPr/>
-          <a:lstStyle/>
-          <a:p>
-            <a:pPr marL="0" marR="0" lvl="0" indent="0" algn="l" defTabSz="914400" rtl="0" eaLnBrk="1" fontAlgn="auto" latinLnBrk="0" hangingPunct="1">
-              <a:lnSpc>
-                <a:spcPct val="100000"/>
-              </a:lnSpc>
-              <a:spcBef>
-                <a:spcPts val="0"/>
-              </a:spcBef>
-              <a:spcAft>
-                <a:spcPts val="0"/>
-              </a:spcAft>
-              <a:buClrTx/>
-              <a:buSzTx/>
-              <a:buFontTx/>
-              <a:buNone/>
-              <a:tabLst/>
-              <a:defRPr/>
-            </a:pPr>
-            <a:r>
-              <a:rPr lang="es-CO" dirty="0"/>
-              <a:t>Muchas gracias a todos.</a:t>
-            </a:r>
-          </a:p>
-        </p:txBody>
-      </p:sp>
-      <p:sp>
-        <p:nvSpPr>
-          <p:cNvPr id="4" name="Slide Number Placeholder 3"/>
-          <p:cNvSpPr>
-            <a:spLocks noGrp="1"/>
-          </p:cNvSpPr>
-          <p:nvPr>
-            <p:ph type="sldNum" sz="quarter" idx="5"/>
-          </p:nvPr>
-        </p:nvSpPr>
-        <p:spPr/>
-        <p:txBody>
-          <a:bodyPr/>
-          <a:lstStyle/>
-          <a:p>
-            <a:fld id="{3461A6AF-5C91-4279-A2A9-5DA981759015}" type="slidenum">
-              <a:rPr lang="es-CO" smtClean="0"/>
-              <a:pPr/>
-              <a:t>9</a:t>
-            </a:fld>
-            <a:endParaRPr lang="es-CO" dirty="0"/>
-          </a:p>
-        </p:txBody>
-      </p:sp>
-    </p:spTree>
-    <p:extLst>
-      <p:ext uri="{BB962C8B-B14F-4D97-AF65-F5344CB8AC3E}">
-        <p14:creationId xmlns:p14="http://schemas.microsoft.com/office/powerpoint/2010/main" val="46413597"/>
       </p:ext>
     </p:extLst>
   </p:cSld>
@@ -2840,7 +1318,7 @@
           </a:lstStyle>
           <a:p>
             <a:r>
-              <a:rPr lang="en-US"/>
+              <a:rPr lang="en-US" smtClean="0"/>
               <a:t>Click to edit Master title style</a:t>
             </a:r>
             <a:endParaRPr lang="es-CO"/>
@@ -2959,7 +1437,7 @@
           </a:lstStyle>
           <a:p>
             <a:r>
-              <a:rPr lang="en-US"/>
+              <a:rPr lang="en-US" smtClean="0"/>
               <a:t>Click to edit Master subtitle style</a:t>
             </a:r>
             <a:endParaRPr lang="es-CO"/>
@@ -2984,7 +1462,7 @@
             <a:fld id="{42C1F1CB-57C8-46CD-A207-903DDF210919}" type="datetimeFigureOut">
               <a:rPr lang="es-CO" smtClean="0"/>
               <a:pPr/>
-              <a:t>7/05/2025</a:t>
+              <a:t>25/03/2022</a:t>
             </a:fld>
             <a:endParaRPr lang="es-CO" dirty="0"/>
           </a:p>
@@ -3158,7 +1636,7 @@
           </a:lstStyle>
           <a:p>
             <a:r>
-              <a:rPr lang="en-US"/>
+              <a:rPr lang="en-US" smtClean="0"/>
               <a:t>Click to edit Master title style</a:t>
             </a:r>
             <a:endParaRPr lang="es-CO"/>
@@ -3277,7 +1755,7 @@
           </a:lstStyle>
           <a:p>
             <a:r>
-              <a:rPr lang="en-US"/>
+              <a:rPr lang="en-US" smtClean="0"/>
               <a:t>Click to edit Master subtitle style</a:t>
             </a:r>
             <a:endParaRPr lang="es-CO"/>
@@ -3302,7 +1780,7 @@
             <a:fld id="{42C1F1CB-57C8-46CD-A207-903DDF210919}" type="datetimeFigureOut">
               <a:rPr lang="es-CO" smtClean="0"/>
               <a:pPr/>
-              <a:t>7/05/2025</a:t>
+              <a:t>25/03/2022</a:t>
             </a:fld>
             <a:endParaRPr lang="es-CO" dirty="0"/>
           </a:p>
@@ -3461,7 +1939,7 @@
           <a:lstStyle/>
           <a:p>
             <a:r>
-              <a:rPr lang="en-US"/>
+              <a:rPr lang="en-US" smtClean="0"/>
               <a:t>Click to edit Master title style</a:t>
             </a:r>
             <a:endParaRPr lang="es-CO"/>
@@ -3496,35 +1974,35 @@
           <a:p>
             <a:pPr lvl="0"/>
             <a:r>
-              <a:rPr lang="en-US"/>
+              <a:rPr lang="en-US" smtClean="0"/>
               <a:t>Click to edit Master text styles</a:t>
             </a:r>
           </a:p>
           <a:p>
             <a:pPr lvl="1"/>
             <a:r>
-              <a:rPr lang="en-US"/>
+              <a:rPr lang="en-US" smtClean="0"/>
               <a:t>Second level</a:t>
             </a:r>
           </a:p>
           <a:p>
             <a:pPr lvl="2"/>
             <a:r>
-              <a:rPr lang="en-US"/>
+              <a:rPr lang="en-US" smtClean="0"/>
               <a:t>Third level</a:t>
             </a:r>
           </a:p>
           <a:p>
             <a:pPr lvl="3"/>
             <a:r>
-              <a:rPr lang="en-US"/>
+              <a:rPr lang="en-US" smtClean="0"/>
               <a:t>Fourth level</a:t>
             </a:r>
           </a:p>
           <a:p>
             <a:pPr lvl="4"/>
             <a:r>
-              <a:rPr lang="en-US"/>
+              <a:rPr lang="en-US" smtClean="0"/>
               <a:t>Fifth level</a:t>
             </a:r>
             <a:endParaRPr lang="es-CO" dirty="0"/>
@@ -3549,7 +2027,7 @@
             <a:fld id="{42C1F1CB-57C8-46CD-A207-903DDF210919}" type="datetimeFigureOut">
               <a:rPr lang="es-CO" smtClean="0"/>
               <a:pPr/>
-              <a:t>7/05/2025</a:t>
+              <a:t>25/03/2022</a:t>
             </a:fld>
             <a:endParaRPr lang="es-CO" dirty="0"/>
           </a:p>
@@ -3708,7 +2186,7 @@
           <a:lstStyle/>
           <a:p>
             <a:r>
-              <a:rPr lang="en-US"/>
+              <a:rPr lang="en-US" smtClean="0"/>
               <a:t>Click to edit Master title style</a:t>
             </a:r>
             <a:endParaRPr lang="es-CO"/>
@@ -3737,35 +2215,35 @@
           <a:p>
             <a:pPr lvl="0"/>
             <a:r>
-              <a:rPr lang="en-US"/>
+              <a:rPr lang="en-US" smtClean="0"/>
               <a:t>Click to edit Master text styles</a:t>
             </a:r>
           </a:p>
           <a:p>
             <a:pPr lvl="1"/>
             <a:r>
-              <a:rPr lang="en-US"/>
+              <a:rPr lang="en-US" smtClean="0"/>
               <a:t>Second level</a:t>
             </a:r>
           </a:p>
           <a:p>
             <a:pPr lvl="2"/>
             <a:r>
-              <a:rPr lang="en-US"/>
+              <a:rPr lang="en-US" smtClean="0"/>
               <a:t>Third level</a:t>
             </a:r>
           </a:p>
           <a:p>
             <a:pPr lvl="3"/>
             <a:r>
-              <a:rPr lang="en-US"/>
+              <a:rPr lang="en-US" smtClean="0"/>
               <a:t>Fourth level</a:t>
             </a:r>
           </a:p>
           <a:p>
             <a:pPr lvl="4"/>
             <a:r>
-              <a:rPr lang="en-US"/>
+              <a:rPr lang="en-US" smtClean="0"/>
               <a:t>Fifth level</a:t>
             </a:r>
             <a:endParaRPr lang="es-CO"/>
@@ -3790,7 +2268,7 @@
             <a:fld id="{42C1F1CB-57C8-46CD-A207-903DDF210919}" type="datetimeFigureOut">
               <a:rPr lang="es-CO" smtClean="0"/>
               <a:pPr/>
-              <a:t>7/05/2025</a:t>
+              <a:t>25/03/2022</a:t>
             </a:fld>
             <a:endParaRPr lang="es-CO" dirty="0"/>
           </a:p>
@@ -3949,7 +2427,7 @@
           <a:lstStyle/>
           <a:p>
             <a:r>
-              <a:rPr lang="en-US"/>
+              <a:rPr lang="en-US" smtClean="0"/>
               <a:t>Click to edit Master title style</a:t>
             </a:r>
             <a:endParaRPr lang="es-CO"/>
@@ -3978,35 +2456,35 @@
           <a:p>
             <a:pPr lvl="0"/>
             <a:r>
-              <a:rPr lang="en-US"/>
+              <a:rPr lang="en-US" smtClean="0"/>
               <a:t>Click to edit Master text styles</a:t>
             </a:r>
           </a:p>
           <a:p>
             <a:pPr lvl="1"/>
             <a:r>
-              <a:rPr lang="en-US"/>
+              <a:rPr lang="en-US" smtClean="0"/>
               <a:t>Second level</a:t>
             </a:r>
           </a:p>
           <a:p>
             <a:pPr lvl="2"/>
             <a:r>
-              <a:rPr lang="en-US"/>
+              <a:rPr lang="en-US" smtClean="0"/>
               <a:t>Third level</a:t>
             </a:r>
           </a:p>
           <a:p>
             <a:pPr lvl="3"/>
             <a:r>
-              <a:rPr lang="en-US"/>
+              <a:rPr lang="en-US" smtClean="0"/>
               <a:t>Fourth level</a:t>
             </a:r>
           </a:p>
           <a:p>
             <a:pPr lvl="4"/>
             <a:r>
-              <a:rPr lang="en-US"/>
+              <a:rPr lang="en-US" smtClean="0"/>
               <a:t>Fifth level</a:t>
             </a:r>
             <a:endParaRPr lang="es-CO"/>
@@ -4031,7 +2509,7 @@
             <a:fld id="{42C1F1CB-57C8-46CD-A207-903DDF210919}" type="datetimeFigureOut">
               <a:rPr lang="es-CO" smtClean="0"/>
               <a:pPr/>
-              <a:t>7/05/2025</a:t>
+              <a:t>25/03/2022</a:t>
             </a:fld>
             <a:endParaRPr lang="es-CO" dirty="0"/>
           </a:p>
@@ -4200,7 +2678,7 @@
           <a:lstStyle/>
           <a:p>
             <a:r>
-              <a:rPr lang="en-US"/>
+              <a:rPr lang="en-US" smtClean="0"/>
               <a:t>Click to edit Master title style</a:t>
             </a:r>
             <a:endParaRPr lang="es-CO"/>
@@ -4234,35 +2712,35 @@
           <a:p>
             <a:pPr lvl="0"/>
             <a:r>
-              <a:rPr lang="en-US"/>
+              <a:rPr lang="en-US" smtClean="0"/>
               <a:t>Click to edit Master text styles</a:t>
             </a:r>
           </a:p>
           <a:p>
             <a:pPr lvl="1"/>
             <a:r>
-              <a:rPr lang="en-US"/>
+              <a:rPr lang="en-US" smtClean="0"/>
               <a:t>Second level</a:t>
             </a:r>
           </a:p>
           <a:p>
             <a:pPr lvl="2"/>
             <a:r>
-              <a:rPr lang="en-US"/>
+              <a:rPr lang="en-US" smtClean="0"/>
               <a:t>Third level</a:t>
             </a:r>
           </a:p>
           <a:p>
             <a:pPr lvl="3"/>
             <a:r>
-              <a:rPr lang="en-US"/>
+              <a:rPr lang="en-US" smtClean="0"/>
               <a:t>Fourth level</a:t>
             </a:r>
           </a:p>
           <a:p>
             <a:pPr lvl="4"/>
             <a:r>
-              <a:rPr lang="en-US"/>
+              <a:rPr lang="en-US" smtClean="0"/>
               <a:t>Fifth level</a:t>
             </a:r>
             <a:endParaRPr lang="es-CO" dirty="0"/>
@@ -4305,7 +2783,7 @@
             <a:fld id="{42C1F1CB-57C8-46CD-A207-903DDF210919}" type="datetimeFigureOut">
               <a:rPr lang="es-CO" smtClean="0"/>
               <a:pPr/>
-              <a:t>7/05/2025</a:t>
+              <a:t>25/03/2022</a:t>
             </a:fld>
             <a:endParaRPr lang="es-CO" dirty="0"/>
           </a:p>
@@ -4708,9 +3186,10 @@
           <a:lstStyle/>
           <a:p>
             <a:r>
-              <a:rPr lang="es-CO" dirty="0"/>
+              <a:rPr lang="es-CO" dirty="0" smtClean="0"/>
               <a:t>Cloud Computing</a:t>
             </a:r>
+            <a:endParaRPr lang="es-CO" dirty="0"/>
           </a:p>
         </p:txBody>
       </p:sp>
@@ -4735,9 +3214,10 @@
           <a:lstStyle/>
           <a:p>
             <a:r>
-              <a:rPr lang="es-CO" sz="8000" dirty="0"/>
+              <a:rPr lang="es-CO" sz="8000" dirty="0" smtClean="0"/>
               <a:t>Cloud</a:t>
             </a:r>
+            <a:endParaRPr lang="es-CO" sz="8000" dirty="0"/>
           </a:p>
         </p:txBody>
       </p:sp>
@@ -4764,9 +3244,10 @@
           <a:lstStyle/>
           <a:p>
             <a:r>
-              <a:rPr lang="es-CO" dirty="0"/>
+              <a:rPr lang="es-CO" dirty="0" smtClean="0"/>
               <a:t>Julio Cesar Robles Uribe</a:t>
             </a:r>
+            <a:endParaRPr lang="es-CO" dirty="0"/>
           </a:p>
         </p:txBody>
       </p:sp>
@@ -4793,13 +3274,18 @@
           <a:lstStyle/>
           <a:p>
             <a:r>
-              <a:rPr lang="es-CO" sz="1400" dirty="0">
+              <a:rPr lang="es-CO" sz="1400" dirty="0" smtClean="0">
                 <a:solidFill>
                   <a:srgbClr val="0070C0"/>
                 </a:solidFill>
               </a:rPr>
               <a:t>Arquitecto de Soluciones</a:t>
             </a:r>
+            <a:endParaRPr lang="es-CO" sz="1400" dirty="0">
+              <a:solidFill>
+                <a:srgbClr val="0070C0"/>
+              </a:solidFill>
+            </a:endParaRPr>
           </a:p>
         </p:txBody>
       </p:sp>
@@ -4859,6 +3345,13 @@
   <p:clrMapOvr>
     <a:masterClrMapping/>
   </p:clrMapOvr>
+  <p:timing>
+    <p:tnLst>
+      <p:par>
+        <p:cTn id="1" dur="indefinite" restart="never" nodeType="tmRoot"/>
+      </p:par>
+    </p:tnLst>
+  </p:timing>
 </p:sld>
 </file>
 
@@ -4895,9 +3388,10 @@
           <a:lstStyle/>
           <a:p>
             <a:r>
-              <a:rPr lang="es-CO" dirty="0"/>
+              <a:rPr lang="es-CO" dirty="0" smtClean="0"/>
               <a:t>Cloud Computing</a:t>
             </a:r>
+            <a:endParaRPr lang="es-CO" dirty="0"/>
           </a:p>
         </p:txBody>
       </p:sp>
@@ -5126,9 +3620,10 @@
           <a:lstStyle/>
           <a:p>
             <a:r>
-              <a:rPr lang="es-CO" dirty="0"/>
+              <a:rPr lang="es-CO" dirty="0" smtClean="0"/>
               <a:t>Tipos de Cloud</a:t>
             </a:r>
+            <a:endParaRPr lang="es-CO" dirty="0"/>
           </a:p>
         </p:txBody>
       </p:sp>
@@ -5194,7 +3689,7 @@
                   <a:schemeClr val="accent6"/>
                 </a:solidFill>
               </a:rPr>
-              <a:t>Publico :</a:t>
+              <a:t>Publico</a:t>
             </a:r>
             <a:r>
               <a:rPr lang="es-CO" sz="2000" dirty="0">
@@ -5202,7 +3697,7 @@
                   <a:srgbClr val="FFFF00"/>
                 </a:solidFill>
               </a:rPr>
-              <a:t> </a:t>
+              <a:t> : </a:t>
             </a:r>
             <a:r>
               <a:rPr lang="es-ES" sz="2000" dirty="0"/>
@@ -5221,7 +3716,7 @@
                   <a:schemeClr val="accent6"/>
                 </a:solidFill>
               </a:rPr>
-              <a:t>Hibrido :</a:t>
+              <a:t>Hibrido</a:t>
             </a:r>
             <a:r>
               <a:rPr lang="es-CO" sz="2000" dirty="0">
@@ -5229,7 +3724,7 @@
                   <a:srgbClr val="FFFF00"/>
                 </a:solidFill>
               </a:rPr>
-              <a:t> </a:t>
+              <a:t> : </a:t>
             </a:r>
             <a:r>
               <a:rPr lang="es-ES" sz="2000" dirty="0"/>
@@ -5247,7 +3742,7 @@
           <p:nvPr/>
         </p:nvPicPr>
         <p:blipFill>
-          <a:blip r:embed="rId3">
+          <a:blip r:embed="rId2">
             <a:extLst>
               <a:ext uri="{28A0092B-C50C-407E-A947-70E740481C1C}">
                 <a14:useLocalDpi xmlns:a14="http://schemas.microsoft.com/office/drawing/2010/main" val="0"/>
@@ -5359,7 +3854,7 @@
               <a:buChar char="•"/>
             </a:pPr>
             <a:r>
-              <a:rPr lang="es-CO" b="1" dirty="0" err="1">
+              <a:rPr lang="es-CO" b="1" dirty="0" err="1" smtClean="0">
                 <a:solidFill>
                   <a:schemeClr val="accent6"/>
                 </a:solidFill>
@@ -5367,7 +3862,7 @@
               <a:t>SaaS</a:t>
             </a:r>
             <a:r>
-              <a:rPr lang="es-CO" b="1" dirty="0">
+              <a:rPr lang="es-CO" b="1" dirty="0" smtClean="0">
                 <a:solidFill>
                   <a:schemeClr val="accent6"/>
                 </a:solidFill>
@@ -5375,12 +3870,16 @@
               <a:t>: </a:t>
             </a:r>
             <a:r>
-              <a:rPr lang="es-ES" dirty="0" err="1"/>
+              <a:rPr lang="es-ES" dirty="0" err="1" smtClean="0"/>
               <a:t>Sosftware</a:t>
             </a:r>
             <a:r>
+              <a:rPr lang="es-ES" dirty="0" smtClean="0"/>
+              <a:t> </a:t>
+            </a:r>
+            <a:r>
               <a:rPr lang="es-ES" dirty="0"/>
-              <a:t> as a </a:t>
+              <a:t>as a </a:t>
             </a:r>
             <a:r>
               <a:rPr lang="es-ES" dirty="0" err="1"/>
@@ -5398,7 +3897,7 @@
               <a:buChar char="•"/>
             </a:pPr>
             <a:r>
-              <a:rPr lang="es-CO" b="1" dirty="0" err="1">
+              <a:rPr lang="es-CO" b="1" dirty="0" err="1" smtClean="0">
                 <a:solidFill>
                   <a:schemeClr val="accent3"/>
                 </a:solidFill>
@@ -5406,7 +3905,7 @@
               <a:t>PaaS</a:t>
             </a:r>
             <a:r>
-              <a:rPr lang="es-CO" b="1" dirty="0">
+              <a:rPr lang="es-CO" b="1" dirty="0" smtClean="0">
                 <a:solidFill>
                   <a:schemeClr val="accent3"/>
                 </a:solidFill>
@@ -5414,12 +3913,16 @@
               <a:t>: </a:t>
             </a:r>
             <a:r>
-              <a:rPr lang="es-ES" dirty="0" err="1"/>
+              <a:rPr lang="es-ES" dirty="0" err="1" smtClean="0"/>
               <a:t>Platform</a:t>
             </a:r>
             <a:r>
+              <a:rPr lang="es-ES" dirty="0" smtClean="0"/>
+              <a:t> </a:t>
+            </a:r>
+            <a:r>
               <a:rPr lang="es-ES" dirty="0"/>
-              <a:t> as a </a:t>
+              <a:t>as a </a:t>
             </a:r>
             <a:r>
               <a:rPr lang="es-ES" dirty="0" err="1"/>
@@ -5433,7 +3936,7 @@
               <a:buChar char="•"/>
             </a:pPr>
             <a:r>
-              <a:rPr lang="es-CO" b="1" dirty="0" err="1">
+              <a:rPr lang="es-CO" b="1" dirty="0" err="1" smtClean="0">
                 <a:solidFill>
                   <a:schemeClr val="accent4"/>
                 </a:solidFill>
@@ -5441,7 +3944,7 @@
               <a:t>IaaS</a:t>
             </a:r>
             <a:r>
-              <a:rPr lang="es-CO" b="1" dirty="0">
+              <a:rPr lang="es-CO" b="1" dirty="0" smtClean="0">
                 <a:solidFill>
                   <a:schemeClr val="accent4"/>
                 </a:solidFill>
@@ -5449,12 +3952,16 @@
               <a:t>: </a:t>
             </a:r>
             <a:r>
-              <a:rPr lang="es-ES" dirty="0" err="1"/>
+              <a:rPr lang="es-ES" dirty="0" err="1" smtClean="0"/>
               <a:t>Infrastructure</a:t>
             </a:r>
             <a:r>
+              <a:rPr lang="es-ES" dirty="0" smtClean="0"/>
+              <a:t> </a:t>
+            </a:r>
+            <a:r>
               <a:rPr lang="es-ES" dirty="0"/>
-              <a:t> as a </a:t>
+              <a:t>as a </a:t>
             </a:r>
             <a:r>
               <a:rPr lang="es-ES" dirty="0" err="1"/>
@@ -5479,7 +3986,7 @@
           <p:nvPr/>
         </p:nvPicPr>
         <p:blipFill>
-          <a:blip r:embed="rId3">
+          <a:blip r:embed="rId2">
             <a:clrChange>
               <a:clrFrom>
                 <a:srgbClr val="FFFFFF"/>
@@ -5531,6 +4038,13 @@
   <p:clrMapOvr>
     <a:masterClrMapping/>
   </p:clrMapOvr>
+  <p:timing>
+    <p:tnLst>
+      <p:par>
+        <p:cTn id="1" dur="indefinite" restart="never" nodeType="tmRoot"/>
+      </p:par>
+    </p:tnLst>
+  </p:timing>
 </p:sld>
 </file>
 
@@ -5568,7 +4082,11 @@
           <a:p>
             <a:r>
               <a:rPr lang="fi-FI" dirty="0"/>
-              <a:t>On Prem - IaaS – PaaS - SaaS</a:t>
+              <a:t>On Prem - IaaS – PaaS - </a:t>
+            </a:r>
+            <a:r>
+              <a:rPr lang="fi-FI" dirty="0" smtClean="0"/>
+              <a:t>SaaS</a:t>
             </a:r>
             <a:endParaRPr lang="es-CO" dirty="0"/>
           </a:p>
@@ -5818,7 +4336,7 @@
               <a:defRPr/>
             </a:pPr>
             <a:r>
-              <a:rPr kumimoji="0" lang="en-US" sz="1600" b="1" i="0" u="none" strike="noStrike" kern="1200" cap="none" spc="0" normalizeH="0" baseline="0" noProof="0" dirty="0">
+              <a:rPr kumimoji="0" lang="en-US" sz="1600" b="1" i="0" u="none" strike="noStrike" kern="1200" cap="none" spc="0" normalizeH="0" baseline="0" noProof="0" dirty="0" smtClean="0">
                 <a:ln>
                   <a:noFill/>
                 </a:ln>
@@ -5834,7 +4352,7 @@
               <a:t>(</a:t>
             </a:r>
             <a:r>
-              <a:rPr lang="es-CO" sz="1600" b="1" dirty="0" err="1">
+              <a:rPr lang="es-CO" sz="1600" b="1" dirty="0" err="1" smtClean="0">
                 <a:solidFill>
                   <a:schemeClr val="bg1"/>
                 </a:solidFill>
@@ -5844,7 +4362,7 @@
               <a:t>Datacenter</a:t>
             </a:r>
             <a:r>
-              <a:rPr lang="es-CO" sz="1600" b="1" dirty="0">
+              <a:rPr lang="es-CO" sz="1600" b="1" dirty="0" smtClean="0">
                 <a:solidFill>
                   <a:schemeClr val="bg1"/>
                 </a:solidFill>
@@ -6003,7 +4521,7 @@
               <a:defRPr/>
             </a:pPr>
             <a:r>
-              <a:rPr kumimoji="0" lang="es-CO" sz="1200" b="0" i="0" u="none" strike="noStrike" kern="1200" cap="none" spc="0" normalizeH="0" baseline="0" dirty="0">
+              <a:rPr kumimoji="0" lang="es-CO" sz="1200" b="0" i="0" u="none" strike="noStrike" kern="1200" cap="none" spc="0" normalizeH="0" baseline="0" dirty="0" smtClean="0">
                 <a:ln>
                   <a:noFill/>
                 </a:ln>
@@ -6019,6 +4537,20 @@
               </a:rPr>
               <a:t>Ustedes administran</a:t>
             </a:r>
+            <a:endParaRPr kumimoji="0" lang="es-CO" sz="1200" b="0" i="0" u="none" strike="noStrike" kern="1200" cap="none" spc="0" normalizeH="0" baseline="0" dirty="0">
+              <a:ln>
+                <a:noFill/>
+              </a:ln>
+              <a:solidFill>
+                <a:schemeClr val="bg1"/>
+              </a:solidFill>
+              <a:effectLst/>
+              <a:uLnTx/>
+              <a:uFillTx/>
+              <a:latin typeface="Segoe UI"/>
+              <a:ea typeface="+mn-ea"/>
+              <a:cs typeface="Segoe UI" panose="020B0502040204020203" pitchFamily="34" charset="0"/>
+            </a:endParaRPr>
           </a:p>
         </p:txBody>
       </p:sp>
@@ -6991,7 +5523,7 @@
               <a:defRPr/>
             </a:pPr>
             <a:r>
-              <a:rPr kumimoji="0" lang="es-CO" sz="1200" b="0" i="0" u="none" strike="noStrike" kern="1200" cap="none" spc="0" normalizeH="0" baseline="0" dirty="0">
+              <a:rPr kumimoji="0" lang="es-CO" sz="1200" b="0" i="0" u="none" strike="noStrike" kern="1200" cap="none" spc="0" normalizeH="0" baseline="0" dirty="0" smtClean="0">
                 <a:ln>
                   <a:noFill/>
                 </a:ln>
@@ -7005,8 +5537,39 @@
                 <a:ea typeface="+mn-ea"/>
                 <a:cs typeface="Segoe UI" panose="020B0502040204020203" pitchFamily="34" charset="0"/>
               </a:rPr>
-              <a:t>Cloud administra</a:t>
-            </a:r>
+              <a:t>Cloud </a:t>
+            </a:r>
+            <a:r>
+              <a:rPr kumimoji="0" lang="es-CO" sz="1200" b="0" i="0" u="none" strike="noStrike" kern="1200" cap="none" spc="0" normalizeH="0" baseline="0" dirty="0" smtClean="0">
+                <a:ln>
+                  <a:noFill/>
+                </a:ln>
+                <a:solidFill>
+                  <a:schemeClr val="bg1"/>
+                </a:solidFill>
+                <a:effectLst/>
+                <a:uLnTx/>
+                <a:uFillTx/>
+                <a:latin typeface="Segoe UI"/>
+                <a:ea typeface="+mn-ea"/>
+                <a:cs typeface="Segoe UI" panose="020B0502040204020203" pitchFamily="34" charset="0"/>
+              </a:rPr>
+              <a:t>administra</a:t>
+            </a:r>
+            <a:endParaRPr kumimoji="0" lang="es-CO" sz="1200" b="0" i="0" u="none" strike="noStrike" kern="1200" cap="none" spc="0" normalizeH="0" baseline="0" dirty="0">
+              <a:ln>
+                <a:noFill/>
+              </a:ln>
+              <a:solidFill>
+                <a:schemeClr val="bg1"/>
+              </a:solidFill>
+              <a:effectLst/>
+              <a:uLnTx/>
+              <a:uFillTx/>
+              <a:latin typeface="Segoe UI"/>
+              <a:ea typeface="+mn-ea"/>
+              <a:cs typeface="Segoe UI" panose="020B0502040204020203" pitchFamily="34" charset="0"/>
+            </a:endParaRPr>
           </a:p>
         </p:txBody>
       </p:sp>
@@ -7593,13 +6156,22 @@
               <a:defRPr/>
             </a:pPr>
             <a:r>
-              <a:rPr lang="es-CO" sz="1200" dirty="0">
+              <a:rPr lang="es-CO" sz="1200" dirty="0" smtClean="0">
                 <a:solidFill>
                   <a:schemeClr val="bg1"/>
                 </a:solidFill>
                 <a:cs typeface="Segoe UI" panose="020B0502040204020203" pitchFamily="34" charset="0"/>
               </a:rPr>
-              <a:t>Cloud administra</a:t>
+              <a:t>Cloud </a:t>
+            </a:r>
+            <a:r>
+              <a:rPr lang="es-CO" sz="1200" dirty="0">
+                <a:solidFill>
+                  <a:schemeClr val="bg1"/>
+                </a:solidFill>
+                <a:cs typeface="Segoe UI" panose="020B0502040204020203" pitchFamily="34" charset="0"/>
+              </a:rPr>
+              <a:t>administra</a:t>
             </a:r>
           </a:p>
         </p:txBody>
@@ -10151,13 +8723,22 @@
               <a:defRPr/>
             </a:pPr>
             <a:r>
-              <a:rPr lang="es-CO" sz="1200" dirty="0">
+              <a:rPr lang="es-CO" sz="1200" dirty="0" smtClean="0">
                 <a:solidFill>
                   <a:schemeClr val="bg1"/>
                 </a:solidFill>
                 <a:cs typeface="Segoe UI" panose="020B0502040204020203" pitchFamily="34" charset="0"/>
               </a:rPr>
-              <a:t>Cloud administra</a:t>
+              <a:t>Cloud </a:t>
+            </a:r>
+            <a:r>
+              <a:rPr lang="es-CO" sz="1200" dirty="0">
+                <a:solidFill>
+                  <a:schemeClr val="bg1"/>
+                </a:solidFill>
+                <a:cs typeface="Segoe UI" panose="020B0502040204020203" pitchFamily="34" charset="0"/>
+              </a:rPr>
+              <a:t>administra</a:t>
             </a:r>
           </a:p>
         </p:txBody>
@@ -10239,18 +8820,25 @@
   <p:clrMapOvr>
     <a:masterClrMapping/>
   </p:clrMapOvr>
-  <mc:AlternateContent xmlns:mc="http://schemas.openxmlformats.org/markup-compatibility/2006" xmlns:p14="http://schemas.microsoft.com/office/powerpoint/2010/main">
-    <mc:Choice Requires="p14">
+  <mc:AlternateContent xmlns:mc="http://schemas.openxmlformats.org/markup-compatibility/2006">
+    <mc:Choice xmlns:p14="http://schemas.microsoft.com/office/powerpoint/2010/main" Requires="p14">
       <p:transition spd="med" p14:dur="700">
         <p:fade/>
       </p:transition>
     </mc:Choice>
-    <mc:Fallback xmlns="">
+    <mc:Fallback>
       <p:transition spd="med">
         <p:fade/>
       </p:transition>
     </mc:Fallback>
   </mc:AlternateContent>
+  <p:timing>
+    <p:tnLst>
+      <p:par>
+        <p:cTn id="1" dur="indefinite" restart="never" nodeType="tmRoot"/>
+      </p:par>
+    </p:tnLst>
+  </p:timing>
 </p:sld>
 </file>
 
@@ -10280,7 +8868,7 @@
           <p:nvPr/>
         </p:nvPicPr>
         <p:blipFill>
-          <a:blip r:embed="rId3">
+          <a:blip r:embed="rId2">
             <a:clrChange>
               <a:clrFrom>
                 <a:srgbClr val="FFFFFF"/>
@@ -10332,6 +8920,13 @@
   <p:clrMapOvr>
     <a:masterClrMapping/>
   </p:clrMapOvr>
+  <p:timing>
+    <p:tnLst>
+      <p:par>
+        <p:cTn id="1" dur="indefinite" restart="never" nodeType="tmRoot"/>
+      </p:par>
+    </p:tnLst>
+  </p:timing>
 </p:sld>
 </file>
 
@@ -10368,9 +8963,10 @@
           <a:lstStyle/>
           <a:p>
             <a:r>
-              <a:rPr lang="es-CO" dirty="0"/>
+              <a:rPr lang="es-CO" dirty="0" smtClean="0"/>
               <a:t>Beneficios</a:t>
             </a:r>
+            <a:endParaRPr lang="es-CO" dirty="0"/>
           </a:p>
         </p:txBody>
       </p:sp>
@@ -10435,9 +9031,10 @@
             <a:lstStyle/>
             <a:p>
               <a:r>
-                <a:rPr lang="es-CO" dirty="0"/>
+                <a:rPr lang="es-CO" dirty="0" smtClean="0"/>
                 <a:t>Costos</a:t>
               </a:r>
+              <a:endParaRPr lang="es-CO" dirty="0"/>
             </a:p>
           </p:txBody>
         </p:sp>
@@ -10503,9 +9100,10 @@
             <a:lstStyle/>
             <a:p>
               <a:r>
-                <a:rPr lang="es-CO" dirty="0"/>
+                <a:rPr lang="es-CO" dirty="0" smtClean="0"/>
                 <a:t>Velocidad</a:t>
               </a:r>
+              <a:endParaRPr lang="es-CO" dirty="0"/>
             </a:p>
           </p:txBody>
         </p:sp>
@@ -10571,9 +9169,10 @@
             <a:lstStyle/>
             <a:p>
               <a:r>
-                <a:rPr lang="es-CO" dirty="0"/>
+                <a:rPr lang="es-CO" dirty="0" smtClean="0"/>
                 <a:t>Escalamiento</a:t>
               </a:r>
+              <a:endParaRPr lang="es-CO" dirty="0"/>
             </a:p>
           </p:txBody>
         </p:sp>
@@ -10639,9 +9238,10 @@
             <a:lstStyle/>
             <a:p>
               <a:r>
-                <a:rPr lang="es-CO" dirty="0"/>
+                <a:rPr lang="es-CO" dirty="0" smtClean="0"/>
                 <a:t>Productividad</a:t>
               </a:r>
+              <a:endParaRPr lang="es-CO" dirty="0"/>
             </a:p>
           </p:txBody>
         </p:sp>
@@ -10707,9 +9307,10 @@
             <a:lstStyle/>
             <a:p>
               <a:r>
-                <a:rPr lang="es-CO" dirty="0"/>
+                <a:rPr lang="es-CO" dirty="0" smtClean="0"/>
                 <a:t>Rendimiento</a:t>
               </a:r>
+              <a:endParaRPr lang="es-CO" dirty="0"/>
             </a:p>
           </p:txBody>
         </p:sp>
@@ -10775,9 +9376,10 @@
             <a:lstStyle/>
             <a:p>
               <a:r>
-                <a:rPr lang="es-CO" dirty="0"/>
+                <a:rPr lang="es-CO" dirty="0" smtClean="0"/>
                 <a:t>Confiabilidad</a:t>
               </a:r>
+              <a:endParaRPr lang="es-CO" dirty="0"/>
             </a:p>
           </p:txBody>
         </p:sp>
@@ -10843,9 +9445,10 @@
             <a:lstStyle/>
             <a:p>
               <a:r>
-                <a:rPr lang="es-CO" dirty="0"/>
+                <a:rPr lang="es-CO" dirty="0" smtClean="0"/>
                 <a:t>Seguridad</a:t>
               </a:r>
+              <a:endParaRPr lang="es-CO" dirty="0"/>
             </a:p>
           </p:txBody>
         </p:sp>
@@ -11242,9 +9845,10 @@
           <a:p>
             <a:pPr algn="ctr"/>
             <a:r>
-              <a:rPr lang="es-CO" dirty="0"/>
+              <a:rPr lang="es-CO" dirty="0" smtClean="0"/>
               <a:t>Preguntas?</a:t>
             </a:r>
+            <a:endParaRPr lang="es-CO" dirty="0"/>
           </a:p>
         </p:txBody>
       </p:sp>
@@ -11257,7 +9861,7 @@
           <p:nvPr/>
         </p:nvPicPr>
         <p:blipFill>
-          <a:blip r:embed="rId3" cstate="print"/>
+          <a:blip r:embed="rId2" cstate="print"/>
           <a:srcRect/>
           <a:stretch>
             <a:fillRect/>
@@ -11279,6 +9883,13 @@
   <p:clrMapOvr>
     <a:masterClrMapping/>
   </p:clrMapOvr>
+  <p:timing>
+    <p:tnLst>
+      <p:par>
+        <p:cTn id="1" dur="indefinite" restart="never" nodeType="tmRoot"/>
+      </p:par>
+    </p:tnLst>
+  </p:timing>
 </p:sld>
 </file>
 
@@ -11337,7 +9948,7 @@
           <a:p>
             <a:pPr algn="ctr"/>
             <a:r>
-              <a:rPr lang="en-US" sz="6600" b="1" cap="all" dirty="0">
+              <a:rPr lang="en-US" sz="6600" b="1" cap="all" dirty="0" smtClean="0">
                 <a:ln w="0"/>
                 <a:solidFill>
                   <a:srgbClr val="0066CC">
@@ -11351,6 +9962,18 @@
               </a:rPr>
               <a:t>Gracias!!!</a:t>
             </a:r>
+            <a:endParaRPr lang="en-US" sz="6600" b="1" cap="all" dirty="0">
+              <a:ln w="0"/>
+              <a:solidFill>
+                <a:srgbClr val="0066CC">
+                  <a:alpha val="74000"/>
+                </a:srgbClr>
+              </a:solidFill>
+              <a:effectLst>
+                <a:reflection blurRad="12700" stA="50000" endPos="50000" dist="5000" dir="5400000" sy="-100000" rotWithShape="0"/>
+              </a:effectLst>
+              <a:latin typeface="Berlin Sans FB Demi" pitchFamily="34" charset="0"/>
+            </a:endParaRPr>
           </a:p>
         </p:txBody>
       </p:sp>
@@ -11359,6 +9982,13 @@
   <p:clrMapOvr>
     <a:masterClrMapping/>
   </p:clrMapOvr>
+  <p:timing>
+    <p:tnLst>
+      <p:par>
+        <p:cTn id="1" dur="indefinite" restart="never" nodeType="tmRoot"/>
+      </p:par>
+    </p:tnLst>
+  </p:timing>
 </p:sld>
 </file>
 

</xml_diff>